<commit_message>
First couple of slides
</commit_message>
<xml_diff>
--- a/Presentations/DS-course-1-introduction.pptx
+++ b/Presentations/DS-course-1-introduction.pptx
@@ -6,6 +6,8 @@
   </p:sldMasterIdLst>
   <p:sldIdLst>
     <p:sldId id="256" r:id="rId2"/>
+    <p:sldId id="257" r:id="rId3"/>
+    <p:sldId id="258" r:id="rId4"/>
   </p:sldIdLst>
   <p:sldSz cx="12192000" cy="6858000"/>
   <p:notesSz cx="6858000" cy="9144000"/>
@@ -259,7 +261,7 @@
           <a:p>
             <a:fld id="{973BC00D-352D-4681-8132-8CC5EB9D512D}" type="datetimeFigureOut">
               <a:rPr lang="en-US" smtClean="0"/>
-              <a:t>4/5/2022</a:t>
+              <a:t>4/13/2022</a:t>
             </a:fld>
             <a:endParaRPr lang="en-US"/>
           </a:p>
@@ -457,7 +459,7 @@
           <a:p>
             <a:fld id="{973BC00D-352D-4681-8132-8CC5EB9D512D}" type="datetimeFigureOut">
               <a:rPr lang="en-US" smtClean="0"/>
-              <a:t>4/5/2022</a:t>
+              <a:t>4/13/2022</a:t>
             </a:fld>
             <a:endParaRPr lang="en-US"/>
           </a:p>
@@ -665,7 +667,7 @@
           <a:p>
             <a:fld id="{973BC00D-352D-4681-8132-8CC5EB9D512D}" type="datetimeFigureOut">
               <a:rPr lang="en-US" smtClean="0"/>
-              <a:t>4/5/2022</a:t>
+              <a:t>4/13/2022</a:t>
             </a:fld>
             <a:endParaRPr lang="en-US"/>
           </a:p>
@@ -863,7 +865,7 @@
           <a:p>
             <a:fld id="{973BC00D-352D-4681-8132-8CC5EB9D512D}" type="datetimeFigureOut">
               <a:rPr lang="en-US" smtClean="0"/>
-              <a:t>4/5/2022</a:t>
+              <a:t>4/13/2022</a:t>
             </a:fld>
             <a:endParaRPr lang="en-US"/>
           </a:p>
@@ -1138,7 +1140,7 @@
           <a:p>
             <a:fld id="{973BC00D-352D-4681-8132-8CC5EB9D512D}" type="datetimeFigureOut">
               <a:rPr lang="en-US" smtClean="0"/>
-              <a:t>4/5/2022</a:t>
+              <a:t>4/13/2022</a:t>
             </a:fld>
             <a:endParaRPr lang="en-US"/>
           </a:p>
@@ -1403,7 +1405,7 @@
           <a:p>
             <a:fld id="{973BC00D-352D-4681-8132-8CC5EB9D512D}" type="datetimeFigureOut">
               <a:rPr lang="en-US" smtClean="0"/>
-              <a:t>4/5/2022</a:t>
+              <a:t>4/13/2022</a:t>
             </a:fld>
             <a:endParaRPr lang="en-US"/>
           </a:p>
@@ -1815,7 +1817,7 @@
           <a:p>
             <a:fld id="{973BC00D-352D-4681-8132-8CC5EB9D512D}" type="datetimeFigureOut">
               <a:rPr lang="en-US" smtClean="0"/>
-              <a:t>4/5/2022</a:t>
+              <a:t>4/13/2022</a:t>
             </a:fld>
             <a:endParaRPr lang="en-US"/>
           </a:p>
@@ -1956,7 +1958,7 @@
           <a:p>
             <a:fld id="{973BC00D-352D-4681-8132-8CC5EB9D512D}" type="datetimeFigureOut">
               <a:rPr lang="en-US" smtClean="0"/>
-              <a:t>4/5/2022</a:t>
+              <a:t>4/13/2022</a:t>
             </a:fld>
             <a:endParaRPr lang="en-US"/>
           </a:p>
@@ -2069,7 +2071,7 @@
           <a:p>
             <a:fld id="{973BC00D-352D-4681-8132-8CC5EB9D512D}" type="datetimeFigureOut">
               <a:rPr lang="en-US" smtClean="0"/>
-              <a:t>4/5/2022</a:t>
+              <a:t>4/13/2022</a:t>
             </a:fld>
             <a:endParaRPr lang="en-US"/>
           </a:p>
@@ -2380,7 +2382,7 @@
           <a:p>
             <a:fld id="{973BC00D-352D-4681-8132-8CC5EB9D512D}" type="datetimeFigureOut">
               <a:rPr lang="en-US" smtClean="0"/>
-              <a:t>4/5/2022</a:t>
+              <a:t>4/13/2022</a:t>
             </a:fld>
             <a:endParaRPr lang="en-US"/>
           </a:p>
@@ -2668,7 +2670,7 @@
           <a:p>
             <a:fld id="{973BC00D-352D-4681-8132-8CC5EB9D512D}" type="datetimeFigureOut">
               <a:rPr lang="en-US" smtClean="0"/>
-              <a:t>4/5/2022</a:t>
+              <a:t>4/13/2022</a:t>
             </a:fld>
             <a:endParaRPr lang="en-US"/>
           </a:p>
@@ -2909,7 +2911,7 @@
           <a:p>
             <a:fld id="{973BC00D-352D-4681-8132-8CC5EB9D512D}" type="datetimeFigureOut">
               <a:rPr lang="en-US" smtClean="0"/>
-              <a:t>4/5/2022</a:t>
+              <a:t>4/13/2022</a:t>
             </a:fld>
             <a:endParaRPr lang="en-US"/>
           </a:p>
@@ -3344,7 +3346,7 @@
         </p:nvSpPr>
         <p:spPr>
           <a:xfrm>
-            <a:off x="1523999" y="3026567"/>
+            <a:off x="1532877" y="3026567"/>
             <a:ext cx="9144000" cy="804866"/>
           </a:xfrm>
         </p:spPr>
@@ -3356,7 +3358,7 @@
           <a:p>
             <a:r>
               <a:rPr lang="en-US" sz="4400" dirty="0"/>
-              <a:t>1. Introduction</a:t>
+              <a:t>Module 1: Introduction</a:t>
             </a:r>
           </a:p>
         </p:txBody>
@@ -3401,6 +3403,4414 @@
   <p:clrMapOvr>
     <a:masterClrMapping/>
   </p:clrMapOvr>
+</p:sld>
+</file>
+
+<file path=ppt/slides/slide2.xml><?xml version="1.0" encoding="utf-8"?>
+<p:sld xmlns:a="http://schemas.openxmlformats.org/drawingml/2006/main" xmlns:r="http://schemas.openxmlformats.org/officeDocument/2006/relationships" xmlns:p="http://schemas.openxmlformats.org/presentationml/2006/main">
+  <p:cSld>
+    <p:spTree>
+      <p:nvGrpSpPr>
+        <p:cNvPr id="1" name=""/>
+        <p:cNvGrpSpPr/>
+        <p:nvPr/>
+      </p:nvGrpSpPr>
+      <p:grpSpPr>
+        <a:xfrm>
+          <a:off x="0" y="0"/>
+          <a:ext cx="0" cy="0"/>
+          <a:chOff x="0" y="0"/>
+          <a:chExt cx="0" cy="0"/>
+        </a:xfrm>
+      </p:grpSpPr>
+      <p:sp>
+        <p:nvSpPr>
+          <p:cNvPr id="33" name="Hexagon 32">
+            <a:extLst>
+              <a:ext uri="{FF2B5EF4-FFF2-40B4-BE49-F238E27FC236}">
+                <a16:creationId xmlns:a16="http://schemas.microsoft.com/office/drawing/2014/main" id="{6B861DC0-D7AB-40A8-84F7-C91AE432A3EA}"/>
+              </a:ext>
+            </a:extLst>
+          </p:cNvPr>
+          <p:cNvSpPr/>
+          <p:nvPr/>
+        </p:nvSpPr>
+        <p:spPr>
+          <a:xfrm>
+            <a:off x="9516007" y="2793529"/>
+            <a:ext cx="2183907" cy="1154097"/>
+          </a:xfrm>
+          <a:prstGeom prst="hexagon">
+            <a:avLst/>
+          </a:prstGeom>
+        </p:spPr>
+        <p:style>
+          <a:lnRef idx="2">
+            <a:schemeClr val="accent1">
+              <a:shade val="50000"/>
+            </a:schemeClr>
+          </a:lnRef>
+          <a:fillRef idx="1">
+            <a:schemeClr val="accent1"/>
+          </a:fillRef>
+          <a:effectRef idx="0">
+            <a:schemeClr val="accent1"/>
+          </a:effectRef>
+          <a:fontRef idx="minor">
+            <a:schemeClr val="lt1"/>
+          </a:fontRef>
+        </p:style>
+        <p:txBody>
+          <a:bodyPr rtlCol="0" anchor="t"/>
+          <a:lstStyle/>
+          <a:p>
+            <a:pPr algn="ctr"/>
+            <a:r>
+              <a:rPr lang="en-US" dirty="0"/>
+              <a:t>Job</a:t>
+            </a:r>
+          </a:p>
+          <a:p>
+            <a:pPr algn="ctr"/>
+            <a:r>
+              <a:rPr lang="en-US" dirty="0"/>
+              <a:t>Host(s)</a:t>
+            </a:r>
+          </a:p>
+        </p:txBody>
+      </p:sp>
+      <p:sp>
+        <p:nvSpPr>
+          <p:cNvPr id="32" name="Hexagon 31">
+            <a:extLst>
+              <a:ext uri="{FF2B5EF4-FFF2-40B4-BE49-F238E27FC236}">
+                <a16:creationId xmlns:a16="http://schemas.microsoft.com/office/drawing/2014/main" id="{DF1C5BA5-91BF-4810-9871-95648B9EC31B}"/>
+              </a:ext>
+            </a:extLst>
+          </p:cNvPr>
+          <p:cNvSpPr/>
+          <p:nvPr/>
+        </p:nvSpPr>
+        <p:spPr>
+          <a:xfrm>
+            <a:off x="9363607" y="2641129"/>
+            <a:ext cx="2183907" cy="1154097"/>
+          </a:xfrm>
+          <a:prstGeom prst="hexagon">
+            <a:avLst/>
+          </a:prstGeom>
+        </p:spPr>
+        <p:style>
+          <a:lnRef idx="2">
+            <a:schemeClr val="accent1">
+              <a:shade val="50000"/>
+            </a:schemeClr>
+          </a:lnRef>
+          <a:fillRef idx="1">
+            <a:schemeClr val="accent1"/>
+          </a:fillRef>
+          <a:effectRef idx="0">
+            <a:schemeClr val="accent1"/>
+          </a:effectRef>
+          <a:fontRef idx="minor">
+            <a:schemeClr val="lt1"/>
+          </a:fontRef>
+        </p:style>
+        <p:txBody>
+          <a:bodyPr rtlCol="0" anchor="t"/>
+          <a:lstStyle/>
+          <a:p>
+            <a:pPr algn="ctr"/>
+            <a:r>
+              <a:rPr lang="en-US" dirty="0"/>
+              <a:t>Job</a:t>
+            </a:r>
+          </a:p>
+          <a:p>
+            <a:pPr algn="ctr"/>
+            <a:r>
+              <a:rPr lang="en-US" dirty="0"/>
+              <a:t>Host(s)</a:t>
+            </a:r>
+          </a:p>
+        </p:txBody>
+      </p:sp>
+      <p:sp>
+        <p:nvSpPr>
+          <p:cNvPr id="2" name="Hexagon 1">
+            <a:extLst>
+              <a:ext uri="{FF2B5EF4-FFF2-40B4-BE49-F238E27FC236}">
+                <a16:creationId xmlns:a16="http://schemas.microsoft.com/office/drawing/2014/main" id="{A031FB85-CE8A-4F94-93BB-A5E02875F809}"/>
+              </a:ext>
+            </a:extLst>
+          </p:cNvPr>
+          <p:cNvSpPr/>
+          <p:nvPr/>
+        </p:nvSpPr>
+        <p:spPr>
+          <a:xfrm>
+            <a:off x="1249415" y="2590326"/>
+            <a:ext cx="2183907" cy="1154097"/>
+          </a:xfrm>
+          <a:prstGeom prst="hexagon">
+            <a:avLst/>
+          </a:prstGeom>
+        </p:spPr>
+        <p:style>
+          <a:lnRef idx="2">
+            <a:schemeClr val="accent1">
+              <a:shade val="50000"/>
+            </a:schemeClr>
+          </a:lnRef>
+          <a:fillRef idx="1">
+            <a:schemeClr val="accent1"/>
+          </a:fillRef>
+          <a:effectRef idx="0">
+            <a:schemeClr val="accent1"/>
+          </a:effectRef>
+          <a:fontRef idx="minor">
+            <a:schemeClr val="lt1"/>
+          </a:fontRef>
+        </p:style>
+        <p:txBody>
+          <a:bodyPr rtlCol="0" anchor="ctr"/>
+          <a:lstStyle/>
+          <a:p>
+            <a:pPr algn="ctr"/>
+            <a:r>
+              <a:rPr lang="en-US" dirty="0"/>
+              <a:t>Authorization</a:t>
+            </a:r>
+          </a:p>
+          <a:p>
+            <a:pPr algn="ctr"/>
+            <a:r>
+              <a:rPr lang="en-US" dirty="0"/>
+              <a:t>Server</a:t>
+            </a:r>
+          </a:p>
+        </p:txBody>
+      </p:sp>
+      <p:sp>
+        <p:nvSpPr>
+          <p:cNvPr id="4" name="Hexagon 3">
+            <a:extLst>
+              <a:ext uri="{FF2B5EF4-FFF2-40B4-BE49-F238E27FC236}">
+                <a16:creationId xmlns:a16="http://schemas.microsoft.com/office/drawing/2014/main" id="{A63CA15E-0224-40D8-86D7-5F735740BC7E}"/>
+              </a:ext>
+            </a:extLst>
+          </p:cNvPr>
+          <p:cNvSpPr/>
+          <p:nvPr/>
+        </p:nvSpPr>
+        <p:spPr>
+          <a:xfrm>
+            <a:off x="3828379" y="2590326"/>
+            <a:ext cx="2183907" cy="1154097"/>
+          </a:xfrm>
+          <a:prstGeom prst="hexagon">
+            <a:avLst/>
+          </a:prstGeom>
+        </p:spPr>
+        <p:style>
+          <a:lnRef idx="2">
+            <a:schemeClr val="accent1">
+              <a:shade val="50000"/>
+            </a:schemeClr>
+          </a:lnRef>
+          <a:fillRef idx="1">
+            <a:schemeClr val="accent1"/>
+          </a:fillRef>
+          <a:effectRef idx="0">
+            <a:schemeClr val="accent1"/>
+          </a:effectRef>
+          <a:fontRef idx="minor">
+            <a:schemeClr val="lt1"/>
+          </a:fontRef>
+        </p:style>
+        <p:txBody>
+          <a:bodyPr rtlCol="0" anchor="ctr"/>
+          <a:lstStyle/>
+          <a:p>
+            <a:pPr algn="ctr"/>
+            <a:r>
+              <a:rPr lang="en-US" dirty="0"/>
+              <a:t>Web</a:t>
+            </a:r>
+          </a:p>
+          <a:p>
+            <a:pPr algn="ctr"/>
+            <a:r>
+              <a:rPr lang="en-US" dirty="0"/>
+              <a:t>Server</a:t>
+            </a:r>
+          </a:p>
+        </p:txBody>
+      </p:sp>
+      <p:sp>
+        <p:nvSpPr>
+          <p:cNvPr id="5" name="Rectangle 4">
+            <a:extLst>
+              <a:ext uri="{FF2B5EF4-FFF2-40B4-BE49-F238E27FC236}">
+                <a16:creationId xmlns:a16="http://schemas.microsoft.com/office/drawing/2014/main" id="{3007271D-1CB4-4B81-B3EB-1ADAEA050AD4}"/>
+              </a:ext>
+            </a:extLst>
+          </p:cNvPr>
+          <p:cNvSpPr/>
+          <p:nvPr/>
+        </p:nvSpPr>
+        <p:spPr>
+          <a:xfrm>
+            <a:off x="2857125" y="598881"/>
+            <a:ext cx="1491449" cy="807868"/>
+          </a:xfrm>
+          <a:prstGeom prst="rect">
+            <a:avLst/>
+          </a:prstGeom>
+        </p:spPr>
+        <p:style>
+          <a:lnRef idx="2">
+            <a:schemeClr val="accent1">
+              <a:shade val="50000"/>
+            </a:schemeClr>
+          </a:lnRef>
+          <a:fillRef idx="1">
+            <a:schemeClr val="accent1"/>
+          </a:fillRef>
+          <a:effectRef idx="0">
+            <a:schemeClr val="accent1"/>
+          </a:effectRef>
+          <a:fontRef idx="minor">
+            <a:schemeClr val="lt1"/>
+          </a:fontRef>
+        </p:style>
+        <p:txBody>
+          <a:bodyPr rtlCol="0" anchor="ctr"/>
+          <a:lstStyle/>
+          <a:p>
+            <a:pPr algn="ctr"/>
+            <a:r>
+              <a:rPr lang="en-US" dirty="0"/>
+              <a:t>Browser</a:t>
+            </a:r>
+          </a:p>
+        </p:txBody>
+      </p:sp>
+      <p:pic>
+        <p:nvPicPr>
+          <p:cNvPr id="6" name="Graphic 5" descr="User">
+            <a:extLst>
+              <a:ext uri="{FF2B5EF4-FFF2-40B4-BE49-F238E27FC236}">
+                <a16:creationId xmlns:a16="http://schemas.microsoft.com/office/drawing/2014/main" id="{4E835316-6967-4855-BD9B-641245368F02}"/>
+              </a:ext>
+            </a:extLst>
+          </p:cNvPr>
+          <p:cNvPicPr>
+            <a:picLocks noChangeAspect="1"/>
+          </p:cNvPicPr>
+          <p:nvPr/>
+        </p:nvPicPr>
+        <p:blipFill>
+          <a:blip r:embed="rId2">
+            <a:extLst>
+              <a:ext uri="{28A0092B-C50C-407E-A947-70E740481C1C}">
+                <a14:useLocalDpi xmlns:a14="http://schemas.microsoft.com/office/drawing/2010/main" val="0"/>
+              </a:ext>
+              <a:ext uri="{96DAC541-7B7A-43D3-8B79-37D633B846F1}">
+                <asvg:svgBlip xmlns:asvg="http://schemas.microsoft.com/office/drawing/2016/SVG/main" r:embed="rId3"/>
+              </a:ext>
+            </a:extLst>
+          </a:blip>
+          <a:stretch>
+            <a:fillRect/>
+          </a:stretch>
+        </p:blipFill>
+        <p:spPr>
+          <a:xfrm>
+            <a:off x="3346879" y="66558"/>
+            <a:ext cx="511939" cy="511939"/>
+          </a:xfrm>
+          <a:prstGeom prst="rect">
+            <a:avLst/>
+          </a:prstGeom>
+        </p:spPr>
+      </p:pic>
+      <p:sp>
+        <p:nvSpPr>
+          <p:cNvPr id="7" name="Hexagon 6">
+            <a:extLst>
+              <a:ext uri="{FF2B5EF4-FFF2-40B4-BE49-F238E27FC236}">
+                <a16:creationId xmlns:a16="http://schemas.microsoft.com/office/drawing/2014/main" id="{DFBE01BF-F36D-4682-8EA9-4DC077D1CFAA}"/>
+              </a:ext>
+            </a:extLst>
+          </p:cNvPr>
+          <p:cNvSpPr/>
+          <p:nvPr/>
+        </p:nvSpPr>
+        <p:spPr>
+          <a:xfrm>
+            <a:off x="6519793" y="2590325"/>
+            <a:ext cx="2183907" cy="1154097"/>
+          </a:xfrm>
+          <a:prstGeom prst="hexagon">
+            <a:avLst/>
+          </a:prstGeom>
+        </p:spPr>
+        <p:style>
+          <a:lnRef idx="2">
+            <a:schemeClr val="accent1">
+              <a:shade val="50000"/>
+            </a:schemeClr>
+          </a:lnRef>
+          <a:fillRef idx="1">
+            <a:schemeClr val="accent1"/>
+          </a:fillRef>
+          <a:effectRef idx="0">
+            <a:schemeClr val="accent1"/>
+          </a:effectRef>
+          <a:fontRef idx="minor">
+            <a:schemeClr val="lt1"/>
+          </a:fontRef>
+        </p:style>
+        <p:txBody>
+          <a:bodyPr rtlCol="0" anchor="ctr"/>
+          <a:lstStyle/>
+          <a:p>
+            <a:pPr algn="ctr"/>
+            <a:r>
+              <a:rPr lang="en-US" dirty="0"/>
+              <a:t>Job</a:t>
+            </a:r>
+          </a:p>
+          <a:p>
+            <a:pPr algn="ctr"/>
+            <a:r>
+              <a:rPr lang="en-US" dirty="0"/>
+              <a:t>Orchestrator</a:t>
+            </a:r>
+          </a:p>
+        </p:txBody>
+      </p:sp>
+      <p:sp>
+        <p:nvSpPr>
+          <p:cNvPr id="16" name="Cloud 15">
+            <a:extLst>
+              <a:ext uri="{FF2B5EF4-FFF2-40B4-BE49-F238E27FC236}">
+                <a16:creationId xmlns:a16="http://schemas.microsoft.com/office/drawing/2014/main" id="{3E1DB92C-1EA6-42F6-9871-363E36BB4CB1}"/>
+              </a:ext>
+            </a:extLst>
+          </p:cNvPr>
+          <p:cNvSpPr/>
+          <p:nvPr/>
+        </p:nvSpPr>
+        <p:spPr>
+          <a:xfrm>
+            <a:off x="6519793" y="5126665"/>
+            <a:ext cx="2691414" cy="942109"/>
+          </a:xfrm>
+          <a:prstGeom prst="cloud">
+            <a:avLst/>
+          </a:prstGeom>
+        </p:spPr>
+        <p:style>
+          <a:lnRef idx="2">
+            <a:schemeClr val="accent5">
+              <a:shade val="50000"/>
+            </a:schemeClr>
+          </a:lnRef>
+          <a:fillRef idx="1">
+            <a:schemeClr val="accent5"/>
+          </a:fillRef>
+          <a:effectRef idx="0">
+            <a:schemeClr val="accent5"/>
+          </a:effectRef>
+          <a:fontRef idx="minor">
+            <a:schemeClr val="lt1"/>
+          </a:fontRef>
+        </p:style>
+        <p:txBody>
+          <a:bodyPr rtlCol="0" anchor="ctr"/>
+          <a:lstStyle/>
+          <a:p>
+            <a:pPr algn="ctr"/>
+            <a:r>
+              <a:rPr lang="da-DK" dirty="0"/>
+              <a:t>MIKE Cloud</a:t>
+            </a:r>
+          </a:p>
+          <a:p>
+            <a:pPr algn="ctr"/>
+            <a:r>
+              <a:rPr lang="da-DK" dirty="0"/>
+              <a:t>Services</a:t>
+            </a:r>
+            <a:endParaRPr lang="en-US" dirty="0"/>
+          </a:p>
+        </p:txBody>
+      </p:sp>
+      <p:sp>
+        <p:nvSpPr>
+          <p:cNvPr id="31" name="Hexagon 30">
+            <a:extLst>
+              <a:ext uri="{FF2B5EF4-FFF2-40B4-BE49-F238E27FC236}">
+                <a16:creationId xmlns:a16="http://schemas.microsoft.com/office/drawing/2014/main" id="{D606B5F7-D31D-4495-9413-2BE80B39CF10}"/>
+              </a:ext>
+            </a:extLst>
+          </p:cNvPr>
+          <p:cNvSpPr/>
+          <p:nvPr/>
+        </p:nvSpPr>
+        <p:spPr>
+          <a:xfrm>
+            <a:off x="9211207" y="2488729"/>
+            <a:ext cx="2183907" cy="1154097"/>
+          </a:xfrm>
+          <a:prstGeom prst="hexagon">
+            <a:avLst/>
+          </a:prstGeom>
+        </p:spPr>
+        <p:style>
+          <a:lnRef idx="2">
+            <a:schemeClr val="accent1">
+              <a:shade val="50000"/>
+            </a:schemeClr>
+          </a:lnRef>
+          <a:fillRef idx="1">
+            <a:schemeClr val="accent1"/>
+          </a:fillRef>
+          <a:effectRef idx="0">
+            <a:schemeClr val="accent1"/>
+          </a:effectRef>
+          <a:fontRef idx="minor">
+            <a:schemeClr val="lt1"/>
+          </a:fontRef>
+        </p:style>
+        <p:txBody>
+          <a:bodyPr rtlCol="0" anchor="ctr"/>
+          <a:lstStyle/>
+          <a:p>
+            <a:pPr algn="ctr"/>
+            <a:r>
+              <a:rPr lang="en-US" dirty="0"/>
+              <a:t>Job</a:t>
+            </a:r>
+          </a:p>
+          <a:p>
+            <a:pPr algn="ctr"/>
+            <a:r>
+              <a:rPr lang="en-US" dirty="0"/>
+              <a:t>Host(s)</a:t>
+            </a:r>
+          </a:p>
+        </p:txBody>
+      </p:sp>
+      <p:sp>
+        <p:nvSpPr>
+          <p:cNvPr id="17" name="TextBox 16">
+            <a:extLst>
+              <a:ext uri="{FF2B5EF4-FFF2-40B4-BE49-F238E27FC236}">
+                <a16:creationId xmlns:a16="http://schemas.microsoft.com/office/drawing/2014/main" id="{E9B9D834-4803-4F5A-B332-7FC09DAE4BF8}"/>
+              </a:ext>
+            </a:extLst>
+          </p:cNvPr>
+          <p:cNvSpPr txBox="1"/>
+          <p:nvPr/>
+        </p:nvSpPr>
+        <p:spPr>
+          <a:xfrm>
+            <a:off x="279906" y="1721481"/>
+            <a:ext cx="2061462" cy="369332"/>
+          </a:xfrm>
+          <a:prstGeom prst="rect">
+            <a:avLst/>
+          </a:prstGeom>
+          <a:noFill/>
+        </p:spPr>
+        <p:txBody>
+          <a:bodyPr wrap="none" rtlCol="0">
+            <a:spAutoFit/>
+          </a:bodyPr>
+          <a:lstStyle/>
+          <a:p>
+            <a:r>
+              <a:rPr lang="en-US" dirty="0"/>
+              <a:t>Application Services</a:t>
+            </a:r>
+          </a:p>
+        </p:txBody>
+      </p:sp>
+      <p:sp>
+        <p:nvSpPr>
+          <p:cNvPr id="18" name="TextBox 17">
+            <a:extLst>
+              <a:ext uri="{FF2B5EF4-FFF2-40B4-BE49-F238E27FC236}">
+                <a16:creationId xmlns:a16="http://schemas.microsoft.com/office/drawing/2014/main" id="{AB559BFE-8A7A-4265-ACFC-E063FD565701}"/>
+              </a:ext>
+            </a:extLst>
+          </p:cNvPr>
+          <p:cNvSpPr txBox="1"/>
+          <p:nvPr/>
+        </p:nvSpPr>
+        <p:spPr>
+          <a:xfrm>
+            <a:off x="277277" y="4597408"/>
+            <a:ext cx="3241208" cy="369332"/>
+          </a:xfrm>
+          <a:prstGeom prst="rect">
+            <a:avLst/>
+          </a:prstGeom>
+          <a:noFill/>
+        </p:spPr>
+        <p:txBody>
+          <a:bodyPr wrap="square" rtlCol="0">
+            <a:spAutoFit/>
+          </a:bodyPr>
+          <a:lstStyle/>
+          <a:p>
+            <a:r>
+              <a:rPr lang="en-US" dirty="0"/>
+              <a:t>Infrastructure Services</a:t>
+            </a:r>
+          </a:p>
+        </p:txBody>
+      </p:sp>
+      <p:pic>
+        <p:nvPicPr>
+          <p:cNvPr id="1048" name="Picture 24" descr="execution Icon - Download execution Icon 3968542 | Noun Project">
+            <a:extLst>
+              <a:ext uri="{FF2B5EF4-FFF2-40B4-BE49-F238E27FC236}">
+                <a16:creationId xmlns:a16="http://schemas.microsoft.com/office/drawing/2014/main" id="{BA943559-E54F-4276-A171-8DDCA6FED754}"/>
+              </a:ext>
+            </a:extLst>
+          </p:cNvPr>
+          <p:cNvPicPr>
+            <a:picLocks noChangeAspect="1" noChangeArrowheads="1"/>
+          </p:cNvPicPr>
+          <p:nvPr/>
+        </p:nvPicPr>
+        <p:blipFill>
+          <a:blip r:embed="rId4">
+            <a:lum bright="70000" contrast="-70000"/>
+            <a:extLst>
+              <a:ext uri="{28A0092B-C50C-407E-A947-70E740481C1C}">
+                <a14:useLocalDpi xmlns:a14="http://schemas.microsoft.com/office/drawing/2010/main" val="0"/>
+              </a:ext>
+            </a:extLst>
+          </a:blip>
+          <a:srcRect/>
+          <a:stretch>
+            <a:fillRect/>
+          </a:stretch>
+        </p:blipFill>
+        <p:spPr bwMode="auto">
+          <a:xfrm>
+            <a:off x="10712462" y="3150618"/>
+            <a:ext cx="414350" cy="414350"/>
+          </a:xfrm>
+          <a:prstGeom prst="rect">
+            <a:avLst/>
+          </a:prstGeom>
+          <a:noFill/>
+          <a:extLst>
+            <a:ext uri="{909E8E84-426E-40DD-AFC4-6F175D3DCCD1}">
+              <a14:hiddenFill xmlns:a14="http://schemas.microsoft.com/office/drawing/2010/main">
+                <a:solidFill>
+                  <a:srgbClr val="FFFFFF"/>
+                </a:solidFill>
+              </a14:hiddenFill>
+            </a:ext>
+          </a:extLst>
+        </p:spPr>
+      </p:pic>
+      <p:sp>
+        <p:nvSpPr>
+          <p:cNvPr id="38" name="Cloud 37">
+            <a:extLst>
+              <a:ext uri="{FF2B5EF4-FFF2-40B4-BE49-F238E27FC236}">
+                <a16:creationId xmlns:a16="http://schemas.microsoft.com/office/drawing/2014/main" id="{69E5CFCB-AA52-47FD-9A8F-ACC0697DB7E3}"/>
+              </a:ext>
+            </a:extLst>
+          </p:cNvPr>
+          <p:cNvSpPr/>
+          <p:nvPr/>
+        </p:nvSpPr>
+        <p:spPr>
+          <a:xfrm>
+            <a:off x="2283477" y="5192879"/>
+            <a:ext cx="2802119" cy="942109"/>
+          </a:xfrm>
+          <a:prstGeom prst="cloud">
+            <a:avLst/>
+          </a:prstGeom>
+        </p:spPr>
+        <p:style>
+          <a:lnRef idx="2">
+            <a:schemeClr val="accent5">
+              <a:shade val="50000"/>
+            </a:schemeClr>
+          </a:lnRef>
+          <a:fillRef idx="1">
+            <a:schemeClr val="accent5"/>
+          </a:fillRef>
+          <a:effectRef idx="0">
+            <a:schemeClr val="accent5"/>
+          </a:effectRef>
+          <a:fontRef idx="minor">
+            <a:schemeClr val="lt1"/>
+          </a:fontRef>
+        </p:style>
+        <p:txBody>
+          <a:bodyPr rtlCol="0" anchor="ctr"/>
+          <a:lstStyle/>
+          <a:p>
+            <a:pPr algn="ctr"/>
+            <a:r>
+              <a:rPr lang="en-US" dirty="0"/>
+              <a:t>Azure </a:t>
+            </a:r>
+          </a:p>
+          <a:p>
+            <a:pPr algn="ctr"/>
+            <a:r>
+              <a:rPr lang="en-US" dirty="0"/>
+              <a:t>PostgreSQL</a:t>
+            </a:r>
+          </a:p>
+        </p:txBody>
+      </p:sp>
+      <p:pic>
+        <p:nvPicPr>
+          <p:cNvPr id="1064" name="Picture 40" descr="PostgreSQL - Visual Studio Marketplace">
+            <a:extLst>
+              <a:ext uri="{FF2B5EF4-FFF2-40B4-BE49-F238E27FC236}">
+                <a16:creationId xmlns:a16="http://schemas.microsoft.com/office/drawing/2014/main" id="{2538E492-03A8-4F2F-AB3F-C46B01AA39BA}"/>
+              </a:ext>
+            </a:extLst>
+          </p:cNvPr>
+          <p:cNvPicPr>
+            <a:picLocks noChangeAspect="1" noChangeArrowheads="1"/>
+          </p:cNvPicPr>
+          <p:nvPr/>
+        </p:nvPicPr>
+        <p:blipFill>
+          <a:blip r:embed="rId5">
+            <a:extLst>
+              <a:ext uri="{28A0092B-C50C-407E-A947-70E740481C1C}">
+                <a14:useLocalDpi xmlns:a14="http://schemas.microsoft.com/office/drawing/2010/main" val="0"/>
+              </a:ext>
+            </a:extLst>
+          </a:blip>
+          <a:srcRect/>
+          <a:stretch>
+            <a:fillRect/>
+          </a:stretch>
+        </p:blipFill>
+        <p:spPr bwMode="auto">
+          <a:xfrm>
+            <a:off x="2844402" y="5079405"/>
+            <a:ext cx="427167" cy="425505"/>
+          </a:xfrm>
+          <a:prstGeom prst="rect">
+            <a:avLst/>
+          </a:prstGeom>
+          <a:noFill/>
+          <a:extLst>
+            <a:ext uri="{909E8E84-426E-40DD-AFC4-6F175D3DCCD1}">
+              <a14:hiddenFill xmlns:a14="http://schemas.microsoft.com/office/drawing/2010/main">
+                <a:solidFill>
+                  <a:srgbClr val="FFFFFF"/>
+                </a:solidFill>
+              </a14:hiddenFill>
+            </a:ext>
+          </a:extLst>
+        </p:spPr>
+      </p:pic>
+      <p:pic>
+        <p:nvPicPr>
+          <p:cNvPr id="54" name="Picture 53">
+            <a:extLst>
+              <a:ext uri="{FF2B5EF4-FFF2-40B4-BE49-F238E27FC236}">
+                <a16:creationId xmlns:a16="http://schemas.microsoft.com/office/drawing/2014/main" id="{D3AA337A-2017-4525-A41C-CBBC9FA33F43}"/>
+              </a:ext>
+            </a:extLst>
+          </p:cNvPr>
+          <p:cNvPicPr>
+            <a:picLocks noChangeAspect="1"/>
+          </p:cNvPicPr>
+          <p:nvPr/>
+        </p:nvPicPr>
+        <p:blipFill>
+          <a:blip r:embed="rId6">
+            <a:extLst>
+              <a:ext uri="{28A0092B-C50C-407E-A947-70E740481C1C}">
+                <a14:useLocalDpi xmlns:a14="http://schemas.microsoft.com/office/drawing/2010/main" val="0"/>
+              </a:ext>
+            </a:extLst>
+          </a:blip>
+          <a:stretch>
+            <a:fillRect/>
+          </a:stretch>
+        </p:blipFill>
+        <p:spPr>
+          <a:xfrm>
+            <a:off x="8418102" y="5408432"/>
+            <a:ext cx="338463" cy="338463"/>
+          </a:xfrm>
+          <a:prstGeom prst="rect">
+            <a:avLst/>
+          </a:prstGeom>
+        </p:spPr>
+      </p:pic>
+      <p:sp>
+        <p:nvSpPr>
+          <p:cNvPr id="58" name="TextBox 57">
+            <a:extLst>
+              <a:ext uri="{FF2B5EF4-FFF2-40B4-BE49-F238E27FC236}">
+                <a16:creationId xmlns:a16="http://schemas.microsoft.com/office/drawing/2014/main" id="{CA289366-E694-40D4-8A9C-40CA1463A1E0}"/>
+              </a:ext>
+            </a:extLst>
+          </p:cNvPr>
+          <p:cNvSpPr txBox="1"/>
+          <p:nvPr/>
+        </p:nvSpPr>
+        <p:spPr>
+          <a:xfrm>
+            <a:off x="278311" y="1149823"/>
+            <a:ext cx="725968" cy="369332"/>
+          </a:xfrm>
+          <a:prstGeom prst="rect">
+            <a:avLst/>
+          </a:prstGeom>
+          <a:noFill/>
+        </p:spPr>
+        <p:txBody>
+          <a:bodyPr wrap="none" rtlCol="0">
+            <a:spAutoFit/>
+          </a:bodyPr>
+          <a:lstStyle/>
+          <a:p>
+            <a:r>
+              <a:rPr lang="en-US" dirty="0"/>
+              <a:t>Client</a:t>
+            </a:r>
+          </a:p>
+        </p:txBody>
+      </p:sp>
+      <p:cxnSp>
+        <p:nvCxnSpPr>
+          <p:cNvPr id="59" name="Straight Connector 58">
+            <a:extLst>
+              <a:ext uri="{FF2B5EF4-FFF2-40B4-BE49-F238E27FC236}">
+                <a16:creationId xmlns:a16="http://schemas.microsoft.com/office/drawing/2014/main" id="{5C3D7E9D-6FB2-4A6C-83F9-9612375FD9AB}"/>
+              </a:ext>
+            </a:extLst>
+          </p:cNvPr>
+          <p:cNvCxnSpPr/>
+          <p:nvPr/>
+        </p:nvCxnSpPr>
+        <p:spPr>
+          <a:xfrm flipV="1">
+            <a:off x="277277" y="1610339"/>
+            <a:ext cx="11413153" cy="15016"/>
+          </a:xfrm>
+          <a:prstGeom prst="line">
+            <a:avLst/>
+          </a:prstGeom>
+          <a:ln w="22225">
+            <a:prstDash val="dashDot"/>
+          </a:ln>
+        </p:spPr>
+        <p:style>
+          <a:lnRef idx="1">
+            <a:schemeClr val="accent1"/>
+          </a:lnRef>
+          <a:fillRef idx="0">
+            <a:schemeClr val="accent1"/>
+          </a:fillRef>
+          <a:effectRef idx="0">
+            <a:schemeClr val="accent1"/>
+          </a:effectRef>
+          <a:fontRef idx="minor">
+            <a:schemeClr val="tx1"/>
+          </a:fontRef>
+        </p:style>
+      </p:cxnSp>
+      <p:cxnSp>
+        <p:nvCxnSpPr>
+          <p:cNvPr id="60" name="Straight Connector 59">
+            <a:extLst>
+              <a:ext uri="{FF2B5EF4-FFF2-40B4-BE49-F238E27FC236}">
+                <a16:creationId xmlns:a16="http://schemas.microsoft.com/office/drawing/2014/main" id="{DDC59582-265B-46A0-A7AF-CA42707A5888}"/>
+              </a:ext>
+            </a:extLst>
+          </p:cNvPr>
+          <p:cNvCxnSpPr/>
+          <p:nvPr/>
+        </p:nvCxnSpPr>
+        <p:spPr>
+          <a:xfrm flipV="1">
+            <a:off x="389423" y="4532472"/>
+            <a:ext cx="11413153" cy="15016"/>
+          </a:xfrm>
+          <a:prstGeom prst="line">
+            <a:avLst/>
+          </a:prstGeom>
+          <a:ln w="22225">
+            <a:prstDash val="dashDot"/>
+          </a:ln>
+        </p:spPr>
+        <p:style>
+          <a:lnRef idx="1">
+            <a:schemeClr val="accent1"/>
+          </a:lnRef>
+          <a:fillRef idx="0">
+            <a:schemeClr val="accent1"/>
+          </a:fillRef>
+          <a:effectRef idx="0">
+            <a:schemeClr val="accent1"/>
+          </a:effectRef>
+          <a:fontRef idx="minor">
+            <a:schemeClr val="tx1"/>
+          </a:fontRef>
+        </p:style>
+      </p:cxnSp>
+      <p:sp>
+        <p:nvSpPr>
+          <p:cNvPr id="55" name="Left-Right Arrow 17">
+            <a:extLst>
+              <a:ext uri="{FF2B5EF4-FFF2-40B4-BE49-F238E27FC236}">
+                <a16:creationId xmlns:a16="http://schemas.microsoft.com/office/drawing/2014/main" id="{ABE45E40-EE61-440B-A09B-410A737ADD3D}"/>
+              </a:ext>
+            </a:extLst>
+          </p:cNvPr>
+          <p:cNvSpPr/>
+          <p:nvPr/>
+        </p:nvSpPr>
+        <p:spPr>
+          <a:xfrm rot="19322400">
+            <a:off x="8251179" y="4289955"/>
+            <a:ext cx="1486610" cy="414350"/>
+          </a:xfrm>
+          <a:prstGeom prst="leftRightArrow">
+            <a:avLst/>
+          </a:prstGeom>
+          <a:solidFill>
+            <a:schemeClr val="accent2">
+              <a:lumMod val="75000"/>
+              <a:alpha val="34000"/>
+            </a:schemeClr>
+          </a:solidFill>
+          <a:ln>
+            <a:noFill/>
+          </a:ln>
+        </p:spPr>
+        <p:style>
+          <a:lnRef idx="2">
+            <a:schemeClr val="accent1">
+              <a:shade val="50000"/>
+            </a:schemeClr>
+          </a:lnRef>
+          <a:fillRef idx="1">
+            <a:schemeClr val="accent1"/>
+          </a:fillRef>
+          <a:effectRef idx="0">
+            <a:schemeClr val="accent1"/>
+          </a:effectRef>
+          <a:fontRef idx="minor">
+            <a:schemeClr val="lt1"/>
+          </a:fontRef>
+        </p:style>
+        <p:txBody>
+          <a:bodyPr vert="horz" rtlCol="0" anchor="ctr"/>
+          <a:lstStyle/>
+          <a:p>
+            <a:pPr algn="ctr"/>
+            <a:r>
+              <a:rPr lang="da-DK" dirty="0"/>
+              <a:t>HTTP</a:t>
+            </a:r>
+          </a:p>
+        </p:txBody>
+      </p:sp>
+      <p:sp>
+        <p:nvSpPr>
+          <p:cNvPr id="56" name="Left-Right Arrow 17">
+            <a:extLst>
+              <a:ext uri="{FF2B5EF4-FFF2-40B4-BE49-F238E27FC236}">
+                <a16:creationId xmlns:a16="http://schemas.microsoft.com/office/drawing/2014/main" id="{62EDCDF8-6F80-419B-9C99-AC04106C7373}"/>
+              </a:ext>
+            </a:extLst>
+          </p:cNvPr>
+          <p:cNvSpPr/>
+          <p:nvPr/>
+        </p:nvSpPr>
+        <p:spPr>
+          <a:xfrm rot="2403080">
+            <a:off x="5495234" y="4208106"/>
+            <a:ext cx="1841075" cy="414350"/>
+          </a:xfrm>
+          <a:prstGeom prst="leftRightArrow">
+            <a:avLst/>
+          </a:prstGeom>
+          <a:solidFill>
+            <a:schemeClr val="accent2">
+              <a:lumMod val="75000"/>
+              <a:alpha val="34000"/>
+            </a:schemeClr>
+          </a:solidFill>
+          <a:ln>
+            <a:noFill/>
+          </a:ln>
+        </p:spPr>
+        <p:style>
+          <a:lnRef idx="2">
+            <a:schemeClr val="accent1">
+              <a:shade val="50000"/>
+            </a:schemeClr>
+          </a:lnRef>
+          <a:fillRef idx="1">
+            <a:schemeClr val="accent1"/>
+          </a:fillRef>
+          <a:effectRef idx="0">
+            <a:schemeClr val="accent1"/>
+          </a:effectRef>
+          <a:fontRef idx="minor">
+            <a:schemeClr val="lt1"/>
+          </a:fontRef>
+        </p:style>
+        <p:txBody>
+          <a:bodyPr vert="horz" rtlCol="0" anchor="ctr"/>
+          <a:lstStyle/>
+          <a:p>
+            <a:pPr algn="ctr"/>
+            <a:r>
+              <a:rPr lang="da-DK" dirty="0"/>
+              <a:t>HTTP</a:t>
+            </a:r>
+          </a:p>
+        </p:txBody>
+      </p:sp>
+      <p:sp>
+        <p:nvSpPr>
+          <p:cNvPr id="27" name="Left-Right Arrow 17">
+            <a:extLst>
+              <a:ext uri="{FF2B5EF4-FFF2-40B4-BE49-F238E27FC236}">
+                <a16:creationId xmlns:a16="http://schemas.microsoft.com/office/drawing/2014/main" id="{07905DD8-0F46-4927-89D5-96D69ECC7614}"/>
+              </a:ext>
+            </a:extLst>
+          </p:cNvPr>
+          <p:cNvSpPr/>
+          <p:nvPr/>
+        </p:nvSpPr>
+        <p:spPr>
+          <a:xfrm>
+            <a:off x="5623820" y="2915723"/>
+            <a:ext cx="1310011" cy="414350"/>
+          </a:xfrm>
+          <a:prstGeom prst="leftRightArrow">
+            <a:avLst/>
+          </a:prstGeom>
+          <a:solidFill>
+            <a:schemeClr val="accent2">
+              <a:lumMod val="75000"/>
+              <a:alpha val="34000"/>
+            </a:schemeClr>
+          </a:solidFill>
+          <a:ln>
+            <a:noFill/>
+          </a:ln>
+        </p:spPr>
+        <p:style>
+          <a:lnRef idx="2">
+            <a:schemeClr val="accent1">
+              <a:shade val="50000"/>
+            </a:schemeClr>
+          </a:lnRef>
+          <a:fillRef idx="1">
+            <a:schemeClr val="accent1"/>
+          </a:fillRef>
+          <a:effectRef idx="0">
+            <a:schemeClr val="accent1"/>
+          </a:effectRef>
+          <a:fontRef idx="minor">
+            <a:schemeClr val="lt1"/>
+          </a:fontRef>
+        </p:style>
+        <p:txBody>
+          <a:bodyPr vert="horz" rtlCol="0" anchor="ctr"/>
+          <a:lstStyle/>
+          <a:p>
+            <a:pPr algn="ctr"/>
+            <a:r>
+              <a:rPr lang="da-DK" dirty="0"/>
+              <a:t>HTTP</a:t>
+            </a:r>
+          </a:p>
+        </p:txBody>
+      </p:sp>
+      <p:sp>
+        <p:nvSpPr>
+          <p:cNvPr id="34" name="Left-Right Arrow 17">
+            <a:extLst>
+              <a:ext uri="{FF2B5EF4-FFF2-40B4-BE49-F238E27FC236}">
+                <a16:creationId xmlns:a16="http://schemas.microsoft.com/office/drawing/2014/main" id="{A778B68B-E19A-4317-A943-BD7E320D1154}"/>
+              </a:ext>
+            </a:extLst>
+          </p:cNvPr>
+          <p:cNvSpPr/>
+          <p:nvPr/>
+        </p:nvSpPr>
+        <p:spPr>
+          <a:xfrm>
+            <a:off x="8310664" y="2960198"/>
+            <a:ext cx="1366982" cy="414350"/>
+          </a:xfrm>
+          <a:prstGeom prst="leftRightArrow">
+            <a:avLst/>
+          </a:prstGeom>
+          <a:solidFill>
+            <a:schemeClr val="accent2">
+              <a:lumMod val="75000"/>
+              <a:alpha val="34000"/>
+            </a:schemeClr>
+          </a:solidFill>
+          <a:ln>
+            <a:noFill/>
+          </a:ln>
+        </p:spPr>
+        <p:style>
+          <a:lnRef idx="2">
+            <a:schemeClr val="accent1">
+              <a:shade val="50000"/>
+            </a:schemeClr>
+          </a:lnRef>
+          <a:fillRef idx="1">
+            <a:schemeClr val="accent1"/>
+          </a:fillRef>
+          <a:effectRef idx="0">
+            <a:schemeClr val="accent1"/>
+          </a:effectRef>
+          <a:fontRef idx="minor">
+            <a:schemeClr val="lt1"/>
+          </a:fontRef>
+        </p:style>
+        <p:txBody>
+          <a:bodyPr vert="horz" rtlCol="0" anchor="ctr"/>
+          <a:lstStyle/>
+          <a:p>
+            <a:pPr algn="ctr"/>
+            <a:r>
+              <a:rPr lang="da-DK" dirty="0"/>
+              <a:t>HTTP</a:t>
+            </a:r>
+          </a:p>
+        </p:txBody>
+      </p:sp>
+      <p:sp>
+        <p:nvSpPr>
+          <p:cNvPr id="47" name="Down Arrow 3">
+            <a:extLst>
+              <a:ext uri="{FF2B5EF4-FFF2-40B4-BE49-F238E27FC236}">
+                <a16:creationId xmlns:a16="http://schemas.microsoft.com/office/drawing/2014/main" id="{6AD66914-5313-4F8A-93ED-4D48B780F732}"/>
+              </a:ext>
+            </a:extLst>
+          </p:cNvPr>
+          <p:cNvSpPr/>
+          <p:nvPr/>
+        </p:nvSpPr>
+        <p:spPr>
+          <a:xfrm rot="8701885">
+            <a:off x="4460105" y="1340396"/>
+            <a:ext cx="461019" cy="1398136"/>
+          </a:xfrm>
+          <a:prstGeom prst="downArrow">
+            <a:avLst/>
+          </a:prstGeom>
+          <a:solidFill>
+            <a:schemeClr val="accent2">
+              <a:lumMod val="75000"/>
+              <a:alpha val="34000"/>
+            </a:schemeClr>
+          </a:solidFill>
+          <a:ln>
+            <a:noFill/>
+          </a:ln>
+        </p:spPr>
+        <p:style>
+          <a:lnRef idx="2">
+            <a:schemeClr val="accent1">
+              <a:shade val="50000"/>
+            </a:schemeClr>
+          </a:lnRef>
+          <a:fillRef idx="1">
+            <a:schemeClr val="accent1"/>
+          </a:fillRef>
+          <a:effectRef idx="0">
+            <a:schemeClr val="accent1"/>
+          </a:effectRef>
+          <a:fontRef idx="minor">
+            <a:schemeClr val="lt1"/>
+          </a:fontRef>
+        </p:style>
+        <p:txBody>
+          <a:bodyPr vert="vert270" rtlCol="0" anchor="ctr"/>
+          <a:lstStyle/>
+          <a:p>
+            <a:pPr algn="ctr"/>
+            <a:r>
+              <a:rPr lang="en-US" dirty="0"/>
+              <a:t>WebSocket</a:t>
+            </a:r>
+          </a:p>
+        </p:txBody>
+      </p:sp>
+      <p:sp>
+        <p:nvSpPr>
+          <p:cNvPr id="61" name="Left-Right Arrow 17">
+            <a:extLst>
+              <a:ext uri="{FF2B5EF4-FFF2-40B4-BE49-F238E27FC236}">
+                <a16:creationId xmlns:a16="http://schemas.microsoft.com/office/drawing/2014/main" id="{C8683273-1A5A-4A25-8D3F-254DAE9A24C0}"/>
+              </a:ext>
+            </a:extLst>
+          </p:cNvPr>
+          <p:cNvSpPr/>
+          <p:nvPr/>
+        </p:nvSpPr>
+        <p:spPr>
+          <a:xfrm rot="3347420">
+            <a:off x="1986209" y="4210341"/>
+            <a:ext cx="1366982" cy="414350"/>
+          </a:xfrm>
+          <a:prstGeom prst="leftRightArrow">
+            <a:avLst/>
+          </a:prstGeom>
+          <a:solidFill>
+            <a:schemeClr val="accent2">
+              <a:lumMod val="75000"/>
+              <a:alpha val="34000"/>
+            </a:schemeClr>
+          </a:solidFill>
+          <a:ln>
+            <a:noFill/>
+          </a:ln>
+        </p:spPr>
+        <p:style>
+          <a:lnRef idx="2">
+            <a:schemeClr val="accent1">
+              <a:shade val="50000"/>
+            </a:schemeClr>
+          </a:lnRef>
+          <a:fillRef idx="1">
+            <a:schemeClr val="accent1"/>
+          </a:fillRef>
+          <a:effectRef idx="0">
+            <a:schemeClr val="accent1"/>
+          </a:effectRef>
+          <a:fontRef idx="minor">
+            <a:schemeClr val="lt1"/>
+          </a:fontRef>
+        </p:style>
+        <p:txBody>
+          <a:bodyPr vert="horz" rtlCol="0" anchor="ctr"/>
+          <a:lstStyle/>
+          <a:p>
+            <a:pPr algn="ctr"/>
+            <a:r>
+              <a:rPr lang="da-DK" dirty="0"/>
+              <a:t>TCP/IP</a:t>
+            </a:r>
+          </a:p>
+        </p:txBody>
+      </p:sp>
+      <p:sp>
+        <p:nvSpPr>
+          <p:cNvPr id="62" name="Left-Right Arrow 17">
+            <a:extLst>
+              <a:ext uri="{FF2B5EF4-FFF2-40B4-BE49-F238E27FC236}">
+                <a16:creationId xmlns:a16="http://schemas.microsoft.com/office/drawing/2014/main" id="{1A3A4A19-8426-4D51-8495-5247D437D0AE}"/>
+              </a:ext>
+            </a:extLst>
+          </p:cNvPr>
+          <p:cNvSpPr/>
+          <p:nvPr/>
+        </p:nvSpPr>
+        <p:spPr>
+          <a:xfrm rot="18366305">
+            <a:off x="3864338" y="4177000"/>
+            <a:ext cx="1366982" cy="414350"/>
+          </a:xfrm>
+          <a:prstGeom prst="leftRightArrow">
+            <a:avLst/>
+          </a:prstGeom>
+          <a:solidFill>
+            <a:schemeClr val="accent2">
+              <a:lumMod val="75000"/>
+              <a:alpha val="34000"/>
+            </a:schemeClr>
+          </a:solidFill>
+          <a:ln>
+            <a:noFill/>
+          </a:ln>
+        </p:spPr>
+        <p:style>
+          <a:lnRef idx="2">
+            <a:schemeClr val="accent1">
+              <a:shade val="50000"/>
+            </a:schemeClr>
+          </a:lnRef>
+          <a:fillRef idx="1">
+            <a:schemeClr val="accent1"/>
+          </a:fillRef>
+          <a:effectRef idx="0">
+            <a:schemeClr val="accent1"/>
+          </a:effectRef>
+          <a:fontRef idx="minor">
+            <a:schemeClr val="lt1"/>
+          </a:fontRef>
+        </p:style>
+        <p:txBody>
+          <a:bodyPr vert="horz" rtlCol="0" anchor="ctr"/>
+          <a:lstStyle/>
+          <a:p>
+            <a:pPr algn="ctr"/>
+            <a:r>
+              <a:rPr lang="da-DK" dirty="0"/>
+              <a:t>TCP/IP</a:t>
+            </a:r>
+          </a:p>
+        </p:txBody>
+      </p:sp>
+      <p:sp>
+        <p:nvSpPr>
+          <p:cNvPr id="63" name="Left-Right Arrow 17">
+            <a:extLst>
+              <a:ext uri="{FF2B5EF4-FFF2-40B4-BE49-F238E27FC236}">
+                <a16:creationId xmlns:a16="http://schemas.microsoft.com/office/drawing/2014/main" id="{B549E96F-9C0B-4BF5-A39C-8E73AA02CC5F}"/>
+              </a:ext>
+            </a:extLst>
+          </p:cNvPr>
+          <p:cNvSpPr/>
+          <p:nvPr/>
+        </p:nvSpPr>
+        <p:spPr>
+          <a:xfrm rot="3438753">
+            <a:off x="3644908" y="1820316"/>
+            <a:ext cx="1141925" cy="414350"/>
+          </a:xfrm>
+          <a:prstGeom prst="leftRightArrow">
+            <a:avLst/>
+          </a:prstGeom>
+          <a:solidFill>
+            <a:schemeClr val="accent2">
+              <a:lumMod val="75000"/>
+              <a:alpha val="34000"/>
+            </a:schemeClr>
+          </a:solidFill>
+          <a:ln>
+            <a:noFill/>
+          </a:ln>
+        </p:spPr>
+        <p:style>
+          <a:lnRef idx="2">
+            <a:schemeClr val="accent1">
+              <a:shade val="50000"/>
+            </a:schemeClr>
+          </a:lnRef>
+          <a:fillRef idx="1">
+            <a:schemeClr val="accent1"/>
+          </a:fillRef>
+          <a:effectRef idx="0">
+            <a:schemeClr val="accent1"/>
+          </a:effectRef>
+          <a:fontRef idx="minor">
+            <a:schemeClr val="lt1"/>
+          </a:fontRef>
+        </p:style>
+        <p:txBody>
+          <a:bodyPr vert="horz" rtlCol="0" anchor="ctr"/>
+          <a:lstStyle/>
+          <a:p>
+            <a:pPr algn="ctr"/>
+            <a:r>
+              <a:rPr lang="da-DK" dirty="0"/>
+              <a:t>HTTP</a:t>
+            </a:r>
+          </a:p>
+        </p:txBody>
+      </p:sp>
+      <p:sp>
+        <p:nvSpPr>
+          <p:cNvPr id="64" name="Left-Right Arrow 17">
+            <a:extLst>
+              <a:ext uri="{FF2B5EF4-FFF2-40B4-BE49-F238E27FC236}">
+                <a16:creationId xmlns:a16="http://schemas.microsoft.com/office/drawing/2014/main" id="{030E1B4E-69D1-4E96-827B-C60162237E00}"/>
+              </a:ext>
+            </a:extLst>
+          </p:cNvPr>
+          <p:cNvSpPr/>
+          <p:nvPr/>
+        </p:nvSpPr>
+        <p:spPr>
+          <a:xfrm rot="18483271">
+            <a:off x="2277895" y="1817313"/>
+            <a:ext cx="1366982" cy="414350"/>
+          </a:xfrm>
+          <a:prstGeom prst="leftRightArrow">
+            <a:avLst/>
+          </a:prstGeom>
+          <a:solidFill>
+            <a:schemeClr val="accent2">
+              <a:lumMod val="75000"/>
+              <a:alpha val="34000"/>
+            </a:schemeClr>
+          </a:solidFill>
+          <a:ln>
+            <a:noFill/>
+          </a:ln>
+        </p:spPr>
+        <p:style>
+          <a:lnRef idx="2">
+            <a:schemeClr val="accent1">
+              <a:shade val="50000"/>
+            </a:schemeClr>
+          </a:lnRef>
+          <a:fillRef idx="1">
+            <a:schemeClr val="accent1"/>
+          </a:fillRef>
+          <a:effectRef idx="0">
+            <a:schemeClr val="accent1"/>
+          </a:effectRef>
+          <a:fontRef idx="minor">
+            <a:schemeClr val="lt1"/>
+          </a:fontRef>
+        </p:style>
+        <p:txBody>
+          <a:bodyPr vert="horz" rtlCol="0" anchor="ctr"/>
+          <a:lstStyle/>
+          <a:p>
+            <a:pPr algn="ctr"/>
+            <a:r>
+              <a:rPr lang="da-DK" dirty="0"/>
+              <a:t>HTTP</a:t>
+            </a:r>
+          </a:p>
+        </p:txBody>
+      </p:sp>
+      <p:pic>
+        <p:nvPicPr>
+          <p:cNvPr id="1078" name="Picture 54" descr="Website Logo PNG, Web Site Logos Free Download - Free Transparent PNG Logos">
+            <a:extLst>
+              <a:ext uri="{FF2B5EF4-FFF2-40B4-BE49-F238E27FC236}">
+                <a16:creationId xmlns:a16="http://schemas.microsoft.com/office/drawing/2014/main" id="{20F9975E-8727-46E6-802F-4A37846B94D4}"/>
+              </a:ext>
+            </a:extLst>
+          </p:cNvPr>
+          <p:cNvPicPr>
+            <a:picLocks noChangeAspect="1" noChangeArrowheads="1"/>
+          </p:cNvPicPr>
+          <p:nvPr/>
+        </p:nvPicPr>
+        <p:blipFill>
+          <a:blip r:embed="rId7">
+            <a:lum bright="70000" contrast="-70000"/>
+            <a:extLst>
+              <a:ext uri="{28A0092B-C50C-407E-A947-70E740481C1C}">
+                <a14:useLocalDpi xmlns:a14="http://schemas.microsoft.com/office/drawing/2010/main" val="0"/>
+              </a:ext>
+            </a:extLst>
+          </a:blip>
+          <a:srcRect/>
+          <a:stretch>
+            <a:fillRect/>
+          </a:stretch>
+        </p:blipFill>
+        <p:spPr bwMode="auto">
+          <a:xfrm>
+            <a:off x="5309998" y="3203676"/>
+            <a:ext cx="483142" cy="483142"/>
+          </a:xfrm>
+          <a:prstGeom prst="rect">
+            <a:avLst/>
+          </a:prstGeom>
+          <a:noFill/>
+          <a:extLst>
+            <a:ext uri="{909E8E84-426E-40DD-AFC4-6F175D3DCCD1}">
+              <a14:hiddenFill xmlns:a14="http://schemas.microsoft.com/office/drawing/2010/main">
+                <a:solidFill>
+                  <a:srgbClr val="FFFFFF"/>
+                </a:solidFill>
+              </a14:hiddenFill>
+            </a:ext>
+          </a:extLst>
+        </p:spPr>
+      </p:pic>
+      <p:pic>
+        <p:nvPicPr>
+          <p:cNvPr id="1094" name="Picture 70" descr="Instructor Icon #273584 - Free Icons Library">
+            <a:extLst>
+              <a:ext uri="{FF2B5EF4-FFF2-40B4-BE49-F238E27FC236}">
+                <a16:creationId xmlns:a16="http://schemas.microsoft.com/office/drawing/2014/main" id="{A2690BBA-9B81-4255-A9B3-CA5C2DA80F37}"/>
+              </a:ext>
+            </a:extLst>
+          </p:cNvPr>
+          <p:cNvPicPr>
+            <a:picLocks noChangeAspect="1" noChangeArrowheads="1"/>
+          </p:cNvPicPr>
+          <p:nvPr/>
+        </p:nvPicPr>
+        <p:blipFill>
+          <a:blip r:embed="rId8">
+            <a:lum bright="70000" contrast="-70000"/>
+            <a:extLst>
+              <a:ext uri="{28A0092B-C50C-407E-A947-70E740481C1C}">
+                <a14:useLocalDpi xmlns:a14="http://schemas.microsoft.com/office/drawing/2010/main" val="0"/>
+              </a:ext>
+            </a:extLst>
+          </a:blip>
+          <a:srcRect/>
+          <a:stretch>
+            <a:fillRect/>
+          </a:stretch>
+        </p:blipFill>
+        <p:spPr bwMode="auto">
+          <a:xfrm>
+            <a:off x="8140340" y="3386450"/>
+            <a:ext cx="277763" cy="277763"/>
+          </a:xfrm>
+          <a:prstGeom prst="rect">
+            <a:avLst/>
+          </a:prstGeom>
+          <a:noFill/>
+          <a:extLst>
+            <a:ext uri="{909E8E84-426E-40DD-AFC4-6F175D3DCCD1}">
+              <a14:hiddenFill xmlns:a14="http://schemas.microsoft.com/office/drawing/2010/main">
+                <a:solidFill>
+                  <a:srgbClr val="FFFFFF"/>
+                </a:solidFill>
+              </a14:hiddenFill>
+            </a:ext>
+          </a:extLst>
+        </p:spPr>
+      </p:pic>
+      <p:pic>
+        <p:nvPicPr>
+          <p:cNvPr id="1102" name="Picture 78">
+            <a:extLst>
+              <a:ext uri="{FF2B5EF4-FFF2-40B4-BE49-F238E27FC236}">
+                <a16:creationId xmlns:a16="http://schemas.microsoft.com/office/drawing/2014/main" id="{67FA0FAF-B773-498A-80F2-7AA777BD32F1}"/>
+              </a:ext>
+            </a:extLst>
+          </p:cNvPr>
+          <p:cNvPicPr>
+            <a:picLocks noChangeAspect="1" noChangeArrowheads="1"/>
+          </p:cNvPicPr>
+          <p:nvPr/>
+        </p:nvPicPr>
+        <p:blipFill>
+          <a:blip r:embed="rId9">
+            <a:lum bright="70000" contrast="-70000"/>
+            <a:extLst>
+              <a:ext uri="{28A0092B-C50C-407E-A947-70E740481C1C}">
+                <a14:useLocalDpi xmlns:a14="http://schemas.microsoft.com/office/drawing/2010/main" val="0"/>
+              </a:ext>
+            </a:extLst>
+          </a:blip>
+          <a:srcRect/>
+          <a:stretch>
+            <a:fillRect/>
+          </a:stretch>
+        </p:blipFill>
+        <p:spPr bwMode="auto">
+          <a:xfrm>
+            <a:off x="2792180" y="3261765"/>
+            <a:ext cx="338412" cy="338412"/>
+          </a:xfrm>
+          <a:prstGeom prst="rect">
+            <a:avLst/>
+          </a:prstGeom>
+          <a:noFill/>
+          <a:extLst>
+            <a:ext uri="{909E8E84-426E-40DD-AFC4-6F175D3DCCD1}">
+              <a14:hiddenFill xmlns:a14="http://schemas.microsoft.com/office/drawing/2010/main">
+                <a:solidFill>
+                  <a:srgbClr val="FFFFFF"/>
+                </a:solidFill>
+              </a14:hiddenFill>
+            </a:ext>
+          </a:extLst>
+        </p:spPr>
+      </p:pic>
+      <p:pic>
+        <p:nvPicPr>
+          <p:cNvPr id="83" name="Picture 40" descr="PostgreSQL - Visual Studio Marketplace">
+            <a:extLst>
+              <a:ext uri="{FF2B5EF4-FFF2-40B4-BE49-F238E27FC236}">
+                <a16:creationId xmlns:a16="http://schemas.microsoft.com/office/drawing/2014/main" id="{1B2419CD-112D-49C0-9CDB-A232AC0FF7A9}"/>
+              </a:ext>
+            </a:extLst>
+          </p:cNvPr>
+          <p:cNvPicPr>
+            <a:picLocks noChangeAspect="1" noChangeArrowheads="1"/>
+          </p:cNvPicPr>
+          <p:nvPr/>
+        </p:nvPicPr>
+        <p:blipFill>
+          <a:blip r:embed="rId5">
+            <a:extLst>
+              <a:ext uri="{28A0092B-C50C-407E-A947-70E740481C1C}">
+                <a14:useLocalDpi xmlns:a14="http://schemas.microsoft.com/office/drawing/2010/main" val="0"/>
+              </a:ext>
+            </a:extLst>
+          </a:blip>
+          <a:srcRect/>
+          <a:stretch>
+            <a:fillRect/>
+          </a:stretch>
+        </p:blipFill>
+        <p:spPr bwMode="auto">
+          <a:xfrm>
+            <a:off x="3911228" y="5071861"/>
+            <a:ext cx="427167" cy="425505"/>
+          </a:xfrm>
+          <a:prstGeom prst="rect">
+            <a:avLst/>
+          </a:prstGeom>
+          <a:noFill/>
+          <a:extLst>
+            <a:ext uri="{909E8E84-426E-40DD-AFC4-6F175D3DCCD1}">
+              <a14:hiddenFill xmlns:a14="http://schemas.microsoft.com/office/drawing/2010/main">
+                <a:solidFill>
+                  <a:srgbClr val="FFFFFF"/>
+                </a:solidFill>
+              </a14:hiddenFill>
+            </a:ext>
+          </a:extLst>
+        </p:spPr>
+      </p:pic>
+      <p:pic>
+        <p:nvPicPr>
+          <p:cNvPr id="84" name="Picture 6">
+            <a:extLst>
+              <a:ext uri="{FF2B5EF4-FFF2-40B4-BE49-F238E27FC236}">
+                <a16:creationId xmlns:a16="http://schemas.microsoft.com/office/drawing/2014/main" id="{58384DCE-E146-43DA-A0B9-267ABE16AD03}"/>
+              </a:ext>
+            </a:extLst>
+          </p:cNvPr>
+          <p:cNvPicPr>
+            <a:picLocks noChangeAspect="1" noChangeArrowheads="1"/>
+          </p:cNvPicPr>
+          <p:nvPr/>
+        </p:nvPicPr>
+        <p:blipFill>
+          <a:blip r:embed="rId10">
+            <a:duotone>
+              <a:schemeClr val="accent3">
+                <a:shade val="45000"/>
+                <a:satMod val="135000"/>
+              </a:schemeClr>
+              <a:prstClr val="white"/>
+            </a:duotone>
+            <a:extLst>
+              <a:ext uri="{28A0092B-C50C-407E-A947-70E740481C1C}">
+                <a14:useLocalDpi xmlns:a14="http://schemas.microsoft.com/office/drawing/2010/main" val="0"/>
+              </a:ext>
+            </a:extLst>
+          </a:blip>
+          <a:srcRect/>
+          <a:stretch>
+            <a:fillRect/>
+          </a:stretch>
+        </p:blipFill>
+        <p:spPr bwMode="auto">
+          <a:xfrm>
+            <a:off x="3977685" y="1079554"/>
+            <a:ext cx="303920" cy="264278"/>
+          </a:xfrm>
+          <a:prstGeom prst="rect">
+            <a:avLst/>
+          </a:prstGeom>
+          <a:noFill/>
+          <a:extLst>
+            <a:ext uri="{909E8E84-426E-40DD-AFC4-6F175D3DCCD1}">
+              <a14:hiddenFill xmlns:a14="http://schemas.microsoft.com/office/drawing/2010/main">
+                <a:solidFill>
+                  <a:srgbClr val="FFFFFF"/>
+                </a:solidFill>
+              </a14:hiddenFill>
+            </a:ext>
+          </a:extLst>
+        </p:spPr>
+      </p:pic>
+    </p:spTree>
+    <p:extLst>
+      <p:ext uri="{BB962C8B-B14F-4D97-AF65-F5344CB8AC3E}">
+        <p14:creationId xmlns:p14="http://schemas.microsoft.com/office/powerpoint/2010/main" val="2664062567"/>
+      </p:ext>
+    </p:extLst>
+  </p:cSld>
+  <p:clrMapOvr>
+    <a:masterClrMapping/>
+  </p:clrMapOvr>
+</p:sld>
+</file>
+
+<file path=ppt/slides/slide3.xml><?xml version="1.0" encoding="utf-8"?>
+<p:sld xmlns:a="http://schemas.openxmlformats.org/drawingml/2006/main" xmlns:r="http://schemas.openxmlformats.org/officeDocument/2006/relationships" xmlns:p="http://schemas.openxmlformats.org/presentationml/2006/main">
+  <p:cSld>
+    <p:spTree>
+      <p:nvGrpSpPr>
+        <p:cNvPr id="1" name=""/>
+        <p:cNvGrpSpPr/>
+        <p:nvPr/>
+      </p:nvGrpSpPr>
+      <p:grpSpPr>
+        <a:xfrm>
+          <a:off x="0" y="0"/>
+          <a:ext cx="0" cy="0"/>
+          <a:chOff x="0" y="0"/>
+          <a:chExt cx="0" cy="0"/>
+        </a:xfrm>
+      </p:grpSpPr>
+      <p:sp>
+        <p:nvSpPr>
+          <p:cNvPr id="33" name="Hexagon 32">
+            <a:extLst>
+              <a:ext uri="{FF2B5EF4-FFF2-40B4-BE49-F238E27FC236}">
+                <a16:creationId xmlns:a16="http://schemas.microsoft.com/office/drawing/2014/main" id="{6B861DC0-D7AB-40A8-84F7-C91AE432A3EA}"/>
+              </a:ext>
+            </a:extLst>
+          </p:cNvPr>
+          <p:cNvSpPr/>
+          <p:nvPr/>
+        </p:nvSpPr>
+        <p:spPr>
+          <a:xfrm>
+            <a:off x="9516007" y="2793529"/>
+            <a:ext cx="2183907" cy="1154097"/>
+          </a:xfrm>
+          <a:prstGeom prst="hexagon">
+            <a:avLst/>
+          </a:prstGeom>
+        </p:spPr>
+        <p:style>
+          <a:lnRef idx="2">
+            <a:schemeClr val="accent1">
+              <a:shade val="50000"/>
+            </a:schemeClr>
+          </a:lnRef>
+          <a:fillRef idx="1">
+            <a:schemeClr val="accent1"/>
+          </a:fillRef>
+          <a:effectRef idx="0">
+            <a:schemeClr val="accent1"/>
+          </a:effectRef>
+          <a:fontRef idx="minor">
+            <a:schemeClr val="lt1"/>
+          </a:fontRef>
+        </p:style>
+        <p:txBody>
+          <a:bodyPr rtlCol="0" anchor="t"/>
+          <a:lstStyle/>
+          <a:p>
+            <a:pPr algn="ctr"/>
+            <a:r>
+              <a:rPr lang="en-US" dirty="0"/>
+              <a:t>Job</a:t>
+            </a:r>
+          </a:p>
+          <a:p>
+            <a:pPr algn="ctr"/>
+            <a:r>
+              <a:rPr lang="en-US" dirty="0"/>
+              <a:t>Host(s)</a:t>
+            </a:r>
+          </a:p>
+        </p:txBody>
+      </p:sp>
+      <p:sp>
+        <p:nvSpPr>
+          <p:cNvPr id="32" name="Hexagon 31">
+            <a:extLst>
+              <a:ext uri="{FF2B5EF4-FFF2-40B4-BE49-F238E27FC236}">
+                <a16:creationId xmlns:a16="http://schemas.microsoft.com/office/drawing/2014/main" id="{DF1C5BA5-91BF-4810-9871-95648B9EC31B}"/>
+              </a:ext>
+            </a:extLst>
+          </p:cNvPr>
+          <p:cNvSpPr/>
+          <p:nvPr/>
+        </p:nvSpPr>
+        <p:spPr>
+          <a:xfrm>
+            <a:off x="9363607" y="2641129"/>
+            <a:ext cx="2183907" cy="1154097"/>
+          </a:xfrm>
+          <a:prstGeom prst="hexagon">
+            <a:avLst/>
+          </a:prstGeom>
+        </p:spPr>
+        <p:style>
+          <a:lnRef idx="2">
+            <a:schemeClr val="accent1">
+              <a:shade val="50000"/>
+            </a:schemeClr>
+          </a:lnRef>
+          <a:fillRef idx="1">
+            <a:schemeClr val="accent1"/>
+          </a:fillRef>
+          <a:effectRef idx="0">
+            <a:schemeClr val="accent1"/>
+          </a:effectRef>
+          <a:fontRef idx="minor">
+            <a:schemeClr val="lt1"/>
+          </a:fontRef>
+        </p:style>
+        <p:txBody>
+          <a:bodyPr rtlCol="0" anchor="t"/>
+          <a:lstStyle/>
+          <a:p>
+            <a:pPr algn="ctr"/>
+            <a:r>
+              <a:rPr lang="en-US" dirty="0"/>
+              <a:t>Job</a:t>
+            </a:r>
+          </a:p>
+          <a:p>
+            <a:pPr algn="ctr"/>
+            <a:r>
+              <a:rPr lang="en-US" dirty="0"/>
+              <a:t>Host(s)</a:t>
+            </a:r>
+          </a:p>
+        </p:txBody>
+      </p:sp>
+      <p:sp>
+        <p:nvSpPr>
+          <p:cNvPr id="2" name="Hexagon 1">
+            <a:extLst>
+              <a:ext uri="{FF2B5EF4-FFF2-40B4-BE49-F238E27FC236}">
+                <a16:creationId xmlns:a16="http://schemas.microsoft.com/office/drawing/2014/main" id="{A031FB85-CE8A-4F94-93BB-A5E02875F809}"/>
+              </a:ext>
+            </a:extLst>
+          </p:cNvPr>
+          <p:cNvSpPr/>
+          <p:nvPr/>
+        </p:nvSpPr>
+        <p:spPr>
+          <a:xfrm>
+            <a:off x="1249415" y="2590326"/>
+            <a:ext cx="2183907" cy="1154097"/>
+          </a:xfrm>
+          <a:prstGeom prst="hexagon">
+            <a:avLst/>
+          </a:prstGeom>
+        </p:spPr>
+        <p:style>
+          <a:lnRef idx="2">
+            <a:schemeClr val="accent1">
+              <a:shade val="50000"/>
+            </a:schemeClr>
+          </a:lnRef>
+          <a:fillRef idx="1">
+            <a:schemeClr val="accent1"/>
+          </a:fillRef>
+          <a:effectRef idx="0">
+            <a:schemeClr val="accent1"/>
+          </a:effectRef>
+          <a:fontRef idx="minor">
+            <a:schemeClr val="lt1"/>
+          </a:fontRef>
+        </p:style>
+        <p:txBody>
+          <a:bodyPr rtlCol="0" anchor="ctr"/>
+          <a:lstStyle/>
+          <a:p>
+            <a:pPr algn="ctr"/>
+            <a:r>
+              <a:rPr lang="en-US" dirty="0"/>
+              <a:t>Authorization</a:t>
+            </a:r>
+          </a:p>
+          <a:p>
+            <a:pPr algn="ctr"/>
+            <a:r>
+              <a:rPr lang="en-US" dirty="0"/>
+              <a:t>Server</a:t>
+            </a:r>
+          </a:p>
+        </p:txBody>
+      </p:sp>
+      <p:sp>
+        <p:nvSpPr>
+          <p:cNvPr id="4" name="Hexagon 3">
+            <a:extLst>
+              <a:ext uri="{FF2B5EF4-FFF2-40B4-BE49-F238E27FC236}">
+                <a16:creationId xmlns:a16="http://schemas.microsoft.com/office/drawing/2014/main" id="{A63CA15E-0224-40D8-86D7-5F735740BC7E}"/>
+              </a:ext>
+            </a:extLst>
+          </p:cNvPr>
+          <p:cNvSpPr/>
+          <p:nvPr/>
+        </p:nvSpPr>
+        <p:spPr>
+          <a:xfrm>
+            <a:off x="3828379" y="2590326"/>
+            <a:ext cx="2183907" cy="1154097"/>
+          </a:xfrm>
+          <a:prstGeom prst="hexagon">
+            <a:avLst/>
+          </a:prstGeom>
+        </p:spPr>
+        <p:style>
+          <a:lnRef idx="2">
+            <a:schemeClr val="accent1">
+              <a:shade val="50000"/>
+            </a:schemeClr>
+          </a:lnRef>
+          <a:fillRef idx="1">
+            <a:schemeClr val="accent1"/>
+          </a:fillRef>
+          <a:effectRef idx="0">
+            <a:schemeClr val="accent1"/>
+          </a:effectRef>
+          <a:fontRef idx="minor">
+            <a:schemeClr val="lt1"/>
+          </a:fontRef>
+        </p:style>
+        <p:txBody>
+          <a:bodyPr rtlCol="0" anchor="ctr"/>
+          <a:lstStyle/>
+          <a:p>
+            <a:pPr algn="ctr"/>
+            <a:r>
+              <a:rPr lang="en-US" dirty="0"/>
+              <a:t>Web</a:t>
+            </a:r>
+          </a:p>
+          <a:p>
+            <a:pPr algn="ctr"/>
+            <a:r>
+              <a:rPr lang="en-US" dirty="0"/>
+              <a:t>Server</a:t>
+            </a:r>
+          </a:p>
+        </p:txBody>
+      </p:sp>
+      <p:sp>
+        <p:nvSpPr>
+          <p:cNvPr id="5" name="Rectangle 4">
+            <a:extLst>
+              <a:ext uri="{FF2B5EF4-FFF2-40B4-BE49-F238E27FC236}">
+                <a16:creationId xmlns:a16="http://schemas.microsoft.com/office/drawing/2014/main" id="{3007271D-1CB4-4B81-B3EB-1ADAEA050AD4}"/>
+              </a:ext>
+            </a:extLst>
+          </p:cNvPr>
+          <p:cNvSpPr/>
+          <p:nvPr/>
+        </p:nvSpPr>
+        <p:spPr>
+          <a:xfrm>
+            <a:off x="2857125" y="598881"/>
+            <a:ext cx="1491449" cy="807868"/>
+          </a:xfrm>
+          <a:prstGeom prst="rect">
+            <a:avLst/>
+          </a:prstGeom>
+        </p:spPr>
+        <p:style>
+          <a:lnRef idx="2">
+            <a:schemeClr val="accent1">
+              <a:shade val="50000"/>
+            </a:schemeClr>
+          </a:lnRef>
+          <a:fillRef idx="1">
+            <a:schemeClr val="accent1"/>
+          </a:fillRef>
+          <a:effectRef idx="0">
+            <a:schemeClr val="accent1"/>
+          </a:effectRef>
+          <a:fontRef idx="minor">
+            <a:schemeClr val="lt1"/>
+          </a:fontRef>
+        </p:style>
+        <p:txBody>
+          <a:bodyPr rtlCol="0" anchor="ctr"/>
+          <a:lstStyle/>
+          <a:p>
+            <a:pPr algn="ctr"/>
+            <a:r>
+              <a:rPr lang="en-US" dirty="0"/>
+              <a:t>Browser</a:t>
+            </a:r>
+          </a:p>
+        </p:txBody>
+      </p:sp>
+      <p:pic>
+        <p:nvPicPr>
+          <p:cNvPr id="6" name="Graphic 5" descr="User">
+            <a:extLst>
+              <a:ext uri="{FF2B5EF4-FFF2-40B4-BE49-F238E27FC236}">
+                <a16:creationId xmlns:a16="http://schemas.microsoft.com/office/drawing/2014/main" id="{4E835316-6967-4855-BD9B-641245368F02}"/>
+              </a:ext>
+            </a:extLst>
+          </p:cNvPr>
+          <p:cNvPicPr>
+            <a:picLocks noChangeAspect="1"/>
+          </p:cNvPicPr>
+          <p:nvPr/>
+        </p:nvPicPr>
+        <p:blipFill>
+          <a:blip r:embed="rId2">
+            <a:extLst>
+              <a:ext uri="{28A0092B-C50C-407E-A947-70E740481C1C}">
+                <a14:useLocalDpi xmlns:a14="http://schemas.microsoft.com/office/drawing/2010/main" val="0"/>
+              </a:ext>
+              <a:ext uri="{96DAC541-7B7A-43D3-8B79-37D633B846F1}">
+                <asvg:svgBlip xmlns:asvg="http://schemas.microsoft.com/office/drawing/2016/SVG/main" r:embed="rId3"/>
+              </a:ext>
+            </a:extLst>
+          </a:blip>
+          <a:stretch>
+            <a:fillRect/>
+          </a:stretch>
+        </p:blipFill>
+        <p:spPr>
+          <a:xfrm>
+            <a:off x="3346879" y="66558"/>
+            <a:ext cx="511939" cy="511939"/>
+          </a:xfrm>
+          <a:prstGeom prst="rect">
+            <a:avLst/>
+          </a:prstGeom>
+        </p:spPr>
+      </p:pic>
+      <p:sp>
+        <p:nvSpPr>
+          <p:cNvPr id="7" name="Hexagon 6">
+            <a:extLst>
+              <a:ext uri="{FF2B5EF4-FFF2-40B4-BE49-F238E27FC236}">
+                <a16:creationId xmlns:a16="http://schemas.microsoft.com/office/drawing/2014/main" id="{DFBE01BF-F36D-4682-8EA9-4DC077D1CFAA}"/>
+              </a:ext>
+            </a:extLst>
+          </p:cNvPr>
+          <p:cNvSpPr/>
+          <p:nvPr/>
+        </p:nvSpPr>
+        <p:spPr>
+          <a:xfrm>
+            <a:off x="6519793" y="2590325"/>
+            <a:ext cx="2183907" cy="1154097"/>
+          </a:xfrm>
+          <a:prstGeom prst="hexagon">
+            <a:avLst/>
+          </a:prstGeom>
+        </p:spPr>
+        <p:style>
+          <a:lnRef idx="2">
+            <a:schemeClr val="accent1">
+              <a:shade val="50000"/>
+            </a:schemeClr>
+          </a:lnRef>
+          <a:fillRef idx="1">
+            <a:schemeClr val="accent1"/>
+          </a:fillRef>
+          <a:effectRef idx="0">
+            <a:schemeClr val="accent1"/>
+          </a:effectRef>
+          <a:fontRef idx="minor">
+            <a:schemeClr val="lt1"/>
+          </a:fontRef>
+        </p:style>
+        <p:txBody>
+          <a:bodyPr rtlCol="0" anchor="ctr"/>
+          <a:lstStyle/>
+          <a:p>
+            <a:pPr algn="ctr"/>
+            <a:r>
+              <a:rPr lang="en-US" dirty="0"/>
+              <a:t>Job</a:t>
+            </a:r>
+          </a:p>
+          <a:p>
+            <a:pPr algn="ctr"/>
+            <a:r>
+              <a:rPr lang="en-US" dirty="0"/>
+              <a:t>Orchestrator</a:t>
+            </a:r>
+          </a:p>
+        </p:txBody>
+      </p:sp>
+      <p:sp>
+        <p:nvSpPr>
+          <p:cNvPr id="16" name="Cloud 15">
+            <a:extLst>
+              <a:ext uri="{FF2B5EF4-FFF2-40B4-BE49-F238E27FC236}">
+                <a16:creationId xmlns:a16="http://schemas.microsoft.com/office/drawing/2014/main" id="{3E1DB92C-1EA6-42F6-9871-363E36BB4CB1}"/>
+              </a:ext>
+            </a:extLst>
+          </p:cNvPr>
+          <p:cNvSpPr/>
+          <p:nvPr/>
+        </p:nvSpPr>
+        <p:spPr>
+          <a:xfrm>
+            <a:off x="6519793" y="5126665"/>
+            <a:ext cx="2691414" cy="942109"/>
+          </a:xfrm>
+          <a:prstGeom prst="cloud">
+            <a:avLst/>
+          </a:prstGeom>
+        </p:spPr>
+        <p:style>
+          <a:lnRef idx="2">
+            <a:schemeClr val="accent5">
+              <a:shade val="50000"/>
+            </a:schemeClr>
+          </a:lnRef>
+          <a:fillRef idx="1">
+            <a:schemeClr val="accent5"/>
+          </a:fillRef>
+          <a:effectRef idx="0">
+            <a:schemeClr val="accent5"/>
+          </a:effectRef>
+          <a:fontRef idx="minor">
+            <a:schemeClr val="lt1"/>
+          </a:fontRef>
+        </p:style>
+        <p:txBody>
+          <a:bodyPr rtlCol="0" anchor="ctr"/>
+          <a:lstStyle/>
+          <a:p>
+            <a:pPr algn="ctr"/>
+            <a:r>
+              <a:rPr lang="da-DK" dirty="0"/>
+              <a:t>MIKE Cloud</a:t>
+            </a:r>
+          </a:p>
+          <a:p>
+            <a:pPr algn="ctr"/>
+            <a:r>
+              <a:rPr lang="da-DK" dirty="0"/>
+              <a:t>Services</a:t>
+            </a:r>
+            <a:endParaRPr lang="en-US" dirty="0"/>
+          </a:p>
+        </p:txBody>
+      </p:sp>
+      <p:sp>
+        <p:nvSpPr>
+          <p:cNvPr id="31" name="Hexagon 30">
+            <a:extLst>
+              <a:ext uri="{FF2B5EF4-FFF2-40B4-BE49-F238E27FC236}">
+                <a16:creationId xmlns:a16="http://schemas.microsoft.com/office/drawing/2014/main" id="{D606B5F7-D31D-4495-9413-2BE80B39CF10}"/>
+              </a:ext>
+            </a:extLst>
+          </p:cNvPr>
+          <p:cNvSpPr/>
+          <p:nvPr/>
+        </p:nvSpPr>
+        <p:spPr>
+          <a:xfrm>
+            <a:off x="9211207" y="2488729"/>
+            <a:ext cx="2183907" cy="1154097"/>
+          </a:xfrm>
+          <a:prstGeom prst="hexagon">
+            <a:avLst/>
+          </a:prstGeom>
+        </p:spPr>
+        <p:style>
+          <a:lnRef idx="2">
+            <a:schemeClr val="accent1">
+              <a:shade val="50000"/>
+            </a:schemeClr>
+          </a:lnRef>
+          <a:fillRef idx="1">
+            <a:schemeClr val="accent1"/>
+          </a:fillRef>
+          <a:effectRef idx="0">
+            <a:schemeClr val="accent1"/>
+          </a:effectRef>
+          <a:fontRef idx="minor">
+            <a:schemeClr val="lt1"/>
+          </a:fontRef>
+        </p:style>
+        <p:txBody>
+          <a:bodyPr rtlCol="0" anchor="ctr"/>
+          <a:lstStyle/>
+          <a:p>
+            <a:pPr algn="ctr"/>
+            <a:r>
+              <a:rPr lang="en-US" dirty="0"/>
+              <a:t>Job</a:t>
+            </a:r>
+          </a:p>
+          <a:p>
+            <a:pPr algn="ctr"/>
+            <a:r>
+              <a:rPr lang="en-US" dirty="0"/>
+              <a:t>Host(s)</a:t>
+            </a:r>
+          </a:p>
+        </p:txBody>
+      </p:sp>
+      <p:sp>
+        <p:nvSpPr>
+          <p:cNvPr id="17" name="TextBox 16">
+            <a:extLst>
+              <a:ext uri="{FF2B5EF4-FFF2-40B4-BE49-F238E27FC236}">
+                <a16:creationId xmlns:a16="http://schemas.microsoft.com/office/drawing/2014/main" id="{E9B9D834-4803-4F5A-B332-7FC09DAE4BF8}"/>
+              </a:ext>
+            </a:extLst>
+          </p:cNvPr>
+          <p:cNvSpPr txBox="1"/>
+          <p:nvPr/>
+        </p:nvSpPr>
+        <p:spPr>
+          <a:xfrm>
+            <a:off x="279906" y="1721481"/>
+            <a:ext cx="2061462" cy="369332"/>
+          </a:xfrm>
+          <a:prstGeom prst="rect">
+            <a:avLst/>
+          </a:prstGeom>
+          <a:noFill/>
+        </p:spPr>
+        <p:txBody>
+          <a:bodyPr wrap="none" rtlCol="0">
+            <a:spAutoFit/>
+          </a:bodyPr>
+          <a:lstStyle/>
+          <a:p>
+            <a:r>
+              <a:rPr lang="en-US" dirty="0"/>
+              <a:t>Application Services</a:t>
+            </a:r>
+          </a:p>
+        </p:txBody>
+      </p:sp>
+      <p:sp>
+        <p:nvSpPr>
+          <p:cNvPr id="18" name="TextBox 17">
+            <a:extLst>
+              <a:ext uri="{FF2B5EF4-FFF2-40B4-BE49-F238E27FC236}">
+                <a16:creationId xmlns:a16="http://schemas.microsoft.com/office/drawing/2014/main" id="{AB559BFE-8A7A-4265-ACFC-E063FD565701}"/>
+              </a:ext>
+            </a:extLst>
+          </p:cNvPr>
+          <p:cNvSpPr txBox="1"/>
+          <p:nvPr/>
+        </p:nvSpPr>
+        <p:spPr>
+          <a:xfrm>
+            <a:off x="277277" y="4597408"/>
+            <a:ext cx="3241208" cy="369332"/>
+          </a:xfrm>
+          <a:prstGeom prst="rect">
+            <a:avLst/>
+          </a:prstGeom>
+          <a:noFill/>
+        </p:spPr>
+        <p:txBody>
+          <a:bodyPr wrap="square" rtlCol="0">
+            <a:spAutoFit/>
+          </a:bodyPr>
+          <a:lstStyle/>
+          <a:p>
+            <a:r>
+              <a:rPr lang="en-US" dirty="0"/>
+              <a:t>Infrastructure Services</a:t>
+            </a:r>
+          </a:p>
+        </p:txBody>
+      </p:sp>
+      <p:pic>
+        <p:nvPicPr>
+          <p:cNvPr id="1048" name="Picture 24" descr="execution Icon - Download execution Icon 3968542 | Noun Project">
+            <a:extLst>
+              <a:ext uri="{FF2B5EF4-FFF2-40B4-BE49-F238E27FC236}">
+                <a16:creationId xmlns:a16="http://schemas.microsoft.com/office/drawing/2014/main" id="{BA943559-E54F-4276-A171-8DDCA6FED754}"/>
+              </a:ext>
+            </a:extLst>
+          </p:cNvPr>
+          <p:cNvPicPr>
+            <a:picLocks noChangeAspect="1" noChangeArrowheads="1"/>
+          </p:cNvPicPr>
+          <p:nvPr/>
+        </p:nvPicPr>
+        <p:blipFill>
+          <a:blip r:embed="rId4">
+            <a:lum bright="70000" contrast="-70000"/>
+            <a:extLst>
+              <a:ext uri="{28A0092B-C50C-407E-A947-70E740481C1C}">
+                <a14:useLocalDpi xmlns:a14="http://schemas.microsoft.com/office/drawing/2010/main" val="0"/>
+              </a:ext>
+            </a:extLst>
+          </a:blip>
+          <a:srcRect/>
+          <a:stretch>
+            <a:fillRect/>
+          </a:stretch>
+        </p:blipFill>
+        <p:spPr bwMode="auto">
+          <a:xfrm>
+            <a:off x="10712462" y="3150618"/>
+            <a:ext cx="414350" cy="414350"/>
+          </a:xfrm>
+          <a:prstGeom prst="rect">
+            <a:avLst/>
+          </a:prstGeom>
+          <a:noFill/>
+          <a:extLst>
+            <a:ext uri="{909E8E84-426E-40DD-AFC4-6F175D3DCCD1}">
+              <a14:hiddenFill xmlns:a14="http://schemas.microsoft.com/office/drawing/2010/main">
+                <a:solidFill>
+                  <a:srgbClr val="FFFFFF"/>
+                </a:solidFill>
+              </a14:hiddenFill>
+            </a:ext>
+          </a:extLst>
+        </p:spPr>
+      </p:pic>
+      <p:sp>
+        <p:nvSpPr>
+          <p:cNvPr id="38" name="Cloud 37">
+            <a:extLst>
+              <a:ext uri="{FF2B5EF4-FFF2-40B4-BE49-F238E27FC236}">
+                <a16:creationId xmlns:a16="http://schemas.microsoft.com/office/drawing/2014/main" id="{69E5CFCB-AA52-47FD-9A8F-ACC0697DB7E3}"/>
+              </a:ext>
+            </a:extLst>
+          </p:cNvPr>
+          <p:cNvSpPr/>
+          <p:nvPr/>
+        </p:nvSpPr>
+        <p:spPr>
+          <a:xfrm>
+            <a:off x="2283477" y="5192879"/>
+            <a:ext cx="2802119" cy="942109"/>
+          </a:xfrm>
+          <a:prstGeom prst="cloud">
+            <a:avLst/>
+          </a:prstGeom>
+        </p:spPr>
+        <p:style>
+          <a:lnRef idx="2">
+            <a:schemeClr val="accent5">
+              <a:shade val="50000"/>
+            </a:schemeClr>
+          </a:lnRef>
+          <a:fillRef idx="1">
+            <a:schemeClr val="accent5"/>
+          </a:fillRef>
+          <a:effectRef idx="0">
+            <a:schemeClr val="accent5"/>
+          </a:effectRef>
+          <a:fontRef idx="minor">
+            <a:schemeClr val="lt1"/>
+          </a:fontRef>
+        </p:style>
+        <p:txBody>
+          <a:bodyPr rtlCol="0" anchor="ctr"/>
+          <a:lstStyle/>
+          <a:p>
+            <a:pPr algn="ctr"/>
+            <a:r>
+              <a:rPr lang="en-US" dirty="0"/>
+              <a:t>Azure </a:t>
+            </a:r>
+          </a:p>
+          <a:p>
+            <a:pPr algn="ctr"/>
+            <a:r>
+              <a:rPr lang="en-US" dirty="0"/>
+              <a:t>PostgreSQL</a:t>
+            </a:r>
+          </a:p>
+        </p:txBody>
+      </p:sp>
+      <p:pic>
+        <p:nvPicPr>
+          <p:cNvPr id="1064" name="Picture 40" descr="PostgreSQL - Visual Studio Marketplace">
+            <a:extLst>
+              <a:ext uri="{FF2B5EF4-FFF2-40B4-BE49-F238E27FC236}">
+                <a16:creationId xmlns:a16="http://schemas.microsoft.com/office/drawing/2014/main" id="{2538E492-03A8-4F2F-AB3F-C46B01AA39BA}"/>
+              </a:ext>
+            </a:extLst>
+          </p:cNvPr>
+          <p:cNvPicPr>
+            <a:picLocks noChangeAspect="1" noChangeArrowheads="1"/>
+          </p:cNvPicPr>
+          <p:nvPr/>
+        </p:nvPicPr>
+        <p:blipFill>
+          <a:blip r:embed="rId5">
+            <a:extLst>
+              <a:ext uri="{28A0092B-C50C-407E-A947-70E740481C1C}">
+                <a14:useLocalDpi xmlns:a14="http://schemas.microsoft.com/office/drawing/2010/main" val="0"/>
+              </a:ext>
+            </a:extLst>
+          </a:blip>
+          <a:srcRect/>
+          <a:stretch>
+            <a:fillRect/>
+          </a:stretch>
+        </p:blipFill>
+        <p:spPr bwMode="auto">
+          <a:xfrm>
+            <a:off x="2844402" y="5079405"/>
+            <a:ext cx="427167" cy="425505"/>
+          </a:xfrm>
+          <a:prstGeom prst="rect">
+            <a:avLst/>
+          </a:prstGeom>
+          <a:noFill/>
+          <a:extLst>
+            <a:ext uri="{909E8E84-426E-40DD-AFC4-6F175D3DCCD1}">
+              <a14:hiddenFill xmlns:a14="http://schemas.microsoft.com/office/drawing/2010/main">
+                <a:solidFill>
+                  <a:srgbClr val="FFFFFF"/>
+                </a:solidFill>
+              </a14:hiddenFill>
+            </a:ext>
+          </a:extLst>
+        </p:spPr>
+      </p:pic>
+      <p:pic>
+        <p:nvPicPr>
+          <p:cNvPr id="54" name="Picture 53">
+            <a:extLst>
+              <a:ext uri="{FF2B5EF4-FFF2-40B4-BE49-F238E27FC236}">
+                <a16:creationId xmlns:a16="http://schemas.microsoft.com/office/drawing/2014/main" id="{D3AA337A-2017-4525-A41C-CBBC9FA33F43}"/>
+              </a:ext>
+            </a:extLst>
+          </p:cNvPr>
+          <p:cNvPicPr>
+            <a:picLocks noChangeAspect="1"/>
+          </p:cNvPicPr>
+          <p:nvPr/>
+        </p:nvPicPr>
+        <p:blipFill>
+          <a:blip r:embed="rId6">
+            <a:extLst>
+              <a:ext uri="{28A0092B-C50C-407E-A947-70E740481C1C}">
+                <a14:useLocalDpi xmlns:a14="http://schemas.microsoft.com/office/drawing/2010/main" val="0"/>
+              </a:ext>
+            </a:extLst>
+          </a:blip>
+          <a:stretch>
+            <a:fillRect/>
+          </a:stretch>
+        </p:blipFill>
+        <p:spPr>
+          <a:xfrm>
+            <a:off x="8418102" y="5408432"/>
+            <a:ext cx="338463" cy="338463"/>
+          </a:xfrm>
+          <a:prstGeom prst="rect">
+            <a:avLst/>
+          </a:prstGeom>
+        </p:spPr>
+      </p:pic>
+      <p:sp>
+        <p:nvSpPr>
+          <p:cNvPr id="58" name="TextBox 57">
+            <a:extLst>
+              <a:ext uri="{FF2B5EF4-FFF2-40B4-BE49-F238E27FC236}">
+                <a16:creationId xmlns:a16="http://schemas.microsoft.com/office/drawing/2014/main" id="{CA289366-E694-40D4-8A9C-40CA1463A1E0}"/>
+              </a:ext>
+            </a:extLst>
+          </p:cNvPr>
+          <p:cNvSpPr txBox="1"/>
+          <p:nvPr/>
+        </p:nvSpPr>
+        <p:spPr>
+          <a:xfrm>
+            <a:off x="278311" y="1149823"/>
+            <a:ext cx="725968" cy="369332"/>
+          </a:xfrm>
+          <a:prstGeom prst="rect">
+            <a:avLst/>
+          </a:prstGeom>
+          <a:noFill/>
+        </p:spPr>
+        <p:txBody>
+          <a:bodyPr wrap="none" rtlCol="0">
+            <a:spAutoFit/>
+          </a:bodyPr>
+          <a:lstStyle/>
+          <a:p>
+            <a:r>
+              <a:rPr lang="en-US" dirty="0"/>
+              <a:t>Client</a:t>
+            </a:r>
+          </a:p>
+        </p:txBody>
+      </p:sp>
+      <p:cxnSp>
+        <p:nvCxnSpPr>
+          <p:cNvPr id="59" name="Straight Connector 58">
+            <a:extLst>
+              <a:ext uri="{FF2B5EF4-FFF2-40B4-BE49-F238E27FC236}">
+                <a16:creationId xmlns:a16="http://schemas.microsoft.com/office/drawing/2014/main" id="{5C3D7E9D-6FB2-4A6C-83F9-9612375FD9AB}"/>
+              </a:ext>
+            </a:extLst>
+          </p:cNvPr>
+          <p:cNvCxnSpPr/>
+          <p:nvPr/>
+        </p:nvCxnSpPr>
+        <p:spPr>
+          <a:xfrm flipV="1">
+            <a:off x="277277" y="1610339"/>
+            <a:ext cx="11413153" cy="15016"/>
+          </a:xfrm>
+          <a:prstGeom prst="line">
+            <a:avLst/>
+          </a:prstGeom>
+          <a:ln w="22225">
+            <a:prstDash val="dashDot"/>
+          </a:ln>
+        </p:spPr>
+        <p:style>
+          <a:lnRef idx="1">
+            <a:schemeClr val="accent1"/>
+          </a:lnRef>
+          <a:fillRef idx="0">
+            <a:schemeClr val="accent1"/>
+          </a:fillRef>
+          <a:effectRef idx="0">
+            <a:schemeClr val="accent1"/>
+          </a:effectRef>
+          <a:fontRef idx="minor">
+            <a:schemeClr val="tx1"/>
+          </a:fontRef>
+        </p:style>
+      </p:cxnSp>
+      <p:cxnSp>
+        <p:nvCxnSpPr>
+          <p:cNvPr id="60" name="Straight Connector 59">
+            <a:extLst>
+              <a:ext uri="{FF2B5EF4-FFF2-40B4-BE49-F238E27FC236}">
+                <a16:creationId xmlns:a16="http://schemas.microsoft.com/office/drawing/2014/main" id="{DDC59582-265B-46A0-A7AF-CA42707A5888}"/>
+              </a:ext>
+            </a:extLst>
+          </p:cNvPr>
+          <p:cNvCxnSpPr/>
+          <p:nvPr/>
+        </p:nvCxnSpPr>
+        <p:spPr>
+          <a:xfrm flipV="1">
+            <a:off x="389423" y="4532472"/>
+            <a:ext cx="11413153" cy="15016"/>
+          </a:xfrm>
+          <a:prstGeom prst="line">
+            <a:avLst/>
+          </a:prstGeom>
+          <a:ln w="22225">
+            <a:prstDash val="dashDot"/>
+          </a:ln>
+        </p:spPr>
+        <p:style>
+          <a:lnRef idx="1">
+            <a:schemeClr val="accent1"/>
+          </a:lnRef>
+          <a:fillRef idx="0">
+            <a:schemeClr val="accent1"/>
+          </a:fillRef>
+          <a:effectRef idx="0">
+            <a:schemeClr val="accent1"/>
+          </a:effectRef>
+          <a:fontRef idx="minor">
+            <a:schemeClr val="tx1"/>
+          </a:fontRef>
+        </p:style>
+      </p:cxnSp>
+      <p:sp>
+        <p:nvSpPr>
+          <p:cNvPr id="55" name="Left-Right Arrow 17">
+            <a:extLst>
+              <a:ext uri="{FF2B5EF4-FFF2-40B4-BE49-F238E27FC236}">
+                <a16:creationId xmlns:a16="http://schemas.microsoft.com/office/drawing/2014/main" id="{ABE45E40-EE61-440B-A09B-410A737ADD3D}"/>
+              </a:ext>
+            </a:extLst>
+          </p:cNvPr>
+          <p:cNvSpPr/>
+          <p:nvPr/>
+        </p:nvSpPr>
+        <p:spPr>
+          <a:xfrm rot="19322400">
+            <a:off x="8251179" y="4289955"/>
+            <a:ext cx="1486610" cy="414350"/>
+          </a:xfrm>
+          <a:prstGeom prst="leftRightArrow">
+            <a:avLst/>
+          </a:prstGeom>
+          <a:solidFill>
+            <a:schemeClr val="accent2">
+              <a:lumMod val="75000"/>
+              <a:alpha val="34000"/>
+            </a:schemeClr>
+          </a:solidFill>
+          <a:ln>
+            <a:noFill/>
+          </a:ln>
+        </p:spPr>
+        <p:style>
+          <a:lnRef idx="2">
+            <a:schemeClr val="accent1">
+              <a:shade val="50000"/>
+            </a:schemeClr>
+          </a:lnRef>
+          <a:fillRef idx="1">
+            <a:schemeClr val="accent1"/>
+          </a:fillRef>
+          <a:effectRef idx="0">
+            <a:schemeClr val="accent1"/>
+          </a:effectRef>
+          <a:fontRef idx="minor">
+            <a:schemeClr val="lt1"/>
+          </a:fontRef>
+        </p:style>
+        <p:txBody>
+          <a:bodyPr vert="horz" rtlCol="0" anchor="ctr"/>
+          <a:lstStyle/>
+          <a:p>
+            <a:pPr algn="ctr"/>
+            <a:r>
+              <a:rPr lang="da-DK" dirty="0"/>
+              <a:t>HTTP</a:t>
+            </a:r>
+          </a:p>
+        </p:txBody>
+      </p:sp>
+      <p:sp>
+        <p:nvSpPr>
+          <p:cNvPr id="56" name="Left-Right Arrow 17">
+            <a:extLst>
+              <a:ext uri="{FF2B5EF4-FFF2-40B4-BE49-F238E27FC236}">
+                <a16:creationId xmlns:a16="http://schemas.microsoft.com/office/drawing/2014/main" id="{62EDCDF8-6F80-419B-9C99-AC04106C7373}"/>
+              </a:ext>
+            </a:extLst>
+          </p:cNvPr>
+          <p:cNvSpPr/>
+          <p:nvPr/>
+        </p:nvSpPr>
+        <p:spPr>
+          <a:xfrm rot="2403080">
+            <a:off x="5495234" y="4208106"/>
+            <a:ext cx="1841075" cy="414350"/>
+          </a:xfrm>
+          <a:prstGeom prst="leftRightArrow">
+            <a:avLst/>
+          </a:prstGeom>
+          <a:solidFill>
+            <a:schemeClr val="accent2">
+              <a:lumMod val="75000"/>
+              <a:alpha val="34000"/>
+            </a:schemeClr>
+          </a:solidFill>
+          <a:ln>
+            <a:noFill/>
+          </a:ln>
+        </p:spPr>
+        <p:style>
+          <a:lnRef idx="2">
+            <a:schemeClr val="accent1">
+              <a:shade val="50000"/>
+            </a:schemeClr>
+          </a:lnRef>
+          <a:fillRef idx="1">
+            <a:schemeClr val="accent1"/>
+          </a:fillRef>
+          <a:effectRef idx="0">
+            <a:schemeClr val="accent1"/>
+          </a:effectRef>
+          <a:fontRef idx="minor">
+            <a:schemeClr val="lt1"/>
+          </a:fontRef>
+        </p:style>
+        <p:txBody>
+          <a:bodyPr vert="horz" rtlCol="0" anchor="ctr"/>
+          <a:lstStyle/>
+          <a:p>
+            <a:pPr algn="ctr"/>
+            <a:r>
+              <a:rPr lang="da-DK" dirty="0"/>
+              <a:t>HTTP</a:t>
+            </a:r>
+          </a:p>
+        </p:txBody>
+      </p:sp>
+      <p:sp>
+        <p:nvSpPr>
+          <p:cNvPr id="27" name="Left-Right Arrow 17">
+            <a:extLst>
+              <a:ext uri="{FF2B5EF4-FFF2-40B4-BE49-F238E27FC236}">
+                <a16:creationId xmlns:a16="http://schemas.microsoft.com/office/drawing/2014/main" id="{07905DD8-0F46-4927-89D5-96D69ECC7614}"/>
+              </a:ext>
+            </a:extLst>
+          </p:cNvPr>
+          <p:cNvSpPr/>
+          <p:nvPr/>
+        </p:nvSpPr>
+        <p:spPr>
+          <a:xfrm>
+            <a:off x="5623820" y="2915723"/>
+            <a:ext cx="1310011" cy="414350"/>
+          </a:xfrm>
+          <a:prstGeom prst="leftRightArrow">
+            <a:avLst/>
+          </a:prstGeom>
+          <a:solidFill>
+            <a:schemeClr val="accent2">
+              <a:lumMod val="75000"/>
+              <a:alpha val="34000"/>
+            </a:schemeClr>
+          </a:solidFill>
+          <a:ln>
+            <a:noFill/>
+          </a:ln>
+        </p:spPr>
+        <p:style>
+          <a:lnRef idx="2">
+            <a:schemeClr val="accent1">
+              <a:shade val="50000"/>
+            </a:schemeClr>
+          </a:lnRef>
+          <a:fillRef idx="1">
+            <a:schemeClr val="accent1"/>
+          </a:fillRef>
+          <a:effectRef idx="0">
+            <a:schemeClr val="accent1"/>
+          </a:effectRef>
+          <a:fontRef idx="minor">
+            <a:schemeClr val="lt1"/>
+          </a:fontRef>
+        </p:style>
+        <p:txBody>
+          <a:bodyPr vert="horz" rtlCol="0" anchor="ctr"/>
+          <a:lstStyle/>
+          <a:p>
+            <a:pPr algn="ctr"/>
+            <a:r>
+              <a:rPr lang="da-DK" dirty="0"/>
+              <a:t>HTTP</a:t>
+            </a:r>
+          </a:p>
+        </p:txBody>
+      </p:sp>
+      <p:sp>
+        <p:nvSpPr>
+          <p:cNvPr id="34" name="Left-Right Arrow 17">
+            <a:extLst>
+              <a:ext uri="{FF2B5EF4-FFF2-40B4-BE49-F238E27FC236}">
+                <a16:creationId xmlns:a16="http://schemas.microsoft.com/office/drawing/2014/main" id="{A778B68B-E19A-4317-A943-BD7E320D1154}"/>
+              </a:ext>
+            </a:extLst>
+          </p:cNvPr>
+          <p:cNvSpPr/>
+          <p:nvPr/>
+        </p:nvSpPr>
+        <p:spPr>
+          <a:xfrm>
+            <a:off x="8305806" y="2960198"/>
+            <a:ext cx="1366982" cy="414350"/>
+          </a:xfrm>
+          <a:prstGeom prst="leftRightArrow">
+            <a:avLst/>
+          </a:prstGeom>
+          <a:solidFill>
+            <a:schemeClr val="accent2">
+              <a:lumMod val="75000"/>
+              <a:alpha val="34000"/>
+            </a:schemeClr>
+          </a:solidFill>
+          <a:ln>
+            <a:noFill/>
+          </a:ln>
+        </p:spPr>
+        <p:style>
+          <a:lnRef idx="2">
+            <a:schemeClr val="accent1">
+              <a:shade val="50000"/>
+            </a:schemeClr>
+          </a:lnRef>
+          <a:fillRef idx="1">
+            <a:schemeClr val="accent1"/>
+          </a:fillRef>
+          <a:effectRef idx="0">
+            <a:schemeClr val="accent1"/>
+          </a:effectRef>
+          <a:fontRef idx="minor">
+            <a:schemeClr val="lt1"/>
+          </a:fontRef>
+        </p:style>
+        <p:txBody>
+          <a:bodyPr vert="horz" rtlCol="0" anchor="ctr"/>
+          <a:lstStyle/>
+          <a:p>
+            <a:pPr algn="ctr"/>
+            <a:r>
+              <a:rPr lang="da-DK" dirty="0"/>
+              <a:t>HTTP</a:t>
+            </a:r>
+          </a:p>
+        </p:txBody>
+      </p:sp>
+      <p:sp>
+        <p:nvSpPr>
+          <p:cNvPr id="47" name="Down Arrow 3">
+            <a:extLst>
+              <a:ext uri="{FF2B5EF4-FFF2-40B4-BE49-F238E27FC236}">
+                <a16:creationId xmlns:a16="http://schemas.microsoft.com/office/drawing/2014/main" id="{6AD66914-5313-4F8A-93ED-4D48B780F732}"/>
+              </a:ext>
+            </a:extLst>
+          </p:cNvPr>
+          <p:cNvSpPr/>
+          <p:nvPr/>
+        </p:nvSpPr>
+        <p:spPr>
+          <a:xfrm rot="8701885">
+            <a:off x="4460105" y="1340396"/>
+            <a:ext cx="461019" cy="1398136"/>
+          </a:xfrm>
+          <a:prstGeom prst="downArrow">
+            <a:avLst/>
+          </a:prstGeom>
+          <a:solidFill>
+            <a:schemeClr val="accent2">
+              <a:lumMod val="75000"/>
+              <a:alpha val="34000"/>
+            </a:schemeClr>
+          </a:solidFill>
+          <a:ln>
+            <a:noFill/>
+          </a:ln>
+        </p:spPr>
+        <p:style>
+          <a:lnRef idx="2">
+            <a:schemeClr val="accent1">
+              <a:shade val="50000"/>
+            </a:schemeClr>
+          </a:lnRef>
+          <a:fillRef idx="1">
+            <a:schemeClr val="accent1"/>
+          </a:fillRef>
+          <a:effectRef idx="0">
+            <a:schemeClr val="accent1"/>
+          </a:effectRef>
+          <a:fontRef idx="minor">
+            <a:schemeClr val="lt1"/>
+          </a:fontRef>
+        </p:style>
+        <p:txBody>
+          <a:bodyPr vert="vert270" rtlCol="0" anchor="ctr"/>
+          <a:lstStyle/>
+          <a:p>
+            <a:pPr algn="ctr"/>
+            <a:r>
+              <a:rPr lang="en-US" dirty="0"/>
+              <a:t>WebSocket</a:t>
+            </a:r>
+          </a:p>
+        </p:txBody>
+      </p:sp>
+      <p:sp>
+        <p:nvSpPr>
+          <p:cNvPr id="61" name="Left-Right Arrow 17">
+            <a:extLst>
+              <a:ext uri="{FF2B5EF4-FFF2-40B4-BE49-F238E27FC236}">
+                <a16:creationId xmlns:a16="http://schemas.microsoft.com/office/drawing/2014/main" id="{C8683273-1A5A-4A25-8D3F-254DAE9A24C0}"/>
+              </a:ext>
+            </a:extLst>
+          </p:cNvPr>
+          <p:cNvSpPr/>
+          <p:nvPr/>
+        </p:nvSpPr>
+        <p:spPr>
+          <a:xfrm rot="3347420">
+            <a:off x="1986209" y="4210341"/>
+            <a:ext cx="1366982" cy="414350"/>
+          </a:xfrm>
+          <a:prstGeom prst="leftRightArrow">
+            <a:avLst/>
+          </a:prstGeom>
+          <a:solidFill>
+            <a:schemeClr val="accent2">
+              <a:lumMod val="75000"/>
+              <a:alpha val="34000"/>
+            </a:schemeClr>
+          </a:solidFill>
+          <a:ln>
+            <a:noFill/>
+          </a:ln>
+        </p:spPr>
+        <p:style>
+          <a:lnRef idx="2">
+            <a:schemeClr val="accent1">
+              <a:shade val="50000"/>
+            </a:schemeClr>
+          </a:lnRef>
+          <a:fillRef idx="1">
+            <a:schemeClr val="accent1"/>
+          </a:fillRef>
+          <a:effectRef idx="0">
+            <a:schemeClr val="accent1"/>
+          </a:effectRef>
+          <a:fontRef idx="minor">
+            <a:schemeClr val="lt1"/>
+          </a:fontRef>
+        </p:style>
+        <p:txBody>
+          <a:bodyPr vert="horz" rtlCol="0" anchor="ctr"/>
+          <a:lstStyle/>
+          <a:p>
+            <a:pPr algn="ctr"/>
+            <a:r>
+              <a:rPr lang="da-DK" dirty="0"/>
+              <a:t>TCP/IP</a:t>
+            </a:r>
+          </a:p>
+        </p:txBody>
+      </p:sp>
+      <p:sp>
+        <p:nvSpPr>
+          <p:cNvPr id="62" name="Left-Right Arrow 17">
+            <a:extLst>
+              <a:ext uri="{FF2B5EF4-FFF2-40B4-BE49-F238E27FC236}">
+                <a16:creationId xmlns:a16="http://schemas.microsoft.com/office/drawing/2014/main" id="{1A3A4A19-8426-4D51-8495-5247D437D0AE}"/>
+              </a:ext>
+            </a:extLst>
+          </p:cNvPr>
+          <p:cNvSpPr/>
+          <p:nvPr/>
+        </p:nvSpPr>
+        <p:spPr>
+          <a:xfrm rot="18366305">
+            <a:off x="3864338" y="4177000"/>
+            <a:ext cx="1366982" cy="414350"/>
+          </a:xfrm>
+          <a:prstGeom prst="leftRightArrow">
+            <a:avLst/>
+          </a:prstGeom>
+          <a:solidFill>
+            <a:schemeClr val="accent2">
+              <a:lumMod val="75000"/>
+              <a:alpha val="34000"/>
+            </a:schemeClr>
+          </a:solidFill>
+          <a:ln>
+            <a:noFill/>
+          </a:ln>
+        </p:spPr>
+        <p:style>
+          <a:lnRef idx="2">
+            <a:schemeClr val="accent1">
+              <a:shade val="50000"/>
+            </a:schemeClr>
+          </a:lnRef>
+          <a:fillRef idx="1">
+            <a:schemeClr val="accent1"/>
+          </a:fillRef>
+          <a:effectRef idx="0">
+            <a:schemeClr val="accent1"/>
+          </a:effectRef>
+          <a:fontRef idx="minor">
+            <a:schemeClr val="lt1"/>
+          </a:fontRef>
+        </p:style>
+        <p:txBody>
+          <a:bodyPr vert="horz" rtlCol="0" anchor="ctr"/>
+          <a:lstStyle/>
+          <a:p>
+            <a:pPr algn="ctr"/>
+            <a:r>
+              <a:rPr lang="da-DK" dirty="0"/>
+              <a:t>TCP/IP</a:t>
+            </a:r>
+          </a:p>
+        </p:txBody>
+      </p:sp>
+      <p:sp>
+        <p:nvSpPr>
+          <p:cNvPr id="63" name="Left-Right Arrow 17">
+            <a:extLst>
+              <a:ext uri="{FF2B5EF4-FFF2-40B4-BE49-F238E27FC236}">
+                <a16:creationId xmlns:a16="http://schemas.microsoft.com/office/drawing/2014/main" id="{B549E96F-9C0B-4BF5-A39C-8E73AA02CC5F}"/>
+              </a:ext>
+            </a:extLst>
+          </p:cNvPr>
+          <p:cNvSpPr/>
+          <p:nvPr/>
+        </p:nvSpPr>
+        <p:spPr>
+          <a:xfrm rot="3438753">
+            <a:off x="3644908" y="1820316"/>
+            <a:ext cx="1141925" cy="414350"/>
+          </a:xfrm>
+          <a:prstGeom prst="leftRightArrow">
+            <a:avLst/>
+          </a:prstGeom>
+          <a:solidFill>
+            <a:schemeClr val="accent2">
+              <a:lumMod val="75000"/>
+              <a:alpha val="34000"/>
+            </a:schemeClr>
+          </a:solidFill>
+          <a:ln>
+            <a:noFill/>
+          </a:ln>
+        </p:spPr>
+        <p:style>
+          <a:lnRef idx="2">
+            <a:schemeClr val="accent1">
+              <a:shade val="50000"/>
+            </a:schemeClr>
+          </a:lnRef>
+          <a:fillRef idx="1">
+            <a:schemeClr val="accent1"/>
+          </a:fillRef>
+          <a:effectRef idx="0">
+            <a:schemeClr val="accent1"/>
+          </a:effectRef>
+          <a:fontRef idx="minor">
+            <a:schemeClr val="lt1"/>
+          </a:fontRef>
+        </p:style>
+        <p:txBody>
+          <a:bodyPr vert="horz" rtlCol="0" anchor="ctr"/>
+          <a:lstStyle/>
+          <a:p>
+            <a:pPr algn="ctr"/>
+            <a:r>
+              <a:rPr lang="da-DK" dirty="0"/>
+              <a:t>HTTP</a:t>
+            </a:r>
+          </a:p>
+        </p:txBody>
+      </p:sp>
+      <p:sp>
+        <p:nvSpPr>
+          <p:cNvPr id="64" name="Left-Right Arrow 17">
+            <a:extLst>
+              <a:ext uri="{FF2B5EF4-FFF2-40B4-BE49-F238E27FC236}">
+                <a16:creationId xmlns:a16="http://schemas.microsoft.com/office/drawing/2014/main" id="{030E1B4E-69D1-4E96-827B-C60162237E00}"/>
+              </a:ext>
+            </a:extLst>
+          </p:cNvPr>
+          <p:cNvSpPr/>
+          <p:nvPr/>
+        </p:nvSpPr>
+        <p:spPr>
+          <a:xfrm rot="18483271">
+            <a:off x="2277895" y="1817313"/>
+            <a:ext cx="1366982" cy="414350"/>
+          </a:xfrm>
+          <a:prstGeom prst="leftRightArrow">
+            <a:avLst/>
+          </a:prstGeom>
+          <a:solidFill>
+            <a:schemeClr val="accent2">
+              <a:lumMod val="75000"/>
+              <a:alpha val="34000"/>
+            </a:schemeClr>
+          </a:solidFill>
+          <a:ln>
+            <a:noFill/>
+          </a:ln>
+        </p:spPr>
+        <p:style>
+          <a:lnRef idx="2">
+            <a:schemeClr val="accent1">
+              <a:shade val="50000"/>
+            </a:schemeClr>
+          </a:lnRef>
+          <a:fillRef idx="1">
+            <a:schemeClr val="accent1"/>
+          </a:fillRef>
+          <a:effectRef idx="0">
+            <a:schemeClr val="accent1"/>
+          </a:effectRef>
+          <a:fontRef idx="minor">
+            <a:schemeClr val="lt1"/>
+          </a:fontRef>
+        </p:style>
+        <p:txBody>
+          <a:bodyPr vert="horz" rtlCol="0" anchor="ctr"/>
+          <a:lstStyle/>
+          <a:p>
+            <a:pPr algn="ctr"/>
+            <a:r>
+              <a:rPr lang="da-DK" dirty="0"/>
+              <a:t>HTTP</a:t>
+            </a:r>
+          </a:p>
+        </p:txBody>
+      </p:sp>
+      <p:pic>
+        <p:nvPicPr>
+          <p:cNvPr id="1078" name="Picture 54" descr="Website Logo PNG, Web Site Logos Free Download - Free Transparent PNG Logos">
+            <a:extLst>
+              <a:ext uri="{FF2B5EF4-FFF2-40B4-BE49-F238E27FC236}">
+                <a16:creationId xmlns:a16="http://schemas.microsoft.com/office/drawing/2014/main" id="{20F9975E-8727-46E6-802F-4A37846B94D4}"/>
+              </a:ext>
+            </a:extLst>
+          </p:cNvPr>
+          <p:cNvPicPr>
+            <a:picLocks noChangeAspect="1" noChangeArrowheads="1"/>
+          </p:cNvPicPr>
+          <p:nvPr/>
+        </p:nvPicPr>
+        <p:blipFill>
+          <a:blip r:embed="rId7">
+            <a:lum bright="70000" contrast="-70000"/>
+            <a:extLst>
+              <a:ext uri="{28A0092B-C50C-407E-A947-70E740481C1C}">
+                <a14:useLocalDpi xmlns:a14="http://schemas.microsoft.com/office/drawing/2010/main" val="0"/>
+              </a:ext>
+            </a:extLst>
+          </a:blip>
+          <a:srcRect/>
+          <a:stretch>
+            <a:fillRect/>
+          </a:stretch>
+        </p:blipFill>
+        <p:spPr bwMode="auto">
+          <a:xfrm>
+            <a:off x="5309998" y="3203676"/>
+            <a:ext cx="483142" cy="483142"/>
+          </a:xfrm>
+          <a:prstGeom prst="rect">
+            <a:avLst/>
+          </a:prstGeom>
+          <a:noFill/>
+          <a:extLst>
+            <a:ext uri="{909E8E84-426E-40DD-AFC4-6F175D3DCCD1}">
+              <a14:hiddenFill xmlns:a14="http://schemas.microsoft.com/office/drawing/2010/main">
+                <a:solidFill>
+                  <a:srgbClr val="FFFFFF"/>
+                </a:solidFill>
+              </a14:hiddenFill>
+            </a:ext>
+          </a:extLst>
+        </p:spPr>
+      </p:pic>
+      <p:pic>
+        <p:nvPicPr>
+          <p:cNvPr id="1094" name="Picture 70" descr="Instructor Icon #273584 - Free Icons Library">
+            <a:extLst>
+              <a:ext uri="{FF2B5EF4-FFF2-40B4-BE49-F238E27FC236}">
+                <a16:creationId xmlns:a16="http://schemas.microsoft.com/office/drawing/2014/main" id="{A2690BBA-9B81-4255-A9B3-CA5C2DA80F37}"/>
+              </a:ext>
+            </a:extLst>
+          </p:cNvPr>
+          <p:cNvPicPr>
+            <a:picLocks noChangeAspect="1" noChangeArrowheads="1"/>
+          </p:cNvPicPr>
+          <p:nvPr/>
+        </p:nvPicPr>
+        <p:blipFill>
+          <a:blip r:embed="rId8">
+            <a:lum bright="70000" contrast="-70000"/>
+            <a:extLst>
+              <a:ext uri="{28A0092B-C50C-407E-A947-70E740481C1C}">
+                <a14:useLocalDpi xmlns:a14="http://schemas.microsoft.com/office/drawing/2010/main" val="0"/>
+              </a:ext>
+            </a:extLst>
+          </a:blip>
+          <a:srcRect/>
+          <a:stretch>
+            <a:fillRect/>
+          </a:stretch>
+        </p:blipFill>
+        <p:spPr bwMode="auto">
+          <a:xfrm>
+            <a:off x="8140340" y="3386450"/>
+            <a:ext cx="277763" cy="277763"/>
+          </a:xfrm>
+          <a:prstGeom prst="rect">
+            <a:avLst/>
+          </a:prstGeom>
+          <a:noFill/>
+          <a:extLst>
+            <a:ext uri="{909E8E84-426E-40DD-AFC4-6F175D3DCCD1}">
+              <a14:hiddenFill xmlns:a14="http://schemas.microsoft.com/office/drawing/2010/main">
+                <a:solidFill>
+                  <a:srgbClr val="FFFFFF"/>
+                </a:solidFill>
+              </a14:hiddenFill>
+            </a:ext>
+          </a:extLst>
+        </p:spPr>
+      </p:pic>
+      <p:pic>
+        <p:nvPicPr>
+          <p:cNvPr id="1102" name="Picture 78">
+            <a:extLst>
+              <a:ext uri="{FF2B5EF4-FFF2-40B4-BE49-F238E27FC236}">
+                <a16:creationId xmlns:a16="http://schemas.microsoft.com/office/drawing/2014/main" id="{67FA0FAF-B773-498A-80F2-7AA777BD32F1}"/>
+              </a:ext>
+            </a:extLst>
+          </p:cNvPr>
+          <p:cNvPicPr>
+            <a:picLocks noChangeAspect="1" noChangeArrowheads="1"/>
+          </p:cNvPicPr>
+          <p:nvPr/>
+        </p:nvPicPr>
+        <p:blipFill>
+          <a:blip r:embed="rId9">
+            <a:lum bright="70000" contrast="-70000"/>
+            <a:extLst>
+              <a:ext uri="{28A0092B-C50C-407E-A947-70E740481C1C}">
+                <a14:useLocalDpi xmlns:a14="http://schemas.microsoft.com/office/drawing/2010/main" val="0"/>
+              </a:ext>
+            </a:extLst>
+          </a:blip>
+          <a:srcRect/>
+          <a:stretch>
+            <a:fillRect/>
+          </a:stretch>
+        </p:blipFill>
+        <p:spPr bwMode="auto">
+          <a:xfrm>
+            <a:off x="2792180" y="3261765"/>
+            <a:ext cx="338412" cy="338412"/>
+          </a:xfrm>
+          <a:prstGeom prst="rect">
+            <a:avLst/>
+          </a:prstGeom>
+          <a:noFill/>
+          <a:extLst>
+            <a:ext uri="{909E8E84-426E-40DD-AFC4-6F175D3DCCD1}">
+              <a14:hiddenFill xmlns:a14="http://schemas.microsoft.com/office/drawing/2010/main">
+                <a:solidFill>
+                  <a:srgbClr val="FFFFFF"/>
+                </a:solidFill>
+              </a14:hiddenFill>
+            </a:ext>
+          </a:extLst>
+        </p:spPr>
+      </p:pic>
+      <p:pic>
+        <p:nvPicPr>
+          <p:cNvPr id="83" name="Picture 40" descr="PostgreSQL - Visual Studio Marketplace">
+            <a:extLst>
+              <a:ext uri="{FF2B5EF4-FFF2-40B4-BE49-F238E27FC236}">
+                <a16:creationId xmlns:a16="http://schemas.microsoft.com/office/drawing/2014/main" id="{1B2419CD-112D-49C0-9CDB-A232AC0FF7A9}"/>
+              </a:ext>
+            </a:extLst>
+          </p:cNvPr>
+          <p:cNvPicPr>
+            <a:picLocks noChangeAspect="1" noChangeArrowheads="1"/>
+          </p:cNvPicPr>
+          <p:nvPr/>
+        </p:nvPicPr>
+        <p:blipFill>
+          <a:blip r:embed="rId5">
+            <a:extLst>
+              <a:ext uri="{28A0092B-C50C-407E-A947-70E740481C1C}">
+                <a14:useLocalDpi xmlns:a14="http://schemas.microsoft.com/office/drawing/2010/main" val="0"/>
+              </a:ext>
+            </a:extLst>
+          </a:blip>
+          <a:srcRect/>
+          <a:stretch>
+            <a:fillRect/>
+          </a:stretch>
+        </p:blipFill>
+        <p:spPr bwMode="auto">
+          <a:xfrm>
+            <a:off x="3911228" y="5071861"/>
+            <a:ext cx="427167" cy="425505"/>
+          </a:xfrm>
+          <a:prstGeom prst="rect">
+            <a:avLst/>
+          </a:prstGeom>
+          <a:noFill/>
+          <a:extLst>
+            <a:ext uri="{909E8E84-426E-40DD-AFC4-6F175D3DCCD1}">
+              <a14:hiddenFill xmlns:a14="http://schemas.microsoft.com/office/drawing/2010/main">
+                <a:solidFill>
+                  <a:srgbClr val="FFFFFF"/>
+                </a:solidFill>
+              </a14:hiddenFill>
+            </a:ext>
+          </a:extLst>
+        </p:spPr>
+      </p:pic>
+      <p:sp>
+        <p:nvSpPr>
+          <p:cNvPr id="3" name="Oval 2">
+            <a:extLst>
+              <a:ext uri="{FF2B5EF4-FFF2-40B4-BE49-F238E27FC236}">
+                <a16:creationId xmlns:a16="http://schemas.microsoft.com/office/drawing/2014/main" id="{CDBB5D37-2669-434F-8987-26A12560D984}"/>
+              </a:ext>
+            </a:extLst>
+          </p:cNvPr>
+          <p:cNvSpPr/>
+          <p:nvPr/>
+        </p:nvSpPr>
+        <p:spPr>
+          <a:xfrm>
+            <a:off x="1004279" y="1694428"/>
+            <a:ext cx="5229917" cy="2748263"/>
+          </a:xfrm>
+          <a:prstGeom prst="ellipse">
+            <a:avLst/>
+          </a:prstGeom>
+          <a:solidFill>
+            <a:schemeClr val="accent1">
+              <a:alpha val="26000"/>
+            </a:schemeClr>
+          </a:solidFill>
+          <a:ln>
+            <a:noFill/>
+          </a:ln>
+        </p:spPr>
+        <p:style>
+          <a:lnRef idx="2">
+            <a:schemeClr val="accent1">
+              <a:shade val="50000"/>
+            </a:schemeClr>
+          </a:lnRef>
+          <a:fillRef idx="1">
+            <a:schemeClr val="accent1"/>
+          </a:fillRef>
+          <a:effectRef idx="0">
+            <a:schemeClr val="accent1"/>
+          </a:effectRef>
+          <a:fontRef idx="minor">
+            <a:schemeClr val="lt1"/>
+          </a:fontRef>
+        </p:style>
+        <p:txBody>
+          <a:bodyPr rtlCol="0" anchor="ctr"/>
+          <a:lstStyle/>
+          <a:p>
+            <a:pPr algn="ctr"/>
+            <a:endParaRPr lang="en-US"/>
+          </a:p>
+        </p:txBody>
+      </p:sp>
+      <p:sp>
+        <p:nvSpPr>
+          <p:cNvPr id="9" name="TextBox 8">
+            <a:extLst>
+              <a:ext uri="{FF2B5EF4-FFF2-40B4-BE49-F238E27FC236}">
+                <a16:creationId xmlns:a16="http://schemas.microsoft.com/office/drawing/2014/main" id="{B1F6C9D7-2918-4AB0-93C0-D04AA91F8D76}"/>
+              </a:ext>
+            </a:extLst>
+          </p:cNvPr>
+          <p:cNvSpPr txBox="1"/>
+          <p:nvPr/>
+        </p:nvSpPr>
+        <p:spPr>
+          <a:xfrm>
+            <a:off x="5201070" y="708588"/>
+            <a:ext cx="6156301" cy="369332"/>
+          </a:xfrm>
+          <a:prstGeom prst="rect">
+            <a:avLst/>
+          </a:prstGeom>
+          <a:solidFill>
+            <a:schemeClr val="accent1">
+              <a:lumMod val="20000"/>
+              <a:lumOff val="80000"/>
+            </a:schemeClr>
+          </a:solidFill>
+          <a:ln>
+            <a:noFill/>
+          </a:ln>
+        </p:spPr>
+        <p:txBody>
+          <a:bodyPr wrap="none" rtlCol="0">
+            <a:spAutoFit/>
+          </a:bodyPr>
+          <a:lstStyle/>
+          <a:p>
+            <a:r>
+              <a:rPr lang="en-US" dirty="0"/>
+              <a:t>Module 2: Backend – basics (Web API and Authorization Server)</a:t>
+            </a:r>
+          </a:p>
+        </p:txBody>
+      </p:sp>
+      <p:cxnSp>
+        <p:nvCxnSpPr>
+          <p:cNvPr id="11" name="Straight Arrow Connector 10">
+            <a:extLst>
+              <a:ext uri="{FF2B5EF4-FFF2-40B4-BE49-F238E27FC236}">
+                <a16:creationId xmlns:a16="http://schemas.microsoft.com/office/drawing/2014/main" id="{EFD1DF66-D164-4343-97F3-726CC8CBD322}"/>
+              </a:ext>
+            </a:extLst>
+          </p:cNvPr>
+          <p:cNvCxnSpPr>
+            <a:cxnSpLocks/>
+            <a:stCxn id="9" idx="2"/>
+            <a:endCxn id="3" idx="7"/>
+          </p:cNvCxnSpPr>
+          <p:nvPr/>
+        </p:nvCxnSpPr>
+        <p:spPr>
+          <a:xfrm flipH="1">
+            <a:off x="5468292" y="1077920"/>
+            <a:ext cx="2810929" cy="1018982"/>
+          </a:xfrm>
+          <a:prstGeom prst="straightConnector1">
+            <a:avLst/>
+          </a:prstGeom>
+          <a:ln>
+            <a:solidFill>
+              <a:schemeClr val="accent1">
+                <a:lumMod val="40000"/>
+                <a:lumOff val="60000"/>
+              </a:schemeClr>
+            </a:solidFill>
+            <a:tailEnd type="none"/>
+          </a:ln>
+        </p:spPr>
+        <p:style>
+          <a:lnRef idx="1">
+            <a:schemeClr val="accent1"/>
+          </a:lnRef>
+          <a:fillRef idx="0">
+            <a:schemeClr val="accent1"/>
+          </a:fillRef>
+          <a:effectRef idx="0">
+            <a:schemeClr val="accent1"/>
+          </a:effectRef>
+          <a:fontRef idx="minor">
+            <a:schemeClr val="tx1"/>
+          </a:fontRef>
+        </p:style>
+      </p:cxnSp>
+      <p:pic>
+        <p:nvPicPr>
+          <p:cNvPr id="4102" name="Picture 6">
+            <a:extLst>
+              <a:ext uri="{FF2B5EF4-FFF2-40B4-BE49-F238E27FC236}">
+                <a16:creationId xmlns:a16="http://schemas.microsoft.com/office/drawing/2014/main" id="{8EB3AD0F-F93B-40BE-9578-6F68A1E41E63}"/>
+              </a:ext>
+            </a:extLst>
+          </p:cNvPr>
+          <p:cNvPicPr>
+            <a:picLocks noChangeAspect="1" noChangeArrowheads="1"/>
+          </p:cNvPicPr>
+          <p:nvPr/>
+        </p:nvPicPr>
+        <p:blipFill>
+          <a:blip r:embed="rId10">
+            <a:duotone>
+              <a:schemeClr val="accent3">
+                <a:shade val="45000"/>
+                <a:satMod val="135000"/>
+              </a:schemeClr>
+              <a:prstClr val="white"/>
+            </a:duotone>
+            <a:extLst>
+              <a:ext uri="{28A0092B-C50C-407E-A947-70E740481C1C}">
+                <a14:useLocalDpi xmlns:a14="http://schemas.microsoft.com/office/drawing/2010/main" val="0"/>
+              </a:ext>
+            </a:extLst>
+          </a:blip>
+          <a:srcRect/>
+          <a:stretch>
+            <a:fillRect/>
+          </a:stretch>
+        </p:blipFill>
+        <p:spPr bwMode="auto">
+          <a:xfrm>
+            <a:off x="3977685" y="1079554"/>
+            <a:ext cx="303920" cy="264278"/>
+          </a:xfrm>
+          <a:prstGeom prst="rect">
+            <a:avLst/>
+          </a:prstGeom>
+          <a:noFill/>
+          <a:extLst>
+            <a:ext uri="{909E8E84-426E-40DD-AFC4-6F175D3DCCD1}">
+              <a14:hiddenFill xmlns:a14="http://schemas.microsoft.com/office/drawing/2010/main">
+                <a:solidFill>
+                  <a:srgbClr val="FFFFFF"/>
+                </a:solidFill>
+              </a14:hiddenFill>
+            </a:ext>
+          </a:extLst>
+        </p:spPr>
+      </p:pic>
+      <p:sp>
+        <p:nvSpPr>
+          <p:cNvPr id="48" name="TextBox 47">
+            <a:extLst>
+              <a:ext uri="{FF2B5EF4-FFF2-40B4-BE49-F238E27FC236}">
+                <a16:creationId xmlns:a16="http://schemas.microsoft.com/office/drawing/2014/main" id="{D530F718-6631-42A6-BE2E-7FA9778E8AC4}"/>
+              </a:ext>
+            </a:extLst>
+          </p:cNvPr>
+          <p:cNvSpPr txBox="1"/>
+          <p:nvPr/>
+        </p:nvSpPr>
+        <p:spPr>
+          <a:xfrm>
+            <a:off x="5983853" y="880211"/>
+            <a:ext cx="4886146" cy="369332"/>
+          </a:xfrm>
+          <a:prstGeom prst="rect">
+            <a:avLst/>
+          </a:prstGeom>
+          <a:solidFill>
+            <a:schemeClr val="accent1">
+              <a:lumMod val="20000"/>
+              <a:lumOff val="80000"/>
+            </a:schemeClr>
+          </a:solidFill>
+          <a:ln>
+            <a:noFill/>
+          </a:ln>
+        </p:spPr>
+        <p:txBody>
+          <a:bodyPr wrap="none" rtlCol="0">
+            <a:spAutoFit/>
+          </a:bodyPr>
+          <a:lstStyle/>
+          <a:p>
+            <a:r>
+              <a:rPr lang="en-US" dirty="0"/>
+              <a:t>Module 3: Backend – advanced (Jobs &amp; Workflow)</a:t>
+            </a:r>
+          </a:p>
+        </p:txBody>
+      </p:sp>
+      <p:sp>
+        <p:nvSpPr>
+          <p:cNvPr id="49" name="TextBox 48">
+            <a:extLst>
+              <a:ext uri="{FF2B5EF4-FFF2-40B4-BE49-F238E27FC236}">
+                <a16:creationId xmlns:a16="http://schemas.microsoft.com/office/drawing/2014/main" id="{9A4A60C6-2062-40FD-A829-978FF428ED09}"/>
+              </a:ext>
+            </a:extLst>
+          </p:cNvPr>
+          <p:cNvSpPr txBox="1"/>
+          <p:nvPr/>
+        </p:nvSpPr>
+        <p:spPr>
+          <a:xfrm>
+            <a:off x="5728349" y="277136"/>
+            <a:ext cx="2831673" cy="369332"/>
+          </a:xfrm>
+          <a:prstGeom prst="rect">
+            <a:avLst/>
+          </a:prstGeom>
+          <a:solidFill>
+            <a:schemeClr val="accent1">
+              <a:lumMod val="20000"/>
+              <a:lumOff val="80000"/>
+            </a:schemeClr>
+          </a:solidFill>
+          <a:ln>
+            <a:noFill/>
+          </a:ln>
+        </p:spPr>
+        <p:txBody>
+          <a:bodyPr wrap="none" rtlCol="0">
+            <a:spAutoFit/>
+          </a:bodyPr>
+          <a:lstStyle/>
+          <a:p>
+            <a:r>
+              <a:rPr lang="en-US" dirty="0"/>
+              <a:t>Module 4: Frontend (React)</a:t>
+            </a:r>
+          </a:p>
+        </p:txBody>
+      </p:sp>
+      <p:sp>
+        <p:nvSpPr>
+          <p:cNvPr id="50" name="Oval 49">
+            <a:extLst>
+              <a:ext uri="{FF2B5EF4-FFF2-40B4-BE49-F238E27FC236}">
+                <a16:creationId xmlns:a16="http://schemas.microsoft.com/office/drawing/2014/main" id="{A0960FD7-3B2F-4735-AED2-505201BE71D2}"/>
+              </a:ext>
+            </a:extLst>
+          </p:cNvPr>
+          <p:cNvSpPr/>
+          <p:nvPr/>
+        </p:nvSpPr>
+        <p:spPr>
+          <a:xfrm>
+            <a:off x="6310661" y="1813929"/>
+            <a:ext cx="5587140" cy="2858707"/>
+          </a:xfrm>
+          <a:prstGeom prst="ellipse">
+            <a:avLst/>
+          </a:prstGeom>
+          <a:solidFill>
+            <a:schemeClr val="accent1">
+              <a:alpha val="26000"/>
+            </a:schemeClr>
+          </a:solidFill>
+          <a:ln>
+            <a:noFill/>
+          </a:ln>
+        </p:spPr>
+        <p:style>
+          <a:lnRef idx="2">
+            <a:schemeClr val="accent1">
+              <a:shade val="50000"/>
+            </a:schemeClr>
+          </a:lnRef>
+          <a:fillRef idx="1">
+            <a:schemeClr val="accent1"/>
+          </a:fillRef>
+          <a:effectRef idx="0">
+            <a:schemeClr val="accent1"/>
+          </a:effectRef>
+          <a:fontRef idx="minor">
+            <a:schemeClr val="lt1"/>
+          </a:fontRef>
+        </p:style>
+        <p:txBody>
+          <a:bodyPr rtlCol="0" anchor="ctr"/>
+          <a:lstStyle/>
+          <a:p>
+            <a:pPr algn="ctr"/>
+            <a:endParaRPr lang="en-US"/>
+          </a:p>
+        </p:txBody>
+      </p:sp>
+      <p:cxnSp>
+        <p:nvCxnSpPr>
+          <p:cNvPr id="51" name="Straight Arrow Connector 50">
+            <a:extLst>
+              <a:ext uri="{FF2B5EF4-FFF2-40B4-BE49-F238E27FC236}">
+                <a16:creationId xmlns:a16="http://schemas.microsoft.com/office/drawing/2014/main" id="{450F0A68-5656-428D-904B-645F00F6C10B}"/>
+              </a:ext>
+            </a:extLst>
+          </p:cNvPr>
+          <p:cNvCxnSpPr>
+            <a:cxnSpLocks/>
+            <a:stCxn id="48" idx="2"/>
+            <a:endCxn id="50" idx="0"/>
+          </p:cNvCxnSpPr>
+          <p:nvPr/>
+        </p:nvCxnSpPr>
+        <p:spPr>
+          <a:xfrm>
+            <a:off x="8426926" y="1249543"/>
+            <a:ext cx="677305" cy="564386"/>
+          </a:xfrm>
+          <a:prstGeom prst="straightConnector1">
+            <a:avLst/>
+          </a:prstGeom>
+          <a:ln>
+            <a:solidFill>
+              <a:schemeClr val="accent1">
+                <a:lumMod val="40000"/>
+                <a:lumOff val="60000"/>
+              </a:schemeClr>
+            </a:solidFill>
+            <a:tailEnd type="none"/>
+          </a:ln>
+        </p:spPr>
+        <p:style>
+          <a:lnRef idx="1">
+            <a:schemeClr val="accent1"/>
+          </a:lnRef>
+          <a:fillRef idx="0">
+            <a:schemeClr val="accent1"/>
+          </a:fillRef>
+          <a:effectRef idx="0">
+            <a:schemeClr val="accent1"/>
+          </a:effectRef>
+          <a:fontRef idx="minor">
+            <a:schemeClr val="tx1"/>
+          </a:fontRef>
+        </p:style>
+      </p:cxnSp>
+      <p:cxnSp>
+        <p:nvCxnSpPr>
+          <p:cNvPr id="57" name="Straight Arrow Connector 56">
+            <a:extLst>
+              <a:ext uri="{FF2B5EF4-FFF2-40B4-BE49-F238E27FC236}">
+                <a16:creationId xmlns:a16="http://schemas.microsoft.com/office/drawing/2014/main" id="{BCEF5E01-61AC-4F20-8090-FC04C374F89E}"/>
+              </a:ext>
+            </a:extLst>
+          </p:cNvPr>
+          <p:cNvCxnSpPr>
+            <a:cxnSpLocks/>
+            <a:stCxn id="49" idx="1"/>
+            <a:endCxn id="53" idx="6"/>
+          </p:cNvCxnSpPr>
+          <p:nvPr/>
+        </p:nvCxnSpPr>
+        <p:spPr>
+          <a:xfrm flipH="1">
+            <a:off x="4939407" y="461802"/>
+            <a:ext cx="788942" cy="451473"/>
+          </a:xfrm>
+          <a:prstGeom prst="straightConnector1">
+            <a:avLst/>
+          </a:prstGeom>
+          <a:ln>
+            <a:solidFill>
+              <a:schemeClr val="accent1">
+                <a:lumMod val="40000"/>
+                <a:lumOff val="60000"/>
+              </a:schemeClr>
+            </a:solidFill>
+            <a:tailEnd type="none"/>
+          </a:ln>
+        </p:spPr>
+        <p:style>
+          <a:lnRef idx="1">
+            <a:schemeClr val="accent1"/>
+          </a:lnRef>
+          <a:fillRef idx="0">
+            <a:schemeClr val="accent1"/>
+          </a:fillRef>
+          <a:effectRef idx="0">
+            <a:schemeClr val="accent1"/>
+          </a:effectRef>
+          <a:fontRef idx="minor">
+            <a:schemeClr val="tx1"/>
+          </a:fontRef>
+        </p:style>
+      </p:cxnSp>
+      <p:sp>
+        <p:nvSpPr>
+          <p:cNvPr id="53" name="Oval 52">
+            <a:extLst>
+              <a:ext uri="{FF2B5EF4-FFF2-40B4-BE49-F238E27FC236}">
+                <a16:creationId xmlns:a16="http://schemas.microsoft.com/office/drawing/2014/main" id="{C164EAD1-F4C0-458D-887B-EC22E32B2E53}"/>
+              </a:ext>
+            </a:extLst>
+          </p:cNvPr>
+          <p:cNvSpPr/>
+          <p:nvPr/>
+        </p:nvSpPr>
+        <p:spPr>
+          <a:xfrm>
+            <a:off x="2273363" y="74510"/>
+            <a:ext cx="2666044" cy="1677530"/>
+          </a:xfrm>
+          <a:prstGeom prst="ellipse">
+            <a:avLst/>
+          </a:prstGeom>
+          <a:solidFill>
+            <a:schemeClr val="accent1">
+              <a:alpha val="26000"/>
+            </a:schemeClr>
+          </a:solidFill>
+          <a:ln>
+            <a:noFill/>
+          </a:ln>
+        </p:spPr>
+        <p:style>
+          <a:lnRef idx="2">
+            <a:schemeClr val="accent1">
+              <a:shade val="50000"/>
+            </a:schemeClr>
+          </a:lnRef>
+          <a:fillRef idx="1">
+            <a:schemeClr val="accent1"/>
+          </a:fillRef>
+          <a:effectRef idx="0">
+            <a:schemeClr val="accent1"/>
+          </a:effectRef>
+          <a:fontRef idx="minor">
+            <a:schemeClr val="lt1"/>
+          </a:fontRef>
+        </p:style>
+        <p:txBody>
+          <a:bodyPr rtlCol="0" anchor="ctr"/>
+          <a:lstStyle/>
+          <a:p>
+            <a:pPr algn="ctr"/>
+            <a:endParaRPr lang="en-US"/>
+          </a:p>
+        </p:txBody>
+      </p:sp>
+    </p:spTree>
+    <p:extLst>
+      <p:ext uri="{BB962C8B-B14F-4D97-AF65-F5344CB8AC3E}">
+        <p14:creationId xmlns:p14="http://schemas.microsoft.com/office/powerpoint/2010/main" val="2952636918"/>
+      </p:ext>
+    </p:extLst>
+  </p:cSld>
+  <p:clrMapOvr>
+    <a:masterClrMapping/>
+  </p:clrMapOvr>
+  <p:timing>
+    <p:tnLst>
+      <p:par>
+        <p:cTn id="1" dur="indefinite" restart="never" nodeType="tmRoot">
+          <p:childTnLst>
+            <p:seq concurrent="1" nextAc="seek">
+              <p:cTn id="2" dur="indefinite" nodeType="mainSeq">
+                <p:childTnLst>
+                  <p:par>
+                    <p:cTn id="3" fill="hold">
+                      <p:stCondLst>
+                        <p:cond delay="indefinite"/>
+                      </p:stCondLst>
+                      <p:childTnLst>
+                        <p:par>
+                          <p:cTn id="4" fill="hold">
+                            <p:stCondLst>
+                              <p:cond delay="0"/>
+                            </p:stCondLst>
+                            <p:childTnLst>
+                              <p:par>
+                                <p:cTn id="5" presetID="10" presetClass="entr" presetSubtype="0" fill="hold" grpId="0" nodeType="clickEffect">
+                                  <p:stCondLst>
+                                    <p:cond delay="0"/>
+                                  </p:stCondLst>
+                                  <p:childTnLst>
+                                    <p:set>
+                                      <p:cBhvr>
+                                        <p:cTn id="6" dur="1" fill="hold">
+                                          <p:stCondLst>
+                                            <p:cond delay="0"/>
+                                          </p:stCondLst>
+                                        </p:cTn>
+                                        <p:tgtEl>
+                                          <p:spTgt spid="3"/>
+                                        </p:tgtEl>
+                                        <p:attrNameLst>
+                                          <p:attrName>style.visibility</p:attrName>
+                                        </p:attrNameLst>
+                                      </p:cBhvr>
+                                      <p:to>
+                                        <p:strVal val="visible"/>
+                                      </p:to>
+                                    </p:set>
+                                    <p:animEffect transition="in" filter="fade">
+                                      <p:cBhvr>
+                                        <p:cTn id="7" dur="500"/>
+                                        <p:tgtEl>
+                                          <p:spTgt spid="3"/>
+                                        </p:tgtEl>
+                                      </p:cBhvr>
+                                    </p:animEffect>
+                                  </p:childTnLst>
+                                </p:cTn>
+                              </p:par>
+                              <p:par>
+                                <p:cTn id="8" presetID="10" presetClass="entr" presetSubtype="0" fill="hold" nodeType="withEffect">
+                                  <p:stCondLst>
+                                    <p:cond delay="0"/>
+                                  </p:stCondLst>
+                                  <p:childTnLst>
+                                    <p:set>
+                                      <p:cBhvr>
+                                        <p:cTn id="9" dur="1" fill="hold">
+                                          <p:stCondLst>
+                                            <p:cond delay="0"/>
+                                          </p:stCondLst>
+                                        </p:cTn>
+                                        <p:tgtEl>
+                                          <p:spTgt spid="11"/>
+                                        </p:tgtEl>
+                                        <p:attrNameLst>
+                                          <p:attrName>style.visibility</p:attrName>
+                                        </p:attrNameLst>
+                                      </p:cBhvr>
+                                      <p:to>
+                                        <p:strVal val="visible"/>
+                                      </p:to>
+                                    </p:set>
+                                    <p:animEffect transition="in" filter="fade">
+                                      <p:cBhvr>
+                                        <p:cTn id="10" dur="500"/>
+                                        <p:tgtEl>
+                                          <p:spTgt spid="11"/>
+                                        </p:tgtEl>
+                                      </p:cBhvr>
+                                    </p:animEffect>
+                                  </p:childTnLst>
+                                </p:cTn>
+                              </p:par>
+                              <p:par>
+                                <p:cTn id="11" presetID="10" presetClass="entr" presetSubtype="0" fill="hold" grpId="0" nodeType="withEffect">
+                                  <p:stCondLst>
+                                    <p:cond delay="0"/>
+                                  </p:stCondLst>
+                                  <p:childTnLst>
+                                    <p:set>
+                                      <p:cBhvr>
+                                        <p:cTn id="12" dur="1" fill="hold">
+                                          <p:stCondLst>
+                                            <p:cond delay="0"/>
+                                          </p:stCondLst>
+                                        </p:cTn>
+                                        <p:tgtEl>
+                                          <p:spTgt spid="9"/>
+                                        </p:tgtEl>
+                                        <p:attrNameLst>
+                                          <p:attrName>style.visibility</p:attrName>
+                                        </p:attrNameLst>
+                                      </p:cBhvr>
+                                      <p:to>
+                                        <p:strVal val="visible"/>
+                                      </p:to>
+                                    </p:set>
+                                    <p:animEffect transition="in" filter="fade">
+                                      <p:cBhvr>
+                                        <p:cTn id="13" dur="500"/>
+                                        <p:tgtEl>
+                                          <p:spTgt spid="9"/>
+                                        </p:tgtEl>
+                                      </p:cBhvr>
+                                    </p:animEffect>
+                                  </p:childTnLst>
+                                </p:cTn>
+                              </p:par>
+                            </p:childTnLst>
+                          </p:cTn>
+                        </p:par>
+                      </p:childTnLst>
+                    </p:cTn>
+                  </p:par>
+                  <p:par>
+                    <p:cTn id="14" fill="hold">
+                      <p:stCondLst>
+                        <p:cond delay="indefinite"/>
+                      </p:stCondLst>
+                      <p:childTnLst>
+                        <p:par>
+                          <p:cTn id="15" fill="hold">
+                            <p:stCondLst>
+                              <p:cond delay="0"/>
+                            </p:stCondLst>
+                            <p:childTnLst>
+                              <p:par>
+                                <p:cTn id="16" presetID="10" presetClass="entr" presetSubtype="0" fill="hold" grpId="0" nodeType="clickEffect">
+                                  <p:stCondLst>
+                                    <p:cond delay="0"/>
+                                  </p:stCondLst>
+                                  <p:childTnLst>
+                                    <p:set>
+                                      <p:cBhvr>
+                                        <p:cTn id="17" dur="1" fill="hold">
+                                          <p:stCondLst>
+                                            <p:cond delay="0"/>
+                                          </p:stCondLst>
+                                        </p:cTn>
+                                        <p:tgtEl>
+                                          <p:spTgt spid="50"/>
+                                        </p:tgtEl>
+                                        <p:attrNameLst>
+                                          <p:attrName>style.visibility</p:attrName>
+                                        </p:attrNameLst>
+                                      </p:cBhvr>
+                                      <p:to>
+                                        <p:strVal val="visible"/>
+                                      </p:to>
+                                    </p:set>
+                                    <p:animEffect transition="in" filter="fade">
+                                      <p:cBhvr>
+                                        <p:cTn id="18" dur="500"/>
+                                        <p:tgtEl>
+                                          <p:spTgt spid="50"/>
+                                        </p:tgtEl>
+                                      </p:cBhvr>
+                                    </p:animEffect>
+                                  </p:childTnLst>
+                                </p:cTn>
+                              </p:par>
+                              <p:par>
+                                <p:cTn id="19" presetID="10" presetClass="entr" presetSubtype="0" fill="hold" nodeType="withEffect">
+                                  <p:stCondLst>
+                                    <p:cond delay="0"/>
+                                  </p:stCondLst>
+                                  <p:childTnLst>
+                                    <p:set>
+                                      <p:cBhvr>
+                                        <p:cTn id="20" dur="1" fill="hold">
+                                          <p:stCondLst>
+                                            <p:cond delay="0"/>
+                                          </p:stCondLst>
+                                        </p:cTn>
+                                        <p:tgtEl>
+                                          <p:spTgt spid="51"/>
+                                        </p:tgtEl>
+                                        <p:attrNameLst>
+                                          <p:attrName>style.visibility</p:attrName>
+                                        </p:attrNameLst>
+                                      </p:cBhvr>
+                                      <p:to>
+                                        <p:strVal val="visible"/>
+                                      </p:to>
+                                    </p:set>
+                                    <p:animEffect transition="in" filter="fade">
+                                      <p:cBhvr>
+                                        <p:cTn id="21" dur="500"/>
+                                        <p:tgtEl>
+                                          <p:spTgt spid="51"/>
+                                        </p:tgtEl>
+                                      </p:cBhvr>
+                                    </p:animEffect>
+                                  </p:childTnLst>
+                                </p:cTn>
+                              </p:par>
+                              <p:par>
+                                <p:cTn id="22" presetID="10" presetClass="entr" presetSubtype="0" fill="hold" grpId="0" nodeType="withEffect">
+                                  <p:stCondLst>
+                                    <p:cond delay="0"/>
+                                  </p:stCondLst>
+                                  <p:childTnLst>
+                                    <p:set>
+                                      <p:cBhvr>
+                                        <p:cTn id="23" dur="1" fill="hold">
+                                          <p:stCondLst>
+                                            <p:cond delay="0"/>
+                                          </p:stCondLst>
+                                        </p:cTn>
+                                        <p:tgtEl>
+                                          <p:spTgt spid="48"/>
+                                        </p:tgtEl>
+                                        <p:attrNameLst>
+                                          <p:attrName>style.visibility</p:attrName>
+                                        </p:attrNameLst>
+                                      </p:cBhvr>
+                                      <p:to>
+                                        <p:strVal val="visible"/>
+                                      </p:to>
+                                    </p:set>
+                                    <p:animEffect transition="in" filter="fade">
+                                      <p:cBhvr>
+                                        <p:cTn id="24" dur="500"/>
+                                        <p:tgtEl>
+                                          <p:spTgt spid="48"/>
+                                        </p:tgtEl>
+                                      </p:cBhvr>
+                                    </p:animEffect>
+                                  </p:childTnLst>
+                                </p:cTn>
+                              </p:par>
+                              <p:par>
+                                <p:cTn id="25" presetID="1" presetClass="exit" presetSubtype="0" fill="hold" grpId="1" nodeType="withEffect">
+                                  <p:stCondLst>
+                                    <p:cond delay="0"/>
+                                  </p:stCondLst>
+                                  <p:childTnLst>
+                                    <p:set>
+                                      <p:cBhvr>
+                                        <p:cTn id="26" dur="1" fill="hold">
+                                          <p:stCondLst>
+                                            <p:cond delay="0"/>
+                                          </p:stCondLst>
+                                        </p:cTn>
+                                        <p:tgtEl>
+                                          <p:spTgt spid="3"/>
+                                        </p:tgtEl>
+                                        <p:attrNameLst>
+                                          <p:attrName>style.visibility</p:attrName>
+                                        </p:attrNameLst>
+                                      </p:cBhvr>
+                                      <p:to>
+                                        <p:strVal val="hidden"/>
+                                      </p:to>
+                                    </p:set>
+                                  </p:childTnLst>
+                                </p:cTn>
+                              </p:par>
+                              <p:par>
+                                <p:cTn id="27" presetID="1" presetClass="exit" presetSubtype="0" fill="hold" nodeType="withEffect">
+                                  <p:stCondLst>
+                                    <p:cond delay="0"/>
+                                  </p:stCondLst>
+                                  <p:childTnLst>
+                                    <p:set>
+                                      <p:cBhvr>
+                                        <p:cTn id="28" dur="1" fill="hold">
+                                          <p:stCondLst>
+                                            <p:cond delay="0"/>
+                                          </p:stCondLst>
+                                        </p:cTn>
+                                        <p:tgtEl>
+                                          <p:spTgt spid="11"/>
+                                        </p:tgtEl>
+                                        <p:attrNameLst>
+                                          <p:attrName>style.visibility</p:attrName>
+                                        </p:attrNameLst>
+                                      </p:cBhvr>
+                                      <p:to>
+                                        <p:strVal val="hidden"/>
+                                      </p:to>
+                                    </p:set>
+                                  </p:childTnLst>
+                                </p:cTn>
+                              </p:par>
+                              <p:par>
+                                <p:cTn id="29" presetID="1" presetClass="exit" presetSubtype="0" fill="hold" grpId="1" nodeType="withEffect">
+                                  <p:stCondLst>
+                                    <p:cond delay="0"/>
+                                  </p:stCondLst>
+                                  <p:childTnLst>
+                                    <p:set>
+                                      <p:cBhvr>
+                                        <p:cTn id="30" dur="1" fill="hold">
+                                          <p:stCondLst>
+                                            <p:cond delay="0"/>
+                                          </p:stCondLst>
+                                        </p:cTn>
+                                        <p:tgtEl>
+                                          <p:spTgt spid="9"/>
+                                        </p:tgtEl>
+                                        <p:attrNameLst>
+                                          <p:attrName>style.visibility</p:attrName>
+                                        </p:attrNameLst>
+                                      </p:cBhvr>
+                                      <p:to>
+                                        <p:strVal val="hidden"/>
+                                      </p:to>
+                                    </p:set>
+                                  </p:childTnLst>
+                                </p:cTn>
+                              </p:par>
+                            </p:childTnLst>
+                          </p:cTn>
+                        </p:par>
+                      </p:childTnLst>
+                    </p:cTn>
+                  </p:par>
+                  <p:par>
+                    <p:cTn id="31" fill="hold">
+                      <p:stCondLst>
+                        <p:cond delay="indefinite"/>
+                      </p:stCondLst>
+                      <p:childTnLst>
+                        <p:par>
+                          <p:cTn id="32" fill="hold">
+                            <p:stCondLst>
+                              <p:cond delay="0"/>
+                            </p:stCondLst>
+                            <p:childTnLst>
+                              <p:par>
+                                <p:cTn id="33" presetID="10" presetClass="entr" presetSubtype="0" fill="hold" grpId="0" nodeType="clickEffect">
+                                  <p:stCondLst>
+                                    <p:cond delay="0"/>
+                                  </p:stCondLst>
+                                  <p:childTnLst>
+                                    <p:set>
+                                      <p:cBhvr>
+                                        <p:cTn id="34" dur="1" fill="hold">
+                                          <p:stCondLst>
+                                            <p:cond delay="0"/>
+                                          </p:stCondLst>
+                                        </p:cTn>
+                                        <p:tgtEl>
+                                          <p:spTgt spid="53"/>
+                                        </p:tgtEl>
+                                        <p:attrNameLst>
+                                          <p:attrName>style.visibility</p:attrName>
+                                        </p:attrNameLst>
+                                      </p:cBhvr>
+                                      <p:to>
+                                        <p:strVal val="visible"/>
+                                      </p:to>
+                                    </p:set>
+                                    <p:animEffect transition="in" filter="fade">
+                                      <p:cBhvr>
+                                        <p:cTn id="35" dur="500"/>
+                                        <p:tgtEl>
+                                          <p:spTgt spid="53"/>
+                                        </p:tgtEl>
+                                      </p:cBhvr>
+                                    </p:animEffect>
+                                  </p:childTnLst>
+                                </p:cTn>
+                              </p:par>
+                              <p:par>
+                                <p:cTn id="36" presetID="10" presetClass="entr" presetSubtype="0" fill="hold" nodeType="withEffect">
+                                  <p:stCondLst>
+                                    <p:cond delay="0"/>
+                                  </p:stCondLst>
+                                  <p:childTnLst>
+                                    <p:set>
+                                      <p:cBhvr>
+                                        <p:cTn id="37" dur="1" fill="hold">
+                                          <p:stCondLst>
+                                            <p:cond delay="0"/>
+                                          </p:stCondLst>
+                                        </p:cTn>
+                                        <p:tgtEl>
+                                          <p:spTgt spid="57"/>
+                                        </p:tgtEl>
+                                        <p:attrNameLst>
+                                          <p:attrName>style.visibility</p:attrName>
+                                        </p:attrNameLst>
+                                      </p:cBhvr>
+                                      <p:to>
+                                        <p:strVal val="visible"/>
+                                      </p:to>
+                                    </p:set>
+                                    <p:animEffect transition="in" filter="fade">
+                                      <p:cBhvr>
+                                        <p:cTn id="38" dur="500"/>
+                                        <p:tgtEl>
+                                          <p:spTgt spid="57"/>
+                                        </p:tgtEl>
+                                      </p:cBhvr>
+                                    </p:animEffect>
+                                  </p:childTnLst>
+                                </p:cTn>
+                              </p:par>
+                              <p:par>
+                                <p:cTn id="39" presetID="10" presetClass="entr" presetSubtype="0" fill="hold" grpId="0" nodeType="withEffect">
+                                  <p:stCondLst>
+                                    <p:cond delay="0"/>
+                                  </p:stCondLst>
+                                  <p:childTnLst>
+                                    <p:set>
+                                      <p:cBhvr>
+                                        <p:cTn id="40" dur="1" fill="hold">
+                                          <p:stCondLst>
+                                            <p:cond delay="0"/>
+                                          </p:stCondLst>
+                                        </p:cTn>
+                                        <p:tgtEl>
+                                          <p:spTgt spid="49"/>
+                                        </p:tgtEl>
+                                        <p:attrNameLst>
+                                          <p:attrName>style.visibility</p:attrName>
+                                        </p:attrNameLst>
+                                      </p:cBhvr>
+                                      <p:to>
+                                        <p:strVal val="visible"/>
+                                      </p:to>
+                                    </p:set>
+                                    <p:animEffect transition="in" filter="fade">
+                                      <p:cBhvr>
+                                        <p:cTn id="41" dur="500"/>
+                                        <p:tgtEl>
+                                          <p:spTgt spid="49"/>
+                                        </p:tgtEl>
+                                      </p:cBhvr>
+                                    </p:animEffect>
+                                  </p:childTnLst>
+                                </p:cTn>
+                              </p:par>
+                              <p:par>
+                                <p:cTn id="42" presetID="1" presetClass="exit" presetSubtype="0" fill="hold" grpId="1" nodeType="withEffect">
+                                  <p:stCondLst>
+                                    <p:cond delay="0"/>
+                                  </p:stCondLst>
+                                  <p:childTnLst>
+                                    <p:set>
+                                      <p:cBhvr>
+                                        <p:cTn id="43" dur="1" fill="hold">
+                                          <p:stCondLst>
+                                            <p:cond delay="0"/>
+                                          </p:stCondLst>
+                                        </p:cTn>
+                                        <p:tgtEl>
+                                          <p:spTgt spid="50"/>
+                                        </p:tgtEl>
+                                        <p:attrNameLst>
+                                          <p:attrName>style.visibility</p:attrName>
+                                        </p:attrNameLst>
+                                      </p:cBhvr>
+                                      <p:to>
+                                        <p:strVal val="hidden"/>
+                                      </p:to>
+                                    </p:set>
+                                  </p:childTnLst>
+                                </p:cTn>
+                              </p:par>
+                              <p:par>
+                                <p:cTn id="44" presetID="1" presetClass="exit" presetSubtype="0" fill="hold" nodeType="withEffect">
+                                  <p:stCondLst>
+                                    <p:cond delay="0"/>
+                                  </p:stCondLst>
+                                  <p:childTnLst>
+                                    <p:set>
+                                      <p:cBhvr>
+                                        <p:cTn id="45" dur="1" fill="hold">
+                                          <p:stCondLst>
+                                            <p:cond delay="0"/>
+                                          </p:stCondLst>
+                                        </p:cTn>
+                                        <p:tgtEl>
+                                          <p:spTgt spid="51"/>
+                                        </p:tgtEl>
+                                        <p:attrNameLst>
+                                          <p:attrName>style.visibility</p:attrName>
+                                        </p:attrNameLst>
+                                      </p:cBhvr>
+                                      <p:to>
+                                        <p:strVal val="hidden"/>
+                                      </p:to>
+                                    </p:set>
+                                  </p:childTnLst>
+                                </p:cTn>
+                              </p:par>
+                              <p:par>
+                                <p:cTn id="46" presetID="1" presetClass="exit" presetSubtype="0" fill="hold" grpId="1" nodeType="withEffect">
+                                  <p:stCondLst>
+                                    <p:cond delay="0"/>
+                                  </p:stCondLst>
+                                  <p:childTnLst>
+                                    <p:set>
+                                      <p:cBhvr>
+                                        <p:cTn id="47" dur="1" fill="hold">
+                                          <p:stCondLst>
+                                            <p:cond delay="0"/>
+                                          </p:stCondLst>
+                                        </p:cTn>
+                                        <p:tgtEl>
+                                          <p:spTgt spid="48"/>
+                                        </p:tgtEl>
+                                        <p:attrNameLst>
+                                          <p:attrName>style.visibility</p:attrName>
+                                        </p:attrNameLst>
+                                      </p:cBhvr>
+                                      <p:to>
+                                        <p:strVal val="hidden"/>
+                                      </p:to>
+                                    </p:set>
+                                  </p:childTnLst>
+                                </p:cTn>
+                              </p:par>
+                            </p:childTnLst>
+                          </p:cTn>
+                        </p:par>
+                      </p:childTnLst>
+                    </p:cTn>
+                  </p:par>
+                  <p:par>
+                    <p:cTn id="48" fill="hold">
+                      <p:stCondLst>
+                        <p:cond delay="indefinite"/>
+                      </p:stCondLst>
+                      <p:childTnLst>
+                        <p:par>
+                          <p:cTn id="49" fill="hold">
+                            <p:stCondLst>
+                              <p:cond delay="0"/>
+                            </p:stCondLst>
+                            <p:childTnLst>
+                              <p:par>
+                                <p:cTn id="50" presetID="1" presetClass="exit" presetSubtype="0" fill="hold" grpId="1" nodeType="clickEffect">
+                                  <p:stCondLst>
+                                    <p:cond delay="0"/>
+                                  </p:stCondLst>
+                                  <p:childTnLst>
+                                    <p:set>
+                                      <p:cBhvr>
+                                        <p:cTn id="51" dur="1" fill="hold">
+                                          <p:stCondLst>
+                                            <p:cond delay="0"/>
+                                          </p:stCondLst>
+                                        </p:cTn>
+                                        <p:tgtEl>
+                                          <p:spTgt spid="53"/>
+                                        </p:tgtEl>
+                                        <p:attrNameLst>
+                                          <p:attrName>style.visibility</p:attrName>
+                                        </p:attrNameLst>
+                                      </p:cBhvr>
+                                      <p:to>
+                                        <p:strVal val="hidden"/>
+                                      </p:to>
+                                    </p:set>
+                                  </p:childTnLst>
+                                </p:cTn>
+                              </p:par>
+                              <p:par>
+                                <p:cTn id="52" presetID="1" presetClass="exit" presetSubtype="0" fill="hold" nodeType="withEffect">
+                                  <p:stCondLst>
+                                    <p:cond delay="0"/>
+                                  </p:stCondLst>
+                                  <p:childTnLst>
+                                    <p:set>
+                                      <p:cBhvr>
+                                        <p:cTn id="53" dur="1" fill="hold">
+                                          <p:stCondLst>
+                                            <p:cond delay="0"/>
+                                          </p:stCondLst>
+                                        </p:cTn>
+                                        <p:tgtEl>
+                                          <p:spTgt spid="57"/>
+                                        </p:tgtEl>
+                                        <p:attrNameLst>
+                                          <p:attrName>style.visibility</p:attrName>
+                                        </p:attrNameLst>
+                                      </p:cBhvr>
+                                      <p:to>
+                                        <p:strVal val="hidden"/>
+                                      </p:to>
+                                    </p:set>
+                                  </p:childTnLst>
+                                </p:cTn>
+                              </p:par>
+                              <p:par>
+                                <p:cTn id="54" presetID="1" presetClass="exit" presetSubtype="0" fill="hold" grpId="1" nodeType="withEffect">
+                                  <p:stCondLst>
+                                    <p:cond delay="0"/>
+                                  </p:stCondLst>
+                                  <p:childTnLst>
+                                    <p:set>
+                                      <p:cBhvr>
+                                        <p:cTn id="55" dur="1" fill="hold">
+                                          <p:stCondLst>
+                                            <p:cond delay="0"/>
+                                          </p:stCondLst>
+                                        </p:cTn>
+                                        <p:tgtEl>
+                                          <p:spTgt spid="49"/>
+                                        </p:tgtEl>
+                                        <p:attrNameLst>
+                                          <p:attrName>style.visibility</p:attrName>
+                                        </p:attrNameLst>
+                                      </p:cBhvr>
+                                      <p:to>
+                                        <p:strVal val="hidden"/>
+                                      </p:to>
+                                    </p:set>
+                                  </p:childTnLst>
+                                </p:cTn>
+                              </p:par>
+                            </p:childTnLst>
+                          </p:cTn>
+                        </p:par>
+                      </p:childTnLst>
+                    </p:cTn>
+                  </p:par>
+                </p:childTnLst>
+              </p:cTn>
+              <p:prevCondLst>
+                <p:cond evt="onPrev" delay="0">
+                  <p:tgtEl>
+                    <p:sldTgt/>
+                  </p:tgtEl>
+                </p:cond>
+              </p:prevCondLst>
+              <p:nextCondLst>
+                <p:cond evt="onNext" delay="0">
+                  <p:tgtEl>
+                    <p:sldTgt/>
+                  </p:tgtEl>
+                </p:cond>
+              </p:nextCondLst>
+            </p:seq>
+          </p:childTnLst>
+        </p:cTn>
+      </p:par>
+    </p:tnLst>
+    <p:bldLst>
+      <p:bldP spid="3" grpId="0" animBg="1"/>
+      <p:bldP spid="3" grpId="1" animBg="1"/>
+      <p:bldP spid="9" grpId="0" animBg="1"/>
+      <p:bldP spid="9" grpId="1" animBg="1"/>
+      <p:bldP spid="48" grpId="0" animBg="1"/>
+      <p:bldP spid="48" grpId="1" animBg="1"/>
+      <p:bldP spid="49" grpId="0" animBg="1"/>
+      <p:bldP spid="49" grpId="1" animBg="1"/>
+      <p:bldP spid="50" grpId="0" animBg="1"/>
+      <p:bldP spid="50" grpId="1" animBg="1"/>
+      <p:bldP spid="53" grpId="0" animBg="1"/>
+      <p:bldP spid="53" grpId="1" animBg="1"/>
+    </p:bldLst>
+  </p:timing>
 </p:sld>
 </file>
 

</xml_diff>

<commit_message>
PP module 1 and 2 updates
</commit_message>
<xml_diff>
--- a/Presentations/DS-course-1-introduction.pptx
+++ b/Presentations/DS-course-1-introduction.pptx
@@ -247,7 +247,7 @@
           <a:p>
             <a:fld id="{CEA2AB23-915C-4A20-A35C-E35A78BBD601}" type="datetimeFigureOut">
               <a:rPr lang="en-US" smtClean="0"/>
-              <a:t>9/5/2022</a:t>
+              <a:t>9/8/2022</a:t>
             </a:fld>
             <a:endParaRPr lang="en-US"/>
           </a:p>
@@ -1227,7 +1227,7 @@
           <a:p>
             <a:r>
               <a:rPr lang="en-US" noProof="0" dirty="0"/>
-              <a:t>NB. : sometimes I will use the term “library” and sometimes “component”. In my world, they mean the same.</a:t>
+              <a:t>BTW, in the following, I will probably use the word “component” rather than “library”. But in my world, they mean the same.</a:t>
             </a:r>
           </a:p>
         </p:txBody>
@@ -4592,7 +4592,7 @@
                 <a:effectLst/>
                 <a:latin typeface="Arial" panose="020B0604020202020204" pitchFamily="34" charset="0"/>
               </a:rPr>
-              <a:t>This is the last one “Dependency Inversion” (represented by the “D” in SOLID)</a:t>
+              <a:t>This is the last one “Dependency Inversion”</a:t>
             </a:r>
             <a:endParaRPr lang="en-US" dirty="0"/>
           </a:p>
@@ -5143,7 +5143,7 @@
             </a:pPr>
             <a:r>
               <a:rPr lang="en-US" noProof="0" dirty="0"/>
-              <a:t>However – no matter how decoupled the DS components are - at one point, you </a:t>
+              <a:t>However, at one point in time, you </a:t>
             </a:r>
             <a:r>
               <a:rPr lang="en-US" b="1" noProof="0" dirty="0"/>
@@ -5169,7 +5169,15 @@
             </a:r>
             <a:r>
               <a:rPr lang="en-US" noProof="0" dirty="0"/>
-              <a:t> compose the service objects for the application. You have to decide.</a:t>
+              <a:t> compose the service objects for your application. You </a:t>
+            </a:r>
+            <a:r>
+              <a:rPr lang="en-US" b="1" noProof="0" dirty="0"/>
+              <a:t>have to</a:t>
+            </a:r>
+            <a:r>
+              <a:rPr lang="en-US" noProof="0" dirty="0"/>
+              <a:t> decide which concrete types to use.</a:t>
             </a:r>
           </a:p>
           <a:p>
@@ -6366,8 +6374,16 @@
               <a:t>private</a:t>
             </a:r>
             <a:r>
+              <a:rPr lang="en-US" b="0" noProof="0"/>
+              <a:t>, though</a:t>
+            </a:r>
+            <a:r>
+              <a:rPr lang="en-US" noProof="0"/>
+              <a:t> </a:t>
+            </a:r>
+            <a:r>
               <a:rPr lang="en-US" noProof="0" dirty="0"/>
-              <a:t> – not public. Only GitHub users affiliated with the DHI GitHub Organization have access.</a:t>
+              <a:t>– not public. Only GitHub users affiliated with the DHI GitHub Organization have access.</a:t>
             </a:r>
           </a:p>
           <a:p>
@@ -6497,12 +6513,26 @@
           <a:lstStyle/>
           <a:p>
             <a:r>
+              <a:rPr lang="en-US" dirty="0"/>
+              <a:t>Code is separated into 5 different GitHub repositories</a:t>
+            </a:r>
+          </a:p>
+          <a:p>
+            <a:r>
               <a:rPr lang="en-US" dirty="0" err="1"/>
               <a:t>DomainModels</a:t>
             </a:r>
             <a:r>
               <a:rPr lang="en-US" dirty="0"/>
-              <a:t> -&gt; Spatial geometry, physical quantities etc.</a:t>
+              <a:t> -&gt; Spatial geometry (</a:t>
+            </a:r>
+            <a:r>
+              <a:rPr lang="en-US" dirty="0" err="1"/>
+              <a:t>DHI.Spatial</a:t>
+            </a:r>
+            <a:r>
+              <a:rPr lang="en-US" dirty="0"/>
+              <a:t>), physical quantities etc.</a:t>
             </a:r>
           </a:p>
           <a:p>
@@ -6512,7 +6542,7 @@
             </a:r>
             <a:r>
               <a:rPr lang="en-US" dirty="0"/>
-              <a:t> -&gt; BL services as well as corresponding REST APIs</a:t>
+              <a:t> -&gt; BL services as well as their corresponding REST APIs</a:t>
             </a:r>
           </a:p>
         </p:txBody>
@@ -8708,7 +8738,15 @@
             </a:pPr>
             <a:r>
               <a:rPr lang="en-US" noProof="0" dirty="0"/>
-              <a:t>4 application services</a:t>
+              <a:t>4 application services (communication via </a:t>
+            </a:r>
+            <a:r>
+              <a:rPr lang="en-US" b="1" noProof="0" dirty="0"/>
+              <a:t>internet protocols</a:t>
+            </a:r>
+            <a:r>
+              <a:rPr lang="en-US" noProof="0" dirty="0"/>
+              <a:t>)</a:t>
             </a:r>
           </a:p>
           <a:p>
@@ -9355,7 +9393,15 @@
           <a:p>
             <a:r>
               <a:rPr lang="en-US" noProof="0" dirty="0"/>
-              <a:t>Before digging into the matter; I have created a small poll. To have a bit of live interaction and make sure we are all awake.</a:t>
+              <a:t>Before digging into the matter; I have created a small poll. To have a </a:t>
+            </a:r>
+            <a:r>
+              <a:rPr lang="en-US" noProof="0"/>
+              <a:t>bit of </a:t>
+            </a:r>
+            <a:r>
+              <a:rPr lang="en-US" noProof="0" dirty="0"/>
+              <a:t>interaction and make sure we are all awake.</a:t>
             </a:r>
           </a:p>
         </p:txBody>
@@ -9442,7 +9488,7 @@
           <a:p>
             <a:r>
               <a:rPr lang="en-US" noProof="0" dirty="0"/>
-              <a:t>Disclaimer: This first module of the course will be a bit theoretic. But please be patient, I promise that in the end and in the following modules, we will gradually dive much more into the practical details.</a:t>
+              <a:t>This first module of the course will be a bit theoretic. But please be patient, I promise that in the end and in the following modules, we will gradually dive much more into the practical details. After this disclaimer:</a:t>
             </a:r>
           </a:p>
           <a:p>
@@ -9770,7 +9816,7 @@
           <a:p>
             <a:fld id="{973BC00D-352D-4681-8132-8CC5EB9D512D}" type="datetimeFigureOut">
               <a:rPr lang="en-US" smtClean="0"/>
-              <a:t>9/5/2022</a:t>
+              <a:t>9/8/2022</a:t>
             </a:fld>
             <a:endParaRPr lang="en-US"/>
           </a:p>
@@ -9968,7 +10014,7 @@
           <a:p>
             <a:fld id="{973BC00D-352D-4681-8132-8CC5EB9D512D}" type="datetimeFigureOut">
               <a:rPr lang="en-US" smtClean="0"/>
-              <a:t>9/5/2022</a:t>
+              <a:t>9/8/2022</a:t>
             </a:fld>
             <a:endParaRPr lang="en-US"/>
           </a:p>
@@ -10176,7 +10222,7 @@
           <a:p>
             <a:fld id="{973BC00D-352D-4681-8132-8CC5EB9D512D}" type="datetimeFigureOut">
               <a:rPr lang="en-US" smtClean="0"/>
-              <a:t>9/5/2022</a:t>
+              <a:t>9/8/2022</a:t>
             </a:fld>
             <a:endParaRPr lang="en-US"/>
           </a:p>
@@ -10374,7 +10420,7 @@
           <a:p>
             <a:fld id="{973BC00D-352D-4681-8132-8CC5EB9D512D}" type="datetimeFigureOut">
               <a:rPr lang="en-US" smtClean="0"/>
-              <a:t>9/5/2022</a:t>
+              <a:t>9/8/2022</a:t>
             </a:fld>
             <a:endParaRPr lang="en-US"/>
           </a:p>
@@ -10649,7 +10695,7 @@
           <a:p>
             <a:fld id="{973BC00D-352D-4681-8132-8CC5EB9D512D}" type="datetimeFigureOut">
               <a:rPr lang="en-US" smtClean="0"/>
-              <a:t>9/5/2022</a:t>
+              <a:t>9/8/2022</a:t>
             </a:fld>
             <a:endParaRPr lang="en-US"/>
           </a:p>
@@ -10914,7 +10960,7 @@
           <a:p>
             <a:fld id="{973BC00D-352D-4681-8132-8CC5EB9D512D}" type="datetimeFigureOut">
               <a:rPr lang="en-US" smtClean="0"/>
-              <a:t>9/5/2022</a:t>
+              <a:t>9/8/2022</a:t>
             </a:fld>
             <a:endParaRPr lang="en-US"/>
           </a:p>
@@ -11326,7 +11372,7 @@
           <a:p>
             <a:fld id="{973BC00D-352D-4681-8132-8CC5EB9D512D}" type="datetimeFigureOut">
               <a:rPr lang="en-US" smtClean="0"/>
-              <a:t>9/5/2022</a:t>
+              <a:t>9/8/2022</a:t>
             </a:fld>
             <a:endParaRPr lang="en-US"/>
           </a:p>
@@ -11467,7 +11513,7 @@
           <a:p>
             <a:fld id="{973BC00D-352D-4681-8132-8CC5EB9D512D}" type="datetimeFigureOut">
               <a:rPr lang="en-US" smtClean="0"/>
-              <a:t>9/5/2022</a:t>
+              <a:t>9/8/2022</a:t>
             </a:fld>
             <a:endParaRPr lang="en-US"/>
           </a:p>
@@ -11580,7 +11626,7 @@
           <a:p>
             <a:fld id="{973BC00D-352D-4681-8132-8CC5EB9D512D}" type="datetimeFigureOut">
               <a:rPr lang="en-US" smtClean="0"/>
-              <a:t>9/5/2022</a:t>
+              <a:t>9/8/2022</a:t>
             </a:fld>
             <a:endParaRPr lang="en-US"/>
           </a:p>
@@ -11891,7 +11937,7 @@
           <a:p>
             <a:fld id="{973BC00D-352D-4681-8132-8CC5EB9D512D}" type="datetimeFigureOut">
               <a:rPr lang="en-US" smtClean="0"/>
-              <a:t>9/5/2022</a:t>
+              <a:t>9/8/2022</a:t>
             </a:fld>
             <a:endParaRPr lang="en-US"/>
           </a:p>
@@ -12179,7 +12225,7 @@
           <a:p>
             <a:fld id="{973BC00D-352D-4681-8132-8CC5EB9D512D}" type="datetimeFigureOut">
               <a:rPr lang="en-US" smtClean="0"/>
-              <a:t>9/5/2022</a:t>
+              <a:t>9/8/2022</a:t>
             </a:fld>
             <a:endParaRPr lang="en-US"/>
           </a:p>
@@ -12420,7 +12466,7 @@
           <a:p>
             <a:fld id="{973BC00D-352D-4681-8132-8CC5EB9D512D}" type="datetimeFigureOut">
               <a:rPr lang="en-US" smtClean="0"/>
-              <a:t>9/5/2022</a:t>
+              <a:t>9/8/2022</a:t>
             </a:fld>
             <a:endParaRPr lang="en-US"/>
           </a:p>
@@ -27615,7 +27661,7 @@
             <a:pPr algn="ctr"/>
             <a:r>
               <a:rPr lang="en-US" dirty="0"/>
-              <a:t>Server</a:t>
+              <a:t>API</a:t>
             </a:r>
           </a:p>
         </p:txBody>
@@ -27634,8 +27680,8 @@
         </p:nvSpPr>
         <p:spPr>
           <a:xfrm>
-            <a:off x="2857125" y="598881"/>
-            <a:ext cx="1491449" cy="807868"/>
+            <a:off x="2751108" y="598881"/>
+            <a:ext cx="1728000" cy="807868"/>
           </a:xfrm>
           <a:prstGeom prst="rect">
             <a:avLst/>
@@ -27664,7 +27710,7 @@
             <a:pPr algn="ctr"/>
             <a:r>
               <a:rPr lang="en-US" dirty="0"/>
-              <a:t>Browser</a:t>
+              <a:t>Frontend</a:t>
             </a:r>
           </a:p>
         </p:txBody>
@@ -27700,7 +27746,7 @@
         </p:blipFill>
         <p:spPr>
           <a:xfrm>
-            <a:off x="3346879" y="66558"/>
+            <a:off x="3357916" y="67973"/>
             <a:ext cx="511939" cy="511939"/>
           </a:xfrm>
           <a:prstGeom prst="rect">
@@ -28996,7 +29042,7 @@
         </p:blipFill>
         <p:spPr bwMode="auto">
           <a:xfrm>
-            <a:off x="3977685" y="1079554"/>
+            <a:off x="4117531" y="1079023"/>
             <a:ext cx="303920" cy="264278"/>
           </a:xfrm>
           <a:prstGeom prst="rect">
@@ -29388,7 +29434,7 @@
             <a:pPr algn="ctr"/>
             <a:r>
               <a:rPr lang="en-US" dirty="0"/>
-              <a:t>Server</a:t>
+              <a:t>API</a:t>
             </a:r>
           </a:p>
         </p:txBody>
@@ -29407,8 +29453,8 @@
         </p:nvSpPr>
         <p:spPr>
           <a:xfrm>
-            <a:off x="2857125" y="598881"/>
-            <a:ext cx="1491449" cy="807868"/>
+            <a:off x="2751108" y="598881"/>
+            <a:ext cx="1728000" cy="807868"/>
           </a:xfrm>
           <a:prstGeom prst="rect">
             <a:avLst/>
@@ -29437,7 +29483,7 @@
             <a:pPr algn="ctr"/>
             <a:r>
               <a:rPr lang="en-US" dirty="0"/>
-              <a:t>Browser</a:t>
+              <a:t>Frontend</a:t>
             </a:r>
           </a:p>
         </p:txBody>
@@ -30733,60 +30779,6 @@
           </a:extLst>
         </p:spPr>
       </p:pic>
-      <p:sp>
-        <p:nvSpPr>
-          <p:cNvPr id="3" name="Oval 2">
-            <a:extLst>
-              <a:ext uri="{FF2B5EF4-FFF2-40B4-BE49-F238E27FC236}">
-                <a16:creationId xmlns:a16="http://schemas.microsoft.com/office/drawing/2014/main" id="{CDBB5D37-2669-434F-8987-26A12560D984}"/>
-              </a:ext>
-            </a:extLst>
-          </p:cNvPr>
-          <p:cNvSpPr/>
-          <p:nvPr/>
-        </p:nvSpPr>
-        <p:spPr>
-          <a:xfrm>
-            <a:off x="1004279" y="1694428"/>
-            <a:ext cx="5229917" cy="2748263"/>
-          </a:xfrm>
-          <a:prstGeom prst="ellipse">
-            <a:avLst/>
-          </a:prstGeom>
-          <a:solidFill>
-            <a:schemeClr val="accent1">
-              <a:alpha val="26000"/>
-            </a:schemeClr>
-          </a:solidFill>
-          <a:ln>
-            <a:noFill/>
-          </a:ln>
-        </p:spPr>
-        <p:style>
-          <a:lnRef idx="2">
-            <a:schemeClr val="accent1">
-              <a:shade val="50000"/>
-            </a:schemeClr>
-          </a:lnRef>
-          <a:fillRef idx="1">
-            <a:schemeClr val="accent1"/>
-          </a:fillRef>
-          <a:effectRef idx="0">
-            <a:schemeClr val="accent1"/>
-          </a:effectRef>
-          <a:fontRef idx="minor">
-            <a:schemeClr val="lt1"/>
-          </a:fontRef>
-        </p:style>
-        <p:txBody>
-          <a:bodyPr rtlCol="0" anchor="ctr"/>
-          <a:lstStyle/>
-          <a:p>
-            <a:pPr algn="ctr"/>
-            <a:endParaRPr lang="en-US"/>
-          </a:p>
-        </p:txBody>
-      </p:sp>
       <p:sp>
         <p:nvSpPr>
           <p:cNvPr id="9" name="TextBox 8">
@@ -30915,7 +30907,7 @@
         </p:blipFill>
         <p:spPr bwMode="auto">
           <a:xfrm>
-            <a:off x="3977685" y="1079554"/>
+            <a:off x="4109854" y="1081007"/>
             <a:ext cx="303920" cy="264278"/>
           </a:xfrm>
           <a:prstGeom prst="rect">
@@ -31173,114 +31165,6 @@
       </p:cxnSp>
       <p:sp>
         <p:nvSpPr>
-          <p:cNvPr id="53" name="Oval 52">
-            <a:extLst>
-              <a:ext uri="{FF2B5EF4-FFF2-40B4-BE49-F238E27FC236}">
-                <a16:creationId xmlns:a16="http://schemas.microsoft.com/office/drawing/2014/main" id="{C164EAD1-F4C0-458D-887B-EC22E32B2E53}"/>
-              </a:ext>
-            </a:extLst>
-          </p:cNvPr>
-          <p:cNvSpPr/>
-          <p:nvPr/>
-        </p:nvSpPr>
-        <p:spPr>
-          <a:xfrm>
-            <a:off x="2273363" y="74510"/>
-            <a:ext cx="2666044" cy="1677530"/>
-          </a:xfrm>
-          <a:prstGeom prst="ellipse">
-            <a:avLst/>
-          </a:prstGeom>
-          <a:solidFill>
-            <a:schemeClr val="accent1">
-              <a:alpha val="26000"/>
-            </a:schemeClr>
-          </a:solidFill>
-          <a:ln>
-            <a:noFill/>
-          </a:ln>
-        </p:spPr>
-        <p:style>
-          <a:lnRef idx="2">
-            <a:schemeClr val="accent1">
-              <a:shade val="50000"/>
-            </a:schemeClr>
-          </a:lnRef>
-          <a:fillRef idx="1">
-            <a:schemeClr val="accent1"/>
-          </a:fillRef>
-          <a:effectRef idx="0">
-            <a:schemeClr val="accent1"/>
-          </a:effectRef>
-          <a:fontRef idx="minor">
-            <a:schemeClr val="lt1"/>
-          </a:fontRef>
-        </p:style>
-        <p:txBody>
-          <a:bodyPr rtlCol="0" anchor="ctr"/>
-          <a:lstStyle/>
-          <a:p>
-            <a:pPr algn="ctr"/>
-            <a:endParaRPr lang="en-US"/>
-          </a:p>
-        </p:txBody>
-      </p:sp>
-      <p:sp>
-        <p:nvSpPr>
-          <p:cNvPr id="43" name="Oval 42">
-            <a:extLst>
-              <a:ext uri="{FF2B5EF4-FFF2-40B4-BE49-F238E27FC236}">
-                <a16:creationId xmlns:a16="http://schemas.microsoft.com/office/drawing/2014/main" id="{7C99D517-E492-4211-92CA-EBD9B48B355D}"/>
-              </a:ext>
-            </a:extLst>
-          </p:cNvPr>
-          <p:cNvSpPr/>
-          <p:nvPr/>
-        </p:nvSpPr>
-        <p:spPr>
-          <a:xfrm>
-            <a:off x="796885" y="1455317"/>
-            <a:ext cx="11288277" cy="3588755"/>
-          </a:xfrm>
-          <a:prstGeom prst="ellipse">
-            <a:avLst/>
-          </a:prstGeom>
-          <a:solidFill>
-            <a:schemeClr val="accent1">
-              <a:alpha val="26000"/>
-            </a:schemeClr>
-          </a:solidFill>
-          <a:ln>
-            <a:noFill/>
-          </a:ln>
-        </p:spPr>
-        <p:style>
-          <a:lnRef idx="2">
-            <a:schemeClr val="accent1">
-              <a:shade val="50000"/>
-            </a:schemeClr>
-          </a:lnRef>
-          <a:fillRef idx="1">
-            <a:schemeClr val="accent1"/>
-          </a:fillRef>
-          <a:effectRef idx="0">
-            <a:schemeClr val="accent1"/>
-          </a:effectRef>
-          <a:fontRef idx="minor">
-            <a:schemeClr val="lt1"/>
-          </a:fontRef>
-        </p:style>
-        <p:txBody>
-          <a:bodyPr rtlCol="0" anchor="ctr"/>
-          <a:lstStyle/>
-          <a:p>
-            <a:pPr algn="ctr"/>
-            <a:endParaRPr lang="en-US"/>
-          </a:p>
-        </p:txBody>
-      </p:sp>
-      <p:sp>
-        <p:nvSpPr>
           <p:cNvPr id="44" name="TextBox 43">
             <a:extLst>
               <a:ext uri="{FF2B5EF4-FFF2-40B4-BE49-F238E27FC236}">
@@ -31371,6 +31255,168 @@
           </a:fontRef>
         </p:style>
       </p:cxnSp>
+      <p:sp>
+        <p:nvSpPr>
+          <p:cNvPr id="53" name="Oval 52">
+            <a:extLst>
+              <a:ext uri="{FF2B5EF4-FFF2-40B4-BE49-F238E27FC236}">
+                <a16:creationId xmlns:a16="http://schemas.microsoft.com/office/drawing/2014/main" id="{C164EAD1-F4C0-458D-887B-EC22E32B2E53}"/>
+              </a:ext>
+            </a:extLst>
+          </p:cNvPr>
+          <p:cNvSpPr/>
+          <p:nvPr/>
+        </p:nvSpPr>
+        <p:spPr>
+          <a:xfrm>
+            <a:off x="2273363" y="74510"/>
+            <a:ext cx="2666044" cy="1677530"/>
+          </a:xfrm>
+          <a:prstGeom prst="ellipse">
+            <a:avLst/>
+          </a:prstGeom>
+          <a:solidFill>
+            <a:schemeClr val="accent1">
+              <a:alpha val="26000"/>
+            </a:schemeClr>
+          </a:solidFill>
+          <a:ln>
+            <a:noFill/>
+          </a:ln>
+        </p:spPr>
+        <p:style>
+          <a:lnRef idx="2">
+            <a:schemeClr val="accent1">
+              <a:shade val="50000"/>
+            </a:schemeClr>
+          </a:lnRef>
+          <a:fillRef idx="1">
+            <a:schemeClr val="accent1"/>
+          </a:fillRef>
+          <a:effectRef idx="0">
+            <a:schemeClr val="accent1"/>
+          </a:effectRef>
+          <a:fontRef idx="minor">
+            <a:schemeClr val="lt1"/>
+          </a:fontRef>
+        </p:style>
+        <p:txBody>
+          <a:bodyPr rtlCol="0" anchor="ctr"/>
+          <a:lstStyle/>
+          <a:p>
+            <a:pPr algn="ctr"/>
+            <a:endParaRPr lang="en-US"/>
+          </a:p>
+        </p:txBody>
+      </p:sp>
+      <p:sp>
+        <p:nvSpPr>
+          <p:cNvPr id="3" name="Oval 2">
+            <a:extLst>
+              <a:ext uri="{FF2B5EF4-FFF2-40B4-BE49-F238E27FC236}">
+                <a16:creationId xmlns:a16="http://schemas.microsoft.com/office/drawing/2014/main" id="{CDBB5D37-2669-434F-8987-26A12560D984}"/>
+              </a:ext>
+            </a:extLst>
+          </p:cNvPr>
+          <p:cNvSpPr/>
+          <p:nvPr/>
+        </p:nvSpPr>
+        <p:spPr>
+          <a:xfrm>
+            <a:off x="1004279" y="1694428"/>
+            <a:ext cx="5229917" cy="2748263"/>
+          </a:xfrm>
+          <a:prstGeom prst="ellipse">
+            <a:avLst/>
+          </a:prstGeom>
+          <a:solidFill>
+            <a:schemeClr val="accent1">
+              <a:alpha val="26000"/>
+            </a:schemeClr>
+          </a:solidFill>
+          <a:ln>
+            <a:noFill/>
+          </a:ln>
+        </p:spPr>
+        <p:style>
+          <a:lnRef idx="2">
+            <a:schemeClr val="accent1">
+              <a:shade val="50000"/>
+            </a:schemeClr>
+          </a:lnRef>
+          <a:fillRef idx="1">
+            <a:schemeClr val="accent1"/>
+          </a:fillRef>
+          <a:effectRef idx="0">
+            <a:schemeClr val="accent1"/>
+          </a:effectRef>
+          <a:fontRef idx="minor">
+            <a:schemeClr val="lt1"/>
+          </a:fontRef>
+        </p:style>
+        <p:txBody>
+          <a:bodyPr rtlCol="0" anchor="ctr"/>
+          <a:lstStyle/>
+          <a:p>
+            <a:pPr algn="ctr"/>
+            <a:endParaRPr lang="en-US"/>
+          </a:p>
+        </p:txBody>
+      </p:sp>
+      <p:sp>
+        <p:nvSpPr>
+          <p:cNvPr id="43" name="Oval 42">
+            <a:extLst>
+              <a:ext uri="{FF2B5EF4-FFF2-40B4-BE49-F238E27FC236}">
+                <a16:creationId xmlns:a16="http://schemas.microsoft.com/office/drawing/2014/main" id="{7C99D517-E492-4211-92CA-EBD9B48B355D}"/>
+              </a:ext>
+            </a:extLst>
+          </p:cNvPr>
+          <p:cNvSpPr/>
+          <p:nvPr/>
+        </p:nvSpPr>
+        <p:spPr>
+          <a:xfrm>
+            <a:off x="796885" y="1455317"/>
+            <a:ext cx="11288277" cy="3588755"/>
+          </a:xfrm>
+          <a:prstGeom prst="ellipse">
+            <a:avLst/>
+          </a:prstGeom>
+          <a:solidFill>
+            <a:schemeClr val="accent1">
+              <a:alpha val="26000"/>
+            </a:schemeClr>
+          </a:solidFill>
+          <a:ln>
+            <a:noFill/>
+          </a:ln>
+        </p:spPr>
+        <p:style>
+          <a:lnRef idx="2">
+            <a:schemeClr val="accent1">
+              <a:shade val="50000"/>
+            </a:schemeClr>
+          </a:lnRef>
+          <a:fillRef idx="1">
+            <a:schemeClr val="accent1"/>
+          </a:fillRef>
+          <a:effectRef idx="0">
+            <a:schemeClr val="accent1"/>
+          </a:effectRef>
+          <a:fontRef idx="minor">
+            <a:schemeClr val="lt1"/>
+          </a:fontRef>
+        </p:style>
+        <p:txBody>
+          <a:bodyPr rtlCol="0" anchor="ctr"/>
+          <a:lstStyle/>
+          <a:p>
+            <a:pPr algn="ctr"/>
+            <a:endParaRPr lang="en-US"/>
+          </a:p>
+        </p:txBody>
+      </p:sp>
     </p:spTree>
     <p:extLst>
       <p:ext uri="{BB962C8B-B14F-4D97-AF65-F5344CB8AC3E}">
@@ -32245,8 +32291,6 @@
       </p:par>
     </p:tnLst>
     <p:bldLst>
-      <p:bldP spid="3" grpId="0" animBg="1"/>
-      <p:bldP spid="3" grpId="1" animBg="1"/>
       <p:bldP spid="9" grpId="0" animBg="1"/>
       <p:bldP spid="9" grpId="1" animBg="1"/>
       <p:bldP spid="48" grpId="0" animBg="1"/>
@@ -32255,12 +32299,14 @@
       <p:bldP spid="49" grpId="1" animBg="1"/>
       <p:bldP spid="50" grpId="0" animBg="1"/>
       <p:bldP spid="50" grpId="1" animBg="1"/>
+      <p:bldP spid="44" grpId="0" animBg="1"/>
+      <p:bldP spid="44" grpId="1" animBg="1"/>
       <p:bldP spid="53" grpId="0" animBg="1"/>
       <p:bldP spid="53" grpId="1" animBg="1"/>
+      <p:bldP spid="3" grpId="0" animBg="1"/>
+      <p:bldP spid="3" grpId="1" animBg="1"/>
       <p:bldP spid="43" grpId="0" animBg="1"/>
       <p:bldP spid="43" grpId="1" animBg="1"/>
-      <p:bldP spid="44" grpId="0" animBg="1"/>
-      <p:bldP spid="44" grpId="1" animBg="1"/>
     </p:bldLst>
   </p:timing>
 </p:sld>

</xml_diff>